<commit_message>
worked on presentation, added BroadPhaseofFlight to ntsb_table_join.ipynb and ntsb_feature_selection.ipynb
</commit_message>
<xml_diff>
--- a/checkpoints/presentation.pptx
+++ b/checkpoints/presentation.pptx
@@ -132,7 +132,7 @@
       <pc:sldMk xmlns:pc="http://schemas.microsoft.com/office/powerpoint/2013/main/command" cId="2033411496" sldId="258"/>
       <ac:spMk id="3" creationId="{0F1CE44E-CC54-8179-30F6-AF49AC24A54E}"/>
       <ac:txMk cp="305">
-        <ac:context len="307" hash="2281929731"/>
+        <ac:context len="383" hash="123101749"/>
       </ac:txMk>
     </ac:txMkLst>
     <p188:pos x="3133725" y="1446213"/>
@@ -157,8 +157,8 @@
       <pc:docMk xmlns:pc="http://schemas.microsoft.com/office/powerpoint/2013/main/command"/>
       <pc:sldMk xmlns:pc="http://schemas.microsoft.com/office/powerpoint/2013/main/command" cId="332788027" sldId="262"/>
       <ac:spMk id="3" creationId="{903860AA-27AC-F0AF-96B8-DEEF89A6B5C5}"/>
-      <ac:txMk cp="168" len="11">
-        <ac:context len="213" hash="1298818312"/>
+      <ac:txMk cp="163" len="11">
+        <ac:context len="264" hash="4127450101"/>
       </ac:txMk>
     </ac:txMkLst>
     <p188:pos x="2833688" y="2346325"/>
@@ -323,7 +323,7 @@
           <a:p>
             <a:fld id="{67345697-3805-D740-8DCB-C1E09C02C100}" type="datetimeFigureOut">
               <a:rPr lang="en-US" smtClean="0"/>
-              <a:t>6/16/25</a:t>
+              <a:t>6/18/25</a:t>
             </a:fld>
             <a:endParaRPr lang="en-US"/>
           </a:p>
@@ -521,7 +521,7 @@
           <a:p>
             <a:fld id="{67345697-3805-D740-8DCB-C1E09C02C100}" type="datetimeFigureOut">
               <a:rPr lang="en-US" smtClean="0"/>
-              <a:t>6/16/25</a:t>
+              <a:t>6/18/25</a:t>
             </a:fld>
             <a:endParaRPr lang="en-US"/>
           </a:p>
@@ -729,7 +729,7 @@
           <a:p>
             <a:fld id="{67345697-3805-D740-8DCB-C1E09C02C100}" type="datetimeFigureOut">
               <a:rPr lang="en-US" smtClean="0"/>
-              <a:t>6/16/25</a:t>
+              <a:t>6/18/25</a:t>
             </a:fld>
             <a:endParaRPr lang="en-US"/>
           </a:p>
@@ -927,7 +927,7 @@
           <a:p>
             <a:fld id="{67345697-3805-D740-8DCB-C1E09C02C100}" type="datetimeFigureOut">
               <a:rPr lang="en-US" smtClean="0"/>
-              <a:t>6/16/25</a:t>
+              <a:t>6/18/25</a:t>
             </a:fld>
             <a:endParaRPr lang="en-US"/>
           </a:p>
@@ -1202,7 +1202,7 @@
           <a:p>
             <a:fld id="{67345697-3805-D740-8DCB-C1E09C02C100}" type="datetimeFigureOut">
               <a:rPr lang="en-US" smtClean="0"/>
-              <a:t>6/16/25</a:t>
+              <a:t>6/18/25</a:t>
             </a:fld>
             <a:endParaRPr lang="en-US"/>
           </a:p>
@@ -1467,7 +1467,7 @@
           <a:p>
             <a:fld id="{67345697-3805-D740-8DCB-C1E09C02C100}" type="datetimeFigureOut">
               <a:rPr lang="en-US" smtClean="0"/>
-              <a:t>6/16/25</a:t>
+              <a:t>6/18/25</a:t>
             </a:fld>
             <a:endParaRPr lang="en-US"/>
           </a:p>
@@ -1879,7 +1879,7 @@
           <a:p>
             <a:fld id="{67345697-3805-D740-8DCB-C1E09C02C100}" type="datetimeFigureOut">
               <a:rPr lang="en-US" smtClean="0"/>
-              <a:t>6/16/25</a:t>
+              <a:t>6/18/25</a:t>
             </a:fld>
             <a:endParaRPr lang="en-US"/>
           </a:p>
@@ -2020,7 +2020,7 @@
           <a:p>
             <a:fld id="{67345697-3805-D740-8DCB-C1E09C02C100}" type="datetimeFigureOut">
               <a:rPr lang="en-US" smtClean="0"/>
-              <a:t>6/16/25</a:t>
+              <a:t>6/18/25</a:t>
             </a:fld>
             <a:endParaRPr lang="en-US"/>
           </a:p>
@@ -2133,7 +2133,7 @@
           <a:p>
             <a:fld id="{67345697-3805-D740-8DCB-C1E09C02C100}" type="datetimeFigureOut">
               <a:rPr lang="en-US" smtClean="0"/>
-              <a:t>6/16/25</a:t>
+              <a:t>6/18/25</a:t>
             </a:fld>
             <a:endParaRPr lang="en-US"/>
           </a:p>
@@ -2444,7 +2444,7 @@
           <a:p>
             <a:fld id="{67345697-3805-D740-8DCB-C1E09C02C100}" type="datetimeFigureOut">
               <a:rPr lang="en-US" smtClean="0"/>
-              <a:t>6/16/25</a:t>
+              <a:t>6/18/25</a:t>
             </a:fld>
             <a:endParaRPr lang="en-US"/>
           </a:p>
@@ -2732,7 +2732,7 @@
           <a:p>
             <a:fld id="{67345697-3805-D740-8DCB-C1E09C02C100}" type="datetimeFigureOut">
               <a:rPr lang="en-US" smtClean="0"/>
-              <a:t>6/16/25</a:t>
+              <a:t>6/18/25</a:t>
             </a:fld>
             <a:endParaRPr lang="en-US"/>
           </a:p>
@@ -2973,7 +2973,7 @@
           <a:p>
             <a:fld id="{67345697-3805-D740-8DCB-C1E09C02C100}" type="datetimeFigureOut">
               <a:rPr lang="en-US" smtClean="0"/>
-              <a:t>6/16/25</a:t>
+              <a:t>6/18/25</a:t>
             </a:fld>
             <a:endParaRPr lang="en-US"/>
           </a:p>
@@ -3550,7 +3550,35 @@
           <a:bodyPr/>
           <a:lstStyle/>
           <a:p>
-            <a:endParaRPr lang="en-US"/>
+            <a:r>
+              <a:rPr lang="en-US" dirty="0"/>
+              <a:t>Given that accident occurred, predict its severity</a:t>
+            </a:r>
+          </a:p>
+          <a:p>
+            <a:pPr lvl="1"/>
+            <a:r>
+              <a:rPr lang="en-US" dirty="0"/>
+              <a:t>Injuries, damage to aircraft</a:t>
+            </a:r>
+          </a:p>
+          <a:p>
+            <a:r>
+              <a:rPr lang="en-US" dirty="0"/>
+              <a:t>Scope: accidents in the USA</a:t>
+            </a:r>
+          </a:p>
+          <a:p>
+            <a:r>
+              <a:rPr lang="en-US" dirty="0"/>
+              <a:t>All aircraft types (planes, helicopters, gliders, ...)</a:t>
+            </a:r>
+          </a:p>
+          <a:p>
+            <a:endParaRPr lang="en-US" dirty="0"/>
+          </a:p>
+          <a:p>
+            <a:endParaRPr lang="en-US" dirty="0"/>
           </a:p>
         </p:txBody>
       </p:sp>
@@ -3630,19 +3658,21 @@
         </p:nvSpPr>
         <p:spPr/>
         <p:txBody>
-          <a:bodyPr/>
+          <a:bodyPr>
+            <a:normAutofit lnSpcReduction="10000"/>
+          </a:bodyPr>
           <a:lstStyle/>
           <a:p>
             <a:r>
               <a:rPr lang="en-US" dirty="0"/>
-              <a:t>National Travel Safety Board (NTSB) database of aviation accidents</a:t>
+              <a:t>National Travel Safety Board (NTSB) database of investigations</a:t>
             </a:r>
           </a:p>
           <a:p>
             <a:pPr lvl="1"/>
             <a:r>
               <a:rPr lang="en-US" dirty="0"/>
-              <a:t>~30000 accidents since 2008</a:t>
+              <a:t>~30000 aviation accidents since 2008</a:t>
             </a:r>
           </a:p>
           <a:p>
@@ -3684,6 +3714,27 @@
             <a:r>
               <a:rPr lang="en-US" dirty="0"/>
               <a:t> to uniquely identify each aircraft in each accident</a:t>
+            </a:r>
+          </a:p>
+          <a:p>
+            <a:pPr lvl="1"/>
+            <a:endParaRPr lang="en-US" dirty="0"/>
+          </a:p>
+          <a:p>
+            <a:r>
+              <a:rPr lang="en-US" dirty="0"/>
+              <a:t>DIAGRAM: pic of highlighted </a:t>
+            </a:r>
+            <a:r>
+              <a:rPr lang="en-US" dirty="0" err="1"/>
+              <a:t>Codemap</a:t>
+            </a:r>
+            <a:endParaRPr lang="en-US" dirty="0"/>
+          </a:p>
+          <a:p>
+            <a:r>
+              <a:rPr lang="en-US" dirty="0"/>
+              <a:t>(Maybe split this slide into two)</a:t>
             </a:r>
           </a:p>
           <a:p>
@@ -3749,7 +3800,7 @@
           <a:p>
             <a:r>
               <a:rPr lang="en-US" dirty="0"/>
-              <a:t>Data cleaning / feature selection</a:t>
+              <a:t>Cleaning: imputation, </a:t>
             </a:r>
           </a:p>
         </p:txBody>
@@ -3795,13 +3846,22 @@
           <a:p>
             <a:r>
               <a:rPr lang="en-US" dirty="0"/>
-              <a:t>Left ~20 features</a:t>
+              <a:t>~20 features remaining</a:t>
             </a:r>
           </a:p>
           <a:p>
             <a:r>
               <a:rPr lang="en-US" dirty="0"/>
               <a:t>Crude Random Forest to refine </a:t>
+            </a:r>
+          </a:p>
+          <a:p>
+            <a:endParaRPr lang="en-US" dirty="0"/>
+          </a:p>
+          <a:p>
+            <a:r>
+              <a:rPr lang="en-US" dirty="0"/>
+              <a:t>DIAGRAM: before and after, highlight changes</a:t>
             </a:r>
           </a:p>
           <a:p>
@@ -3896,7 +3956,56 @@
           <a:bodyPr/>
           <a:lstStyle/>
           <a:p>
-            <a:endParaRPr lang="en-US"/>
+            <a:r>
+              <a:rPr lang="en-US" dirty="0"/>
+              <a:t>Feature selection via crude Random Forest</a:t>
+            </a:r>
+          </a:p>
+          <a:p>
+            <a:r>
+              <a:rPr lang="en-US" dirty="0"/>
+              <a:t>Try several models</a:t>
+            </a:r>
+          </a:p>
+          <a:p>
+            <a:pPr lvl="1"/>
+            <a:r>
+              <a:rPr lang="en-US" dirty="0"/>
+              <a:t>Random Forest</a:t>
+            </a:r>
+          </a:p>
+          <a:p>
+            <a:pPr lvl="1"/>
+            <a:r>
+              <a:rPr lang="en-US" dirty="0"/>
+              <a:t>Extra Trees</a:t>
+            </a:r>
+          </a:p>
+          <a:p>
+            <a:pPr lvl="1"/>
+            <a:r>
+              <a:rPr lang="en-US" dirty="0"/>
+              <a:t>Histogram Gradient Boost Classifier</a:t>
+            </a:r>
+          </a:p>
+          <a:p>
+            <a:pPr lvl="1"/>
+            <a:r>
+              <a:rPr lang="en-US" dirty="0" err="1"/>
+              <a:t>XGBoost</a:t>
+            </a:r>
+            <a:endParaRPr lang="en-US" dirty="0"/>
+          </a:p>
+          <a:p>
+            <a:pPr lvl="1"/>
+            <a:r>
+              <a:rPr lang="en-US" dirty="0" err="1"/>
+              <a:t>kNN</a:t>
+            </a:r>
+            <a:r>
+              <a:rPr lang="en-US" dirty="0"/>
+              <a:t> to handle latitude / longitude</a:t>
+            </a:r>
           </a:p>
         </p:txBody>
       </p:sp>

</xml_diff>

<commit_message>
small changes (I hope)
</commit_message>
<xml_diff>
--- a/checkpoints/presentation.pptx
+++ b/checkpoints/presentation.pptx
@@ -5,16 +5,17 @@
     <p:sldMasterId id="2147483648" r:id="rId1"/>
   </p:sldMasterIdLst>
   <p:notesMasterIdLst>
-    <p:notesMasterId r:id="rId9"/>
+    <p:notesMasterId r:id="rId10"/>
   </p:notesMasterIdLst>
   <p:sldIdLst>
     <p:sldId id="256" r:id="rId2"/>
     <p:sldId id="257" r:id="rId3"/>
     <p:sldId id="264" r:id="rId4"/>
     <p:sldId id="263" r:id="rId5"/>
-    <p:sldId id="259" r:id="rId6"/>
-    <p:sldId id="260" r:id="rId7"/>
-    <p:sldId id="261" r:id="rId8"/>
+    <p:sldId id="265" r:id="rId6"/>
+    <p:sldId id="259" r:id="rId7"/>
+    <p:sldId id="260" r:id="rId8"/>
+    <p:sldId id="261" r:id="rId9"/>
   </p:sldIdLst>
   <p:sldSz cx="12192000" cy="6858000"/>
   <p:notesSz cx="6858000" cy="9144000"/>
@@ -18979,6 +18980,92 @@
           <p:cNvPr id="2" name="Title 1">
             <a:extLst>
               <a:ext uri="{FF2B5EF4-FFF2-40B4-BE49-F238E27FC236}">
+                <a16:creationId xmlns:a16="http://schemas.microsoft.com/office/drawing/2014/main" id="{73127460-AFC2-745E-3BFD-A0F8891AB189}"/>
+              </a:ext>
+            </a:extLst>
+          </p:cNvPr>
+          <p:cNvSpPr>
+            <a:spLocks noGrp="1"/>
+          </p:cNvSpPr>
+          <p:nvPr>
+            <p:ph type="title"/>
+          </p:nvPr>
+        </p:nvSpPr>
+        <p:spPr/>
+        <p:txBody>
+          <a:bodyPr/>
+          <a:lstStyle/>
+          <a:p>
+            <a:r>
+              <a:rPr lang="en-US" dirty="0"/>
+              <a:t>Feature selection</a:t>
+            </a:r>
+          </a:p>
+        </p:txBody>
+      </p:sp>
+      <p:sp>
+        <p:nvSpPr>
+          <p:cNvPr id="3" name="Content Placeholder 2">
+            <a:extLst>
+              <a:ext uri="{FF2B5EF4-FFF2-40B4-BE49-F238E27FC236}">
+                <a16:creationId xmlns:a16="http://schemas.microsoft.com/office/drawing/2014/main" id="{29C80073-72EC-0EDD-E281-92A282F70F29}"/>
+              </a:ext>
+            </a:extLst>
+          </p:cNvPr>
+          <p:cNvSpPr>
+            <a:spLocks noGrp="1"/>
+          </p:cNvSpPr>
+          <p:nvPr>
+            <p:ph idx="1"/>
+          </p:nvPr>
+        </p:nvSpPr>
+        <p:spPr/>
+        <p:txBody>
+          <a:bodyPr/>
+          <a:lstStyle/>
+          <a:p>
+            <a:r>
+              <a:rPr lang="en-US" dirty="0"/>
+              <a:t>Avoided variables with signs of survivorship bias</a:t>
+            </a:r>
+          </a:p>
+        </p:txBody>
+      </p:sp>
+    </p:spTree>
+    <p:extLst>
+      <p:ext uri="{BB962C8B-B14F-4D97-AF65-F5344CB8AC3E}">
+        <p14:creationId xmlns:p14="http://schemas.microsoft.com/office/powerpoint/2010/main" val="3340381882"/>
+      </p:ext>
+    </p:extLst>
+  </p:cSld>
+  <p:clrMapOvr>
+    <a:masterClrMapping/>
+  </p:clrMapOvr>
+</p:sld>
+</file>
+
+<file path=ppt/slides/slide6.xml><?xml version="1.0" encoding="utf-8"?>
+<p:sld xmlns:a="http://schemas.openxmlformats.org/drawingml/2006/main" xmlns:r="http://schemas.openxmlformats.org/officeDocument/2006/relationships" xmlns:p="http://schemas.openxmlformats.org/presentationml/2006/main">
+  <p:cSld>
+    <p:spTree>
+      <p:nvGrpSpPr>
+        <p:cNvPr id="1" name=""/>
+        <p:cNvGrpSpPr/>
+        <p:nvPr/>
+      </p:nvGrpSpPr>
+      <p:grpSpPr>
+        <a:xfrm>
+          <a:off x="0" y="0"/>
+          <a:ext cx="0" cy="0"/>
+          <a:chOff x="0" y="0"/>
+          <a:chExt cx="0" cy="0"/>
+        </a:xfrm>
+      </p:grpSpPr>
+      <p:sp>
+        <p:nvSpPr>
+          <p:cNvPr id="2" name="Title 1">
+            <a:extLst>
+              <a:ext uri="{FF2B5EF4-FFF2-40B4-BE49-F238E27FC236}">
                 <a16:creationId xmlns:a16="http://schemas.microsoft.com/office/drawing/2014/main" id="{753F25C6-A411-4492-7C50-2706CD6FCD38}"/>
               </a:ext>
             </a:extLst>
@@ -19089,7 +19176,7 @@
 </p:sld>
 </file>
 
-<file path=ppt/slides/slide6.xml><?xml version="1.0" encoding="utf-8"?>
+<file path=ppt/slides/slide7.xml><?xml version="1.0" encoding="utf-8"?>
 <p:sld xmlns:a="http://schemas.openxmlformats.org/drawingml/2006/main" xmlns:r="http://schemas.openxmlformats.org/officeDocument/2006/relationships" xmlns:p="http://schemas.openxmlformats.org/presentationml/2006/main">
   <p:cSld>
     <p:spTree>
@@ -19155,7 +19242,10 @@
           <a:bodyPr/>
           <a:lstStyle/>
           <a:p>
-            <a:endParaRPr lang="en-US"/>
+            <a:r>
+              <a:rPr lang="en-US" dirty="0"/>
+              <a:t>Predicting damage: no substantial improvement over baseline</a:t>
+            </a:r>
           </a:p>
         </p:txBody>
       </p:sp>
@@ -19172,7 +19262,7 @@
 </p:sld>
 </file>
 
-<file path=ppt/slides/slide7.xml><?xml version="1.0" encoding="utf-8"?>
+<file path=ppt/slides/slide8.xml><?xml version="1.0" encoding="utf-8"?>
 <p:sld xmlns:a="http://schemas.openxmlformats.org/drawingml/2006/main" xmlns:r="http://schemas.openxmlformats.org/officeDocument/2006/relationships" xmlns:p="http://schemas.openxmlformats.org/presentationml/2006/main">
   <p:cSld>
     <p:spTree>

</xml_diff>

<commit_message>
Updated Map & Presentation
</commit_message>
<xml_diff>
--- a/checkpoints/presentation.pptx
+++ b/checkpoints/presentation.pptx
@@ -4634,49 +4634,19 @@
           <a:chExt cx="0" cy="0"/>
         </a:xfrm>
       </p:grpSpPr>
-      <p:sp>
-        <p:nvSpPr>
-          <p:cNvPr id="2" name="Title 1">
+      <p:pic>
+        <p:nvPicPr>
+          <p:cNvPr id="7" name="Picture 6">
             <a:extLst>
               <a:ext uri="{FF2B5EF4-FFF2-40B4-BE49-F238E27FC236}">
-                <a16:creationId xmlns:a16="http://schemas.microsoft.com/office/drawing/2014/main" id="{C2B20E2E-A39A-EDF9-69D0-7ECBF3F9F7B9}"/>
-              </a:ext>
-            </a:extLst>
-          </p:cNvPr>
-          <p:cNvSpPr>
-            <a:spLocks noGrp="1"/>
-          </p:cNvSpPr>
-          <p:nvPr>
-            <p:ph type="title"/>
-          </p:nvPr>
-        </p:nvSpPr>
-        <p:spPr/>
-        <p:txBody>
-          <a:bodyPr/>
-          <a:lstStyle/>
-          <a:p>
-            <a:r>
-              <a:rPr lang="en-US" dirty="0"/>
-              <a:t>Accident Heatmap</a:t>
-            </a:r>
-          </a:p>
-        </p:txBody>
-      </p:sp>
-      <p:pic>
-        <p:nvPicPr>
-          <p:cNvPr id="4" name="Content Placeholder 3" descr="A map of the united states&#10;&#10;AI-generated content may be incorrect.">
-            <a:extLst>
-              <a:ext uri="{FF2B5EF4-FFF2-40B4-BE49-F238E27FC236}">
-                <a16:creationId xmlns:a16="http://schemas.microsoft.com/office/drawing/2014/main" id="{D5AA2E75-E962-7F5B-5307-F3C05CF6BFF4}"/>
+                <a16:creationId xmlns:a16="http://schemas.microsoft.com/office/drawing/2014/main" id="{D5B720FC-987D-1814-AD34-C232BBDA8A8C}"/>
               </a:ext>
             </a:extLst>
           </p:cNvPr>
           <p:cNvPicPr>
-            <a:picLocks noGrp="1" noChangeAspect="1"/>
+            <a:picLocks noChangeAspect="1"/>
           </p:cNvPicPr>
-          <p:nvPr>
-            <p:ph idx="1"/>
-          </p:nvPr>
+          <p:nvPr/>
         </p:nvPicPr>
         <p:blipFill>
           <a:blip r:embed="rId2"/>
@@ -4686,49 +4656,14 @@
         </p:blipFill>
         <p:spPr>
           <a:xfrm>
-            <a:off x="2923309" y="1271948"/>
-            <a:ext cx="6613910" cy="4960433"/>
+            <a:off x="1842654" y="33224"/>
+            <a:ext cx="9055400" cy="6791551"/>
           </a:xfrm>
           <a:prstGeom prst="rect">
             <a:avLst/>
           </a:prstGeom>
         </p:spPr>
       </p:pic>
-      <p:sp>
-        <p:nvSpPr>
-          <p:cNvPr id="5" name="TextBox 4">
-            <a:extLst>
-              <a:ext uri="{FF2B5EF4-FFF2-40B4-BE49-F238E27FC236}">
-                <a16:creationId xmlns:a16="http://schemas.microsoft.com/office/drawing/2014/main" id="{F583E71E-0162-2BE4-3A3E-9E522D47ACDB}"/>
-              </a:ext>
-            </a:extLst>
-          </p:cNvPr>
-          <p:cNvSpPr txBox="1"/>
-          <p:nvPr/>
-        </p:nvSpPr>
-        <p:spPr>
-          <a:xfrm>
-            <a:off x="4114800" y="6308209"/>
-            <a:ext cx="6002541" cy="369332"/>
-          </a:xfrm>
-          <a:prstGeom prst="rect">
-            <a:avLst/>
-          </a:prstGeom>
-          <a:noFill/>
-        </p:spPr>
-        <p:txBody>
-          <a:bodyPr wrap="none" rtlCol="0">
-            <a:spAutoFit/>
-          </a:bodyPr>
-          <a:lstStyle/>
-          <a:p>
-            <a:r>
-              <a:rPr lang="en-US" dirty="0"/>
-              <a:t>(Will update soon with USA, accident-only map – placeholder) </a:t>
-            </a:r>
-          </a:p>
-        </p:txBody>
-      </p:sp>
     </p:spTree>
     <p:extLst>
       <p:ext uri="{BB962C8B-B14F-4D97-AF65-F5344CB8AC3E}">

</xml_diff>

<commit_message>
Further model testing & slight presentation edit
- Added individual proportion type and bagging regressor
- Performs really well all things considered
- General testing etc.
- Added method of reading in .mdb into presentation
</commit_message>
<xml_diff>
--- a/checkpoints/presentation.pptx
+++ b/checkpoints/presentation.pptx
@@ -212,7 +212,7 @@
           <a:p>
             <a:fld id="{8ECDFA8E-1EEE-EA46-84ED-D615946346B4}" type="datetimeFigureOut">
               <a:rPr lang="en-US" smtClean="0"/>
-              <a:t>6/24/25</a:t>
+              <a:t>6/25/25</a:t>
             </a:fld>
             <a:endParaRPr lang="en-US"/>
           </a:p>
@@ -728,7 +728,7 @@
           <a:p>
             <a:fld id="{67345697-3805-D740-8DCB-C1E09C02C100}" type="datetimeFigureOut">
               <a:rPr lang="en-US" smtClean="0"/>
-              <a:t>6/24/25</a:t>
+              <a:t>6/25/25</a:t>
             </a:fld>
             <a:endParaRPr lang="en-US"/>
           </a:p>
@@ -926,7 +926,7 @@
           <a:p>
             <a:fld id="{67345697-3805-D740-8DCB-C1E09C02C100}" type="datetimeFigureOut">
               <a:rPr lang="en-US" smtClean="0"/>
-              <a:t>6/24/25</a:t>
+              <a:t>6/25/25</a:t>
             </a:fld>
             <a:endParaRPr lang="en-US"/>
           </a:p>
@@ -1134,7 +1134,7 @@
           <a:p>
             <a:fld id="{67345697-3805-D740-8DCB-C1E09C02C100}" type="datetimeFigureOut">
               <a:rPr lang="en-US" smtClean="0"/>
-              <a:t>6/24/25</a:t>
+              <a:t>6/25/25</a:t>
             </a:fld>
             <a:endParaRPr lang="en-US"/>
           </a:p>
@@ -1332,7 +1332,7 @@
           <a:p>
             <a:fld id="{67345697-3805-D740-8DCB-C1E09C02C100}" type="datetimeFigureOut">
               <a:rPr lang="en-US" smtClean="0"/>
-              <a:t>6/24/25</a:t>
+              <a:t>6/25/25</a:t>
             </a:fld>
             <a:endParaRPr lang="en-US"/>
           </a:p>
@@ -1607,7 +1607,7 @@
           <a:p>
             <a:fld id="{67345697-3805-D740-8DCB-C1E09C02C100}" type="datetimeFigureOut">
               <a:rPr lang="en-US" smtClean="0"/>
-              <a:t>6/24/25</a:t>
+              <a:t>6/25/25</a:t>
             </a:fld>
             <a:endParaRPr lang="en-US"/>
           </a:p>
@@ -1872,7 +1872,7 @@
           <a:p>
             <a:fld id="{67345697-3805-D740-8DCB-C1E09C02C100}" type="datetimeFigureOut">
               <a:rPr lang="en-US" smtClean="0"/>
-              <a:t>6/24/25</a:t>
+              <a:t>6/25/25</a:t>
             </a:fld>
             <a:endParaRPr lang="en-US"/>
           </a:p>
@@ -2284,7 +2284,7 @@
           <a:p>
             <a:fld id="{67345697-3805-D740-8DCB-C1E09C02C100}" type="datetimeFigureOut">
               <a:rPr lang="en-US" smtClean="0"/>
-              <a:t>6/24/25</a:t>
+              <a:t>6/25/25</a:t>
             </a:fld>
             <a:endParaRPr lang="en-US"/>
           </a:p>
@@ -2425,7 +2425,7 @@
           <a:p>
             <a:fld id="{67345697-3805-D740-8DCB-C1E09C02C100}" type="datetimeFigureOut">
               <a:rPr lang="en-US" smtClean="0"/>
-              <a:t>6/24/25</a:t>
+              <a:t>6/25/25</a:t>
             </a:fld>
             <a:endParaRPr lang="en-US"/>
           </a:p>
@@ -2538,7 +2538,7 @@
           <a:p>
             <a:fld id="{67345697-3805-D740-8DCB-C1E09C02C100}" type="datetimeFigureOut">
               <a:rPr lang="en-US" smtClean="0"/>
-              <a:t>6/24/25</a:t>
+              <a:t>6/25/25</a:t>
             </a:fld>
             <a:endParaRPr lang="en-US"/>
           </a:p>
@@ -2849,7 +2849,7 @@
           <a:p>
             <a:fld id="{67345697-3805-D740-8DCB-C1E09C02C100}" type="datetimeFigureOut">
               <a:rPr lang="en-US" smtClean="0"/>
-              <a:t>6/24/25</a:t>
+              <a:t>6/25/25</a:t>
             </a:fld>
             <a:endParaRPr lang="en-US"/>
           </a:p>
@@ -3137,7 +3137,7 @@
           <a:p>
             <a:fld id="{67345697-3805-D740-8DCB-C1E09C02C100}" type="datetimeFigureOut">
               <a:rPr lang="en-US" smtClean="0"/>
-              <a:t>6/24/25</a:t>
+              <a:t>6/25/25</a:t>
             </a:fld>
             <a:endParaRPr lang="en-US"/>
           </a:p>
@@ -3378,7 +3378,7 @@
           <a:p>
             <a:fld id="{67345697-3805-D740-8DCB-C1E09C02C100}" type="datetimeFigureOut">
               <a:rPr lang="en-US" smtClean="0"/>
-              <a:t>6/24/25</a:t>
+              <a:t>6/25/25</a:t>
             </a:fld>
             <a:endParaRPr lang="en-US"/>
           </a:p>
@@ -4225,7 +4225,7 @@
         </p:spPr>
         <p:txBody>
           <a:bodyPr>
-            <a:normAutofit/>
+            <a:normAutofit lnSpcReduction="10000"/>
           </a:bodyPr>
           <a:lstStyle/>
           <a:p>
@@ -4245,6 +4245,28 @@
             <a:r>
               <a:rPr lang="en-US" sz="3200" dirty="0"/>
               <a:t>~250 variables</a:t>
+            </a:r>
+          </a:p>
+          <a:p>
+            <a:r>
+              <a:rPr lang="en-US" sz="3200" dirty="0"/>
+              <a:t>.</a:t>
+            </a:r>
+            <a:r>
+              <a:rPr lang="en-US" sz="3200" dirty="0" err="1"/>
+              <a:t>mdb</a:t>
+            </a:r>
+            <a:r>
+              <a:rPr lang="en-US" sz="3200" dirty="0"/>
+              <a:t> file parsed using ‘</a:t>
+            </a:r>
+            <a:r>
+              <a:rPr lang="en-US" sz="3200" dirty="0" err="1"/>
+              <a:t>pyodbc</a:t>
+            </a:r>
+            <a:r>
+              <a:rPr lang="en-US" sz="3200" dirty="0"/>
+              <a:t>’</a:t>
             </a:r>
           </a:p>
           <a:p>
@@ -4401,7 +4423,7 @@
                             </p:stCondLst>
                             <p:childTnLst>
                               <p:par>
-                                <p:cTn id="13" presetID="1" presetClass="entr" presetSubtype="0" fill="hold" nodeType="clickEffect">
+                                <p:cTn id="13" presetID="1" presetClass="entr" presetSubtype="0" fill="hold" grpId="0" nodeType="clickEffect">
                                   <p:stCondLst>
                                     <p:cond delay="0"/>
                                   </p:stCondLst>
@@ -4414,7 +4436,11 @@
                                           </p:stCondLst>
                                         </p:cTn>
                                         <p:tgtEl>
-                                          <p:spTgt spid="18"/>
+                                          <p:spTgt spid="4">
+                                            <p:txEl>
+                                              <p:pRg st="2" end="2"/>
+                                            </p:txEl>
+                                          </p:spTgt>
                                         </p:tgtEl>
                                         <p:attrNameLst>
                                           <p:attrName>style.visibility</p:attrName>
@@ -4446,7 +4472,7 @@
                             </p:stCondLst>
                             <p:childTnLst>
                               <p:par>
-                                <p:cTn id="17" presetID="1" presetClass="entr" presetSubtype="0" fill="hold" grpId="0" nodeType="clickEffect">
+                                <p:cTn id="17" presetID="1" presetClass="entr" presetSubtype="0" fill="hold" nodeType="clickEffect">
                                   <p:stCondLst>
                                     <p:cond delay="0"/>
                                   </p:stCondLst>
@@ -4459,11 +4485,7 @@
                                           </p:stCondLst>
                                         </p:cTn>
                                         <p:tgtEl>
-                                          <p:spTgt spid="4">
-                                            <p:txEl>
-                                              <p:pRg st="3" end="3"/>
-                                            </p:txEl>
-                                          </p:spTgt>
+                                          <p:spTgt spid="18"/>
                                         </p:tgtEl>
                                         <p:attrNameLst>
                                           <p:attrName>style.visibility</p:attrName>
@@ -4476,15 +4498,33 @@
                                   </p:childTnLst>
                                 </p:cTn>
                               </p:par>
+                            </p:childTnLst>
+                          </p:cTn>
+                        </p:par>
+                      </p:childTnLst>
+                    </p:cTn>
+                  </p:par>
+                  <p:par>
+                    <p:cTn id="19" fill="hold">
+                      <p:stCondLst>
+                        <p:cond delay="indefinite"/>
+                      </p:stCondLst>
+                      <p:childTnLst>
+                        <p:par>
+                          <p:cTn id="20" fill="hold">
+                            <p:stCondLst>
+                              <p:cond delay="0"/>
+                            </p:stCondLst>
+                            <p:childTnLst>
                               <p:par>
-                                <p:cTn id="19" presetID="1" presetClass="entr" presetSubtype="0" fill="hold" grpId="0" nodeType="withEffect">
+                                <p:cTn id="21" presetID="1" presetClass="entr" presetSubtype="0" fill="hold" grpId="0" nodeType="clickEffect">
                                   <p:stCondLst>
                                     <p:cond delay="0"/>
                                   </p:stCondLst>
                                   <p:childTnLst>
                                     <p:set>
                                       <p:cBhvr>
-                                        <p:cTn id="20" dur="1" fill="hold">
+                                        <p:cTn id="22" dur="1" fill="hold">
                                           <p:stCondLst>
                                             <p:cond delay="0"/>
                                           </p:stCondLst>
@@ -4507,6 +4547,37 @@
                                   </p:childTnLst>
                                 </p:cTn>
                               </p:par>
+                              <p:par>
+                                <p:cTn id="23" presetID="1" presetClass="entr" presetSubtype="0" fill="hold" grpId="0" nodeType="withEffect">
+                                  <p:stCondLst>
+                                    <p:cond delay="0"/>
+                                  </p:stCondLst>
+                                  <p:childTnLst>
+                                    <p:set>
+                                      <p:cBhvr>
+                                        <p:cTn id="24" dur="1" fill="hold">
+                                          <p:stCondLst>
+                                            <p:cond delay="0"/>
+                                          </p:stCondLst>
+                                        </p:cTn>
+                                        <p:tgtEl>
+                                          <p:spTgt spid="4">
+                                            <p:txEl>
+                                              <p:pRg st="5" end="5"/>
+                                            </p:txEl>
+                                          </p:spTgt>
+                                        </p:tgtEl>
+                                        <p:attrNameLst>
+                                          <p:attrName>style.visibility</p:attrName>
+                                        </p:attrNameLst>
+                                      </p:cBhvr>
+                                      <p:to>
+                                        <p:strVal val="visible"/>
+                                      </p:to>
+                                    </p:set>
+                                  </p:childTnLst>
+                                </p:cTn>
+                              </p:par>
                             </p:childTnLst>
                           </p:cTn>
                         </p:par>
@@ -4514,26 +4585,26 @@
                     </p:cTn>
                   </p:par>
                   <p:par>
-                    <p:cTn id="21" fill="hold">
+                    <p:cTn id="25" fill="hold">
                       <p:stCondLst>
                         <p:cond delay="indefinite"/>
                       </p:stCondLst>
                       <p:childTnLst>
                         <p:par>
-                          <p:cTn id="22" fill="hold">
+                          <p:cTn id="26" fill="hold">
                             <p:stCondLst>
                               <p:cond delay="0"/>
                             </p:stCondLst>
                             <p:childTnLst>
                               <p:par>
-                                <p:cTn id="23" presetID="1" presetClass="entr" presetSubtype="0" fill="hold" nodeType="clickEffect">
+                                <p:cTn id="27" presetID="1" presetClass="entr" presetSubtype="0" fill="hold" nodeType="clickEffect">
                                   <p:stCondLst>
                                     <p:cond delay="0"/>
                                   </p:stCondLst>
                                   <p:childTnLst>
                                     <p:set>
                                       <p:cBhvr>
-                                        <p:cTn id="24" dur="1" fill="hold">
+                                        <p:cTn id="28" dur="1" fill="hold">
                                           <p:stCondLst>
                                             <p:cond delay="0"/>
                                           </p:stCondLst>
@@ -4553,14 +4624,14 @@
                                 </p:cTn>
                               </p:par>
                               <p:par>
-                                <p:cTn id="25" presetID="1" presetClass="entr" presetSubtype="0" fill="hold" grpId="0" nodeType="withEffect">
+                                <p:cTn id="29" presetID="1" presetClass="entr" presetSubtype="0" fill="hold" grpId="0" nodeType="withEffect">
                                   <p:stCondLst>
                                     <p:cond delay="0"/>
                                   </p:stCondLst>
                                   <p:childTnLst>
                                     <p:set>
                                       <p:cBhvr>
-                                        <p:cTn id="26" dur="1" fill="hold">
+                                        <p:cTn id="30" dur="1" fill="hold">
                                           <p:stCondLst>
                                             <p:cond delay="0"/>
                                           </p:stCondLst>
@@ -4568,7 +4639,7 @@
                                         <p:tgtEl>
                                           <p:spTgt spid="4">
                                             <p:txEl>
-                                              <p:pRg st="5" end="5"/>
+                                              <p:pRg st="6" end="6"/>
                                             </p:txEl>
                                           </p:spTgt>
                                         </p:tgtEl>

</xml_diff>

<commit_message>
working on scripts 01 and 02, 01 is not working and I am not sure why
</commit_message>
<xml_diff>
--- a/checkpoints/presentation.pptx
+++ b/checkpoints/presentation.pptx
@@ -10,11 +10,11 @@
   <p:sldIdLst>
     <p:sldId id="256" r:id="rId2"/>
     <p:sldId id="257" r:id="rId3"/>
-    <p:sldId id="264" r:id="rId4"/>
-    <p:sldId id="267" r:id="rId5"/>
-    <p:sldId id="263" r:id="rId6"/>
-    <p:sldId id="265" r:id="rId7"/>
-    <p:sldId id="266" r:id="rId8"/>
+    <p:sldId id="266" r:id="rId4"/>
+    <p:sldId id="264" r:id="rId5"/>
+    <p:sldId id="267" r:id="rId6"/>
+    <p:sldId id="263" r:id="rId7"/>
+    <p:sldId id="265" r:id="rId8"/>
     <p:sldId id="259" r:id="rId9"/>
     <p:sldId id="260" r:id="rId10"/>
     <p:sldId id="261" r:id="rId11"/>
@@ -130,6 +130,32 @@
 </p188:authorLst>
 </file>
 
+<file path=ppt/comments/modernComment_10A_D34BDEB9.xml><?xml version="1.0" encoding="utf-8"?>
+<p188:cmLst xmlns:a="http://schemas.openxmlformats.org/drawingml/2006/main" xmlns:r="http://schemas.openxmlformats.org/officeDocument/2006/relationships" xmlns:p188="http://schemas.microsoft.com/office/powerpoint/2018/8/main">
+  <p188:cm id="{AA3189FE-3455-DD4F-BD7F-EF47DE22402D}" authorId="{23C4EE97-373A-7120-D689-11E7FDE35FAA}" created="2025-06-25T16:01:25.127">
+    <ac:txMkLst xmlns:ac="http://schemas.microsoft.com/office/drawing/2013/main/command">
+      <pc:docMk xmlns:pc="http://schemas.microsoft.com/office/powerpoint/2013/main/command"/>
+      <pc:sldMk xmlns:pc="http://schemas.microsoft.com/office/powerpoint/2013/main/command" cId="3544964793" sldId="266"/>
+      <ac:spMk id="3" creationId="{E9562A2E-F841-79EF-E681-C3A7C25E258E}"/>
+      <ac:txMk cp="5" len="26">
+        <ac:context len="184" hash="320148331"/>
+      </ac:txMk>
+    </ac:txMkLst>
+    <p188:pos x="4519863" y="612775"/>
+    <p188:txBody>
+      <a:bodyPr/>
+      <a:lstStyle/>
+      <a:p>
+        <a:r>
+          <a:rPr lang="en-US"/>
+          <a:t>I think ‘deaths / injuries prevented’</a:t>
+        </a:r>
+      </a:p>
+    </p188:txBody>
+  </p188:cm>
+</p188:cmLst>
+</file>
+
 <file path=ppt/notesMasters/notesMaster1.xml><?xml version="1.0" encoding="utf-8"?>
 <p:notesMaster xmlns:a="http://schemas.openxmlformats.org/drawingml/2006/main" xmlns:r="http://schemas.openxmlformats.org/officeDocument/2006/relationships" xmlns:p="http://schemas.openxmlformats.org/presentationml/2006/main">
   <p:cSld>
@@ -212,7 +238,7 @@
           <a:p>
             <a:fld id="{8ECDFA8E-1EEE-EA46-84ED-D615946346B4}" type="datetimeFigureOut">
               <a:rPr lang="en-US" smtClean="0"/>
-              <a:t>6/24/25</a:t>
+              <a:t>6/25/25</a:t>
             </a:fld>
             <a:endParaRPr lang="en-US"/>
           </a:p>
@@ -562,7 +588,7 @@
           <a:p>
             <a:fld id="{56D03F11-5284-764B-8EF0-4EDB2FE5ACBE}" type="slidenum">
               <a:rPr lang="en-US" smtClean="0"/>
-              <a:t>5</a:t>
+              <a:t>6</a:t>
             </a:fld>
             <a:endParaRPr lang="en-US"/>
           </a:p>
@@ -728,7 +754,7 @@
           <a:p>
             <a:fld id="{67345697-3805-D740-8DCB-C1E09C02C100}" type="datetimeFigureOut">
               <a:rPr lang="en-US" smtClean="0"/>
-              <a:t>6/24/25</a:t>
+              <a:t>6/25/25</a:t>
             </a:fld>
             <a:endParaRPr lang="en-US"/>
           </a:p>
@@ -926,7 +952,7 @@
           <a:p>
             <a:fld id="{67345697-3805-D740-8DCB-C1E09C02C100}" type="datetimeFigureOut">
               <a:rPr lang="en-US" smtClean="0"/>
-              <a:t>6/24/25</a:t>
+              <a:t>6/25/25</a:t>
             </a:fld>
             <a:endParaRPr lang="en-US"/>
           </a:p>
@@ -1134,7 +1160,7 @@
           <a:p>
             <a:fld id="{67345697-3805-D740-8DCB-C1E09C02C100}" type="datetimeFigureOut">
               <a:rPr lang="en-US" smtClean="0"/>
-              <a:t>6/24/25</a:t>
+              <a:t>6/25/25</a:t>
             </a:fld>
             <a:endParaRPr lang="en-US"/>
           </a:p>
@@ -1332,7 +1358,7 @@
           <a:p>
             <a:fld id="{67345697-3805-D740-8DCB-C1E09C02C100}" type="datetimeFigureOut">
               <a:rPr lang="en-US" smtClean="0"/>
-              <a:t>6/24/25</a:t>
+              <a:t>6/25/25</a:t>
             </a:fld>
             <a:endParaRPr lang="en-US"/>
           </a:p>
@@ -1607,7 +1633,7 @@
           <a:p>
             <a:fld id="{67345697-3805-D740-8DCB-C1E09C02C100}" type="datetimeFigureOut">
               <a:rPr lang="en-US" smtClean="0"/>
-              <a:t>6/24/25</a:t>
+              <a:t>6/25/25</a:t>
             </a:fld>
             <a:endParaRPr lang="en-US"/>
           </a:p>
@@ -1872,7 +1898,7 @@
           <a:p>
             <a:fld id="{67345697-3805-D740-8DCB-C1E09C02C100}" type="datetimeFigureOut">
               <a:rPr lang="en-US" smtClean="0"/>
-              <a:t>6/24/25</a:t>
+              <a:t>6/25/25</a:t>
             </a:fld>
             <a:endParaRPr lang="en-US"/>
           </a:p>
@@ -2284,7 +2310,7 @@
           <a:p>
             <a:fld id="{67345697-3805-D740-8DCB-C1E09C02C100}" type="datetimeFigureOut">
               <a:rPr lang="en-US" smtClean="0"/>
-              <a:t>6/24/25</a:t>
+              <a:t>6/25/25</a:t>
             </a:fld>
             <a:endParaRPr lang="en-US"/>
           </a:p>
@@ -2425,7 +2451,7 @@
           <a:p>
             <a:fld id="{67345697-3805-D740-8DCB-C1E09C02C100}" type="datetimeFigureOut">
               <a:rPr lang="en-US" smtClean="0"/>
-              <a:t>6/24/25</a:t>
+              <a:t>6/25/25</a:t>
             </a:fld>
             <a:endParaRPr lang="en-US"/>
           </a:p>
@@ -2538,7 +2564,7 @@
           <a:p>
             <a:fld id="{67345697-3805-D740-8DCB-C1E09C02C100}" type="datetimeFigureOut">
               <a:rPr lang="en-US" smtClean="0"/>
-              <a:t>6/24/25</a:t>
+              <a:t>6/25/25</a:t>
             </a:fld>
             <a:endParaRPr lang="en-US"/>
           </a:p>
@@ -2849,7 +2875,7 @@
           <a:p>
             <a:fld id="{67345697-3805-D740-8DCB-C1E09C02C100}" type="datetimeFigureOut">
               <a:rPr lang="en-US" smtClean="0"/>
-              <a:t>6/24/25</a:t>
+              <a:t>6/25/25</a:t>
             </a:fld>
             <a:endParaRPr lang="en-US"/>
           </a:p>
@@ -3137,7 +3163,7 @@
           <a:p>
             <a:fld id="{67345697-3805-D740-8DCB-C1E09C02C100}" type="datetimeFigureOut">
               <a:rPr lang="en-US" smtClean="0"/>
-              <a:t>6/24/25</a:t>
+              <a:t>6/25/25</a:t>
             </a:fld>
             <a:endParaRPr lang="en-US"/>
           </a:p>
@@ -3378,7 +3404,7 @@
           <a:p>
             <a:fld id="{67345697-3805-D740-8DCB-C1E09C02C100}" type="datetimeFigureOut">
               <a:rPr lang="en-US" smtClean="0"/>
-              <a:t>6/24/25</a:t>
+              <a:t>6/25/25</a:t>
             </a:fld>
             <a:endParaRPr lang="en-US"/>
           </a:p>
@@ -4114,6 +4140,150 @@
           <a:chExt cx="0" cy="0"/>
         </a:xfrm>
       </p:grpSpPr>
+      <p:sp>
+        <p:nvSpPr>
+          <p:cNvPr id="2" name="Title 1">
+            <a:extLst>
+              <a:ext uri="{FF2B5EF4-FFF2-40B4-BE49-F238E27FC236}">
+                <a16:creationId xmlns:a16="http://schemas.microsoft.com/office/drawing/2014/main" id="{25407095-D418-1F16-6D1B-F1B1EFC746A0}"/>
+              </a:ext>
+            </a:extLst>
+          </p:cNvPr>
+          <p:cNvSpPr>
+            <a:spLocks noGrp="1"/>
+          </p:cNvSpPr>
+          <p:nvPr>
+            <p:ph type="title"/>
+          </p:nvPr>
+        </p:nvSpPr>
+        <p:spPr/>
+        <p:txBody>
+          <a:bodyPr/>
+          <a:lstStyle/>
+          <a:p>
+            <a:r>
+              <a:rPr lang="en-US" dirty="0"/>
+              <a:t>KPIs &amp; Target Variables</a:t>
+            </a:r>
+          </a:p>
+        </p:txBody>
+      </p:sp>
+      <p:sp>
+        <p:nvSpPr>
+          <p:cNvPr id="3" name="Content Placeholder 2">
+            <a:extLst>
+              <a:ext uri="{FF2B5EF4-FFF2-40B4-BE49-F238E27FC236}">
+                <a16:creationId xmlns:a16="http://schemas.microsoft.com/office/drawing/2014/main" id="{E9562A2E-F841-79EF-E681-C3A7C25E258E}"/>
+              </a:ext>
+            </a:extLst>
+          </p:cNvPr>
+          <p:cNvSpPr>
+            <a:spLocks noGrp="1"/>
+          </p:cNvSpPr>
+          <p:nvPr>
+            <p:ph idx="1"/>
+          </p:nvPr>
+        </p:nvSpPr>
+        <p:spPr/>
+        <p:txBody>
+          <a:bodyPr/>
+          <a:lstStyle/>
+          <a:p>
+            <a:pPr marL="0" indent="0">
+              <a:buNone/>
+            </a:pPr>
+            <a:r>
+              <a:rPr lang="en-US" dirty="0"/>
+              <a:t>KPI: Level of accident severity</a:t>
+            </a:r>
+          </a:p>
+          <a:p>
+            <a:pPr marL="0" indent="0">
+              <a:buNone/>
+            </a:pPr>
+            <a:endParaRPr lang="en-US" dirty="0"/>
+          </a:p>
+          <a:p>
+            <a:pPr marL="514350" indent="-514350">
+              <a:buFont typeface="+mj-lt"/>
+              <a:buAutoNum type="arabicPeriod"/>
+            </a:pPr>
+            <a:r>
+              <a:rPr lang="en-US" dirty="0"/>
+              <a:t>Level of Aircraft Damage	</a:t>
+            </a:r>
+          </a:p>
+          <a:p>
+            <a:pPr lvl="1"/>
+            <a:r>
+              <a:rPr lang="en-US" dirty="0"/>
+              <a:t>Destroyed, substantial, minor, none</a:t>
+            </a:r>
+          </a:p>
+          <a:p>
+            <a:pPr marL="514350" indent="-514350">
+              <a:buFont typeface="+mj-lt"/>
+              <a:buAutoNum type="arabicPeriod"/>
+            </a:pPr>
+            <a:r>
+              <a:rPr lang="en-US" dirty="0"/>
+              <a:t>Proportion of injuries </a:t>
+            </a:r>
+          </a:p>
+          <a:p>
+            <a:pPr lvl="1"/>
+            <a:r>
+              <a:rPr lang="en-US" dirty="0"/>
+              <a:t>Fatal, serious, minor, none</a:t>
+            </a:r>
+          </a:p>
+          <a:p>
+            <a:pPr marL="514350" indent="-514350">
+              <a:buFont typeface="+mj-lt"/>
+              <a:buAutoNum type="arabicPeriod"/>
+            </a:pPr>
+            <a:r>
+              <a:rPr lang="en-US" dirty="0"/>
+              <a:t>(Number of accidents in given month)</a:t>
+            </a:r>
+          </a:p>
+        </p:txBody>
+      </p:sp>
+    </p:spTree>
+    <p:extLst>
+      <p:ext uri="{BB962C8B-B14F-4D97-AF65-F5344CB8AC3E}">
+        <p14:creationId xmlns:p14="http://schemas.microsoft.com/office/powerpoint/2010/main" val="3544964793"/>
+      </p:ext>
+    </p:extLst>
+  </p:cSld>
+  <p:clrMapOvr>
+    <a:masterClrMapping/>
+  </p:clrMapOvr>
+  <p:extLst>
+    <p:ext uri="{6950BFC3-D8DA-4A85-94F7-54DA5524770B}">
+      <p188:commentRel xmlns:p188="http://schemas.microsoft.com/office/powerpoint/2018/8/main" r:id="rId2"/>
+    </p:ext>
+  </p:extLst>
+</p:sld>
+</file>
+
+<file path=ppt/slides/slide4.xml><?xml version="1.0" encoding="utf-8"?>
+<p:sld xmlns:a="http://schemas.openxmlformats.org/drawingml/2006/main" xmlns:r="http://schemas.openxmlformats.org/officeDocument/2006/relationships" xmlns:p="http://schemas.openxmlformats.org/presentationml/2006/main">
+  <p:cSld>
+    <p:spTree>
+      <p:nvGrpSpPr>
+        <p:cNvPr id="1" name=""/>
+        <p:cNvGrpSpPr/>
+        <p:nvPr/>
+      </p:nvGrpSpPr>
+      <p:grpSpPr>
+        <a:xfrm>
+          <a:off x="0" y="0"/>
+          <a:ext cx="0" cy="0"/>
+          <a:chOff x="0" y="0"/>
+          <a:chExt cx="0" cy="0"/>
+        </a:xfrm>
+      </p:grpSpPr>
       <p:pic>
         <p:nvPicPr>
           <p:cNvPr id="18" name="Picture 17" descr="A screenshot of a computer&#10;&#10;Description automatically generated">
@@ -4617,7 +4787,7 @@
 </p:sld>
 </file>
 
-<file path=ppt/slides/slide4.xml><?xml version="1.0" encoding="utf-8"?>
+<file path=ppt/slides/slide5.xml><?xml version="1.0" encoding="utf-8"?>
 <p:sld xmlns:a="http://schemas.openxmlformats.org/drawingml/2006/main" xmlns:r="http://schemas.openxmlformats.org/officeDocument/2006/relationships" xmlns:p="http://schemas.openxmlformats.org/presentationml/2006/main">
   <p:cSld>
     <p:spTree>
@@ -4677,7 +4847,7 @@
 </p:sld>
 </file>
 
-<file path=ppt/slides/slide5.xml><?xml version="1.0" encoding="utf-8"?>
+<file path=ppt/slides/slide6.xml><?xml version="1.0" encoding="utf-8"?>
 <p:sld xmlns:a="http://schemas.openxmlformats.org/drawingml/2006/main" xmlns:r="http://schemas.openxmlformats.org/officeDocument/2006/relationships" xmlns:p="http://schemas.openxmlformats.org/presentationml/2006/main">
   <p:cSld>
     <p:spTree>
@@ -19103,7 +19273,7 @@
 </p:sld>
 </file>
 
-<file path=ppt/slides/slide6.xml><?xml version="1.0" encoding="utf-8"?>
+<file path=ppt/slides/slide7.xml><?xml version="1.0" encoding="utf-8"?>
 <p:sld xmlns:a="http://schemas.openxmlformats.org/drawingml/2006/main" xmlns:r="http://schemas.openxmlformats.org/officeDocument/2006/relationships" xmlns:p="http://schemas.openxmlformats.org/presentationml/2006/main">
   <p:cSld>
     <p:spTree>
@@ -19200,145 +19370,6 @@
     <p:extLst>
       <p:ext uri="{BB962C8B-B14F-4D97-AF65-F5344CB8AC3E}">
         <p14:creationId xmlns:p14="http://schemas.microsoft.com/office/powerpoint/2010/main" val="3340381882"/>
-      </p:ext>
-    </p:extLst>
-  </p:cSld>
-  <p:clrMapOvr>
-    <a:masterClrMapping/>
-  </p:clrMapOvr>
-</p:sld>
-</file>
-
-<file path=ppt/slides/slide7.xml><?xml version="1.0" encoding="utf-8"?>
-<p:sld xmlns:a="http://schemas.openxmlformats.org/drawingml/2006/main" xmlns:r="http://schemas.openxmlformats.org/officeDocument/2006/relationships" xmlns:p="http://schemas.openxmlformats.org/presentationml/2006/main">
-  <p:cSld>
-    <p:spTree>
-      <p:nvGrpSpPr>
-        <p:cNvPr id="1" name=""/>
-        <p:cNvGrpSpPr/>
-        <p:nvPr/>
-      </p:nvGrpSpPr>
-      <p:grpSpPr>
-        <a:xfrm>
-          <a:off x="0" y="0"/>
-          <a:ext cx="0" cy="0"/>
-          <a:chOff x="0" y="0"/>
-          <a:chExt cx="0" cy="0"/>
-        </a:xfrm>
-      </p:grpSpPr>
-      <p:sp>
-        <p:nvSpPr>
-          <p:cNvPr id="2" name="Title 1">
-            <a:extLst>
-              <a:ext uri="{FF2B5EF4-FFF2-40B4-BE49-F238E27FC236}">
-                <a16:creationId xmlns:a16="http://schemas.microsoft.com/office/drawing/2014/main" id="{25407095-D418-1F16-6D1B-F1B1EFC746A0}"/>
-              </a:ext>
-            </a:extLst>
-          </p:cNvPr>
-          <p:cNvSpPr>
-            <a:spLocks noGrp="1"/>
-          </p:cNvSpPr>
-          <p:nvPr>
-            <p:ph type="title"/>
-          </p:nvPr>
-        </p:nvSpPr>
-        <p:spPr/>
-        <p:txBody>
-          <a:bodyPr/>
-          <a:lstStyle/>
-          <a:p>
-            <a:r>
-              <a:rPr lang="en-US" dirty="0"/>
-              <a:t>KPIs &amp; Target Variables</a:t>
-            </a:r>
-          </a:p>
-        </p:txBody>
-      </p:sp>
-      <p:sp>
-        <p:nvSpPr>
-          <p:cNvPr id="3" name="Content Placeholder 2">
-            <a:extLst>
-              <a:ext uri="{FF2B5EF4-FFF2-40B4-BE49-F238E27FC236}">
-                <a16:creationId xmlns:a16="http://schemas.microsoft.com/office/drawing/2014/main" id="{E9562A2E-F841-79EF-E681-C3A7C25E258E}"/>
-              </a:ext>
-            </a:extLst>
-          </p:cNvPr>
-          <p:cNvSpPr>
-            <a:spLocks noGrp="1"/>
-          </p:cNvSpPr>
-          <p:nvPr>
-            <p:ph idx="1"/>
-          </p:nvPr>
-        </p:nvSpPr>
-        <p:spPr/>
-        <p:txBody>
-          <a:bodyPr/>
-          <a:lstStyle/>
-          <a:p>
-            <a:pPr marL="0" indent="0">
-              <a:buNone/>
-            </a:pPr>
-            <a:r>
-              <a:rPr lang="en-US" dirty="0"/>
-              <a:t>KPI: Level of accident severity</a:t>
-            </a:r>
-          </a:p>
-          <a:p>
-            <a:pPr marL="0" indent="0">
-              <a:buNone/>
-            </a:pPr>
-            <a:endParaRPr lang="en-US" dirty="0"/>
-          </a:p>
-          <a:p>
-            <a:pPr marL="514350" indent="-514350">
-              <a:buFont typeface="+mj-lt"/>
-              <a:buAutoNum type="arabicPeriod"/>
-            </a:pPr>
-            <a:r>
-              <a:rPr lang="en-US" dirty="0"/>
-              <a:t>Level of Aircraft Damage	</a:t>
-            </a:r>
-          </a:p>
-          <a:p>
-            <a:pPr lvl="1"/>
-            <a:r>
-              <a:rPr lang="en-US" dirty="0"/>
-              <a:t>Destroyed, substantial, minor, none</a:t>
-            </a:r>
-          </a:p>
-          <a:p>
-            <a:pPr marL="514350" indent="-514350">
-              <a:buFont typeface="+mj-lt"/>
-              <a:buAutoNum type="arabicPeriod"/>
-            </a:pPr>
-            <a:r>
-              <a:rPr lang="en-US" dirty="0"/>
-              <a:t>Proportion of injuries </a:t>
-            </a:r>
-          </a:p>
-          <a:p>
-            <a:pPr lvl="1"/>
-            <a:r>
-              <a:rPr lang="en-US" dirty="0"/>
-              <a:t>Fatal, serious, minor, none</a:t>
-            </a:r>
-          </a:p>
-          <a:p>
-            <a:pPr marL="514350" indent="-514350">
-              <a:buFont typeface="+mj-lt"/>
-              <a:buAutoNum type="arabicPeriod"/>
-            </a:pPr>
-            <a:r>
-              <a:rPr lang="en-US" dirty="0"/>
-              <a:t>(Number of accidents in given month)</a:t>
-            </a:r>
-          </a:p>
-        </p:txBody>
-      </p:sp>
-    </p:spTree>
-    <p:extLst>
-      <p:ext uri="{BB962C8B-B14F-4D97-AF65-F5344CB8AC3E}">
-        <p14:creationId xmlns:p14="http://schemas.microsoft.com/office/powerpoint/2010/main" val="3544964793"/>
       </p:ext>
     </p:extLst>
   </p:cSld>

</xml_diff>

<commit_message>
restored Jake's presentation edits which I accidentally overwrote
</commit_message>
<xml_diff>
--- a/checkpoints/presentation.pptx
+++ b/checkpoints/presentation.pptx
@@ -10,11 +10,11 @@
   <p:sldIdLst>
     <p:sldId id="256" r:id="rId2"/>
     <p:sldId id="257" r:id="rId3"/>
-    <p:sldId id="266" r:id="rId4"/>
-    <p:sldId id="264" r:id="rId5"/>
-    <p:sldId id="267" r:id="rId6"/>
-    <p:sldId id="263" r:id="rId7"/>
-    <p:sldId id="265" r:id="rId8"/>
+    <p:sldId id="264" r:id="rId4"/>
+    <p:sldId id="267" r:id="rId5"/>
+    <p:sldId id="263" r:id="rId6"/>
+    <p:sldId id="265" r:id="rId7"/>
+    <p:sldId id="266" r:id="rId8"/>
     <p:sldId id="259" r:id="rId9"/>
     <p:sldId id="260" r:id="rId10"/>
     <p:sldId id="261" r:id="rId11"/>
@@ -128,32 +128,6 @@
 <p188:authorLst xmlns:a="http://schemas.openxmlformats.org/drawingml/2006/main" xmlns:r="http://schemas.openxmlformats.org/officeDocument/2006/relationships" xmlns:p188="http://schemas.microsoft.com/office/powerpoint/2018/8/main">
   <p188:author id="{23C4EE97-373A-7120-D689-11E7FDE35FAA}" name="C.J. J Argue" initials="CA" userId="S::cargue@andrew.cmu.edu::578e3d68-e645-4454-9189-e18bcd4e314f" providerId="AD"/>
 </p188:authorLst>
-</file>
-
-<file path=ppt/comments/modernComment_10A_D34BDEB9.xml><?xml version="1.0" encoding="utf-8"?>
-<p188:cmLst xmlns:a="http://schemas.openxmlformats.org/drawingml/2006/main" xmlns:r="http://schemas.openxmlformats.org/officeDocument/2006/relationships" xmlns:p188="http://schemas.microsoft.com/office/powerpoint/2018/8/main">
-  <p188:cm id="{AA3189FE-3455-DD4F-BD7F-EF47DE22402D}" authorId="{23C4EE97-373A-7120-D689-11E7FDE35FAA}" created="2025-06-25T16:01:25.127">
-    <ac:txMkLst xmlns:ac="http://schemas.microsoft.com/office/drawing/2013/main/command">
-      <pc:docMk xmlns:pc="http://schemas.microsoft.com/office/powerpoint/2013/main/command"/>
-      <pc:sldMk xmlns:pc="http://schemas.microsoft.com/office/powerpoint/2013/main/command" cId="3544964793" sldId="266"/>
-      <ac:spMk id="3" creationId="{E9562A2E-F841-79EF-E681-C3A7C25E258E}"/>
-      <ac:txMk cp="5" len="26">
-        <ac:context len="184" hash="320148331"/>
-      </ac:txMk>
-    </ac:txMkLst>
-    <p188:pos x="4519863" y="612775"/>
-    <p188:txBody>
-      <a:bodyPr/>
-      <a:lstStyle/>
-      <a:p>
-        <a:r>
-          <a:rPr lang="en-US"/>
-          <a:t>I think ‘deaths / injuries prevented’</a:t>
-        </a:r>
-      </a:p>
-    </p188:txBody>
-  </p188:cm>
-</p188:cmLst>
 </file>
 
 <file path=ppt/notesMasters/notesMaster1.xml><?xml version="1.0" encoding="utf-8"?>
@@ -588,7 +562,7 @@
           <a:p>
             <a:fld id="{56D03F11-5284-764B-8EF0-4EDB2FE5ACBE}" type="slidenum">
               <a:rPr lang="en-US" smtClean="0"/>
-              <a:t>6</a:t>
+              <a:t>5</a:t>
             </a:fld>
             <a:endParaRPr lang="en-US"/>
           </a:p>
@@ -4140,150 +4114,6 @@
           <a:chExt cx="0" cy="0"/>
         </a:xfrm>
       </p:grpSpPr>
-      <p:sp>
-        <p:nvSpPr>
-          <p:cNvPr id="2" name="Title 1">
-            <a:extLst>
-              <a:ext uri="{FF2B5EF4-FFF2-40B4-BE49-F238E27FC236}">
-                <a16:creationId xmlns:a16="http://schemas.microsoft.com/office/drawing/2014/main" id="{25407095-D418-1F16-6D1B-F1B1EFC746A0}"/>
-              </a:ext>
-            </a:extLst>
-          </p:cNvPr>
-          <p:cNvSpPr>
-            <a:spLocks noGrp="1"/>
-          </p:cNvSpPr>
-          <p:nvPr>
-            <p:ph type="title"/>
-          </p:nvPr>
-        </p:nvSpPr>
-        <p:spPr/>
-        <p:txBody>
-          <a:bodyPr/>
-          <a:lstStyle/>
-          <a:p>
-            <a:r>
-              <a:rPr lang="en-US" dirty="0"/>
-              <a:t>KPIs &amp; Target Variables</a:t>
-            </a:r>
-          </a:p>
-        </p:txBody>
-      </p:sp>
-      <p:sp>
-        <p:nvSpPr>
-          <p:cNvPr id="3" name="Content Placeholder 2">
-            <a:extLst>
-              <a:ext uri="{FF2B5EF4-FFF2-40B4-BE49-F238E27FC236}">
-                <a16:creationId xmlns:a16="http://schemas.microsoft.com/office/drawing/2014/main" id="{E9562A2E-F841-79EF-E681-C3A7C25E258E}"/>
-              </a:ext>
-            </a:extLst>
-          </p:cNvPr>
-          <p:cNvSpPr>
-            <a:spLocks noGrp="1"/>
-          </p:cNvSpPr>
-          <p:nvPr>
-            <p:ph idx="1"/>
-          </p:nvPr>
-        </p:nvSpPr>
-        <p:spPr/>
-        <p:txBody>
-          <a:bodyPr/>
-          <a:lstStyle/>
-          <a:p>
-            <a:pPr marL="0" indent="0">
-              <a:buNone/>
-            </a:pPr>
-            <a:r>
-              <a:rPr lang="en-US" dirty="0"/>
-              <a:t>KPI: Level of accident severity</a:t>
-            </a:r>
-          </a:p>
-          <a:p>
-            <a:pPr marL="0" indent="0">
-              <a:buNone/>
-            </a:pPr>
-            <a:endParaRPr lang="en-US" dirty="0"/>
-          </a:p>
-          <a:p>
-            <a:pPr marL="514350" indent="-514350">
-              <a:buFont typeface="+mj-lt"/>
-              <a:buAutoNum type="arabicPeriod"/>
-            </a:pPr>
-            <a:r>
-              <a:rPr lang="en-US" dirty="0"/>
-              <a:t>Level of Aircraft Damage	</a:t>
-            </a:r>
-          </a:p>
-          <a:p>
-            <a:pPr lvl="1"/>
-            <a:r>
-              <a:rPr lang="en-US" dirty="0"/>
-              <a:t>Destroyed, substantial, minor, none</a:t>
-            </a:r>
-          </a:p>
-          <a:p>
-            <a:pPr marL="514350" indent="-514350">
-              <a:buFont typeface="+mj-lt"/>
-              <a:buAutoNum type="arabicPeriod"/>
-            </a:pPr>
-            <a:r>
-              <a:rPr lang="en-US" dirty="0"/>
-              <a:t>Proportion of injuries </a:t>
-            </a:r>
-          </a:p>
-          <a:p>
-            <a:pPr lvl="1"/>
-            <a:r>
-              <a:rPr lang="en-US" dirty="0"/>
-              <a:t>Fatal, serious, minor, none</a:t>
-            </a:r>
-          </a:p>
-          <a:p>
-            <a:pPr marL="514350" indent="-514350">
-              <a:buFont typeface="+mj-lt"/>
-              <a:buAutoNum type="arabicPeriod"/>
-            </a:pPr>
-            <a:r>
-              <a:rPr lang="en-US" dirty="0"/>
-              <a:t>(Number of accidents in given month)</a:t>
-            </a:r>
-          </a:p>
-        </p:txBody>
-      </p:sp>
-    </p:spTree>
-    <p:extLst>
-      <p:ext uri="{BB962C8B-B14F-4D97-AF65-F5344CB8AC3E}">
-        <p14:creationId xmlns:p14="http://schemas.microsoft.com/office/powerpoint/2010/main" val="3544964793"/>
-      </p:ext>
-    </p:extLst>
-  </p:cSld>
-  <p:clrMapOvr>
-    <a:masterClrMapping/>
-  </p:clrMapOvr>
-  <p:extLst>
-    <p:ext uri="{6950BFC3-D8DA-4A85-94F7-54DA5524770B}">
-      <p188:commentRel xmlns:p188="http://schemas.microsoft.com/office/powerpoint/2018/8/main" r:id="rId2"/>
-    </p:ext>
-  </p:extLst>
-</p:sld>
-</file>
-
-<file path=ppt/slides/slide4.xml><?xml version="1.0" encoding="utf-8"?>
-<p:sld xmlns:a="http://schemas.openxmlformats.org/drawingml/2006/main" xmlns:r="http://schemas.openxmlformats.org/officeDocument/2006/relationships" xmlns:p="http://schemas.openxmlformats.org/presentationml/2006/main">
-  <p:cSld>
-    <p:spTree>
-      <p:nvGrpSpPr>
-        <p:cNvPr id="1" name=""/>
-        <p:cNvGrpSpPr/>
-        <p:nvPr/>
-      </p:nvGrpSpPr>
-      <p:grpSpPr>
-        <a:xfrm>
-          <a:off x="0" y="0"/>
-          <a:ext cx="0" cy="0"/>
-          <a:chOff x="0" y="0"/>
-          <a:chExt cx="0" cy="0"/>
-        </a:xfrm>
-      </p:grpSpPr>
       <p:pic>
         <p:nvPicPr>
           <p:cNvPr id="18" name="Picture 17" descr="A screenshot of a computer&#10;&#10;Description automatically generated">
@@ -4395,7 +4225,7 @@
         </p:spPr>
         <p:txBody>
           <a:bodyPr>
-            <a:normAutofit/>
+            <a:normAutofit lnSpcReduction="10000"/>
           </a:bodyPr>
           <a:lstStyle/>
           <a:p>
@@ -4415,6 +4245,28 @@
             <a:r>
               <a:rPr lang="en-US" sz="3200" dirty="0"/>
               <a:t>~250 variables</a:t>
+            </a:r>
+          </a:p>
+          <a:p>
+            <a:r>
+              <a:rPr lang="en-US" sz="3200" dirty="0"/>
+              <a:t>.</a:t>
+            </a:r>
+            <a:r>
+              <a:rPr lang="en-US" sz="3200" dirty="0" err="1"/>
+              <a:t>mdb</a:t>
+            </a:r>
+            <a:r>
+              <a:rPr lang="en-US" sz="3200" dirty="0"/>
+              <a:t> file parsed using ‘</a:t>
+            </a:r>
+            <a:r>
+              <a:rPr lang="en-US" sz="3200" dirty="0" err="1"/>
+              <a:t>pyodbc</a:t>
+            </a:r>
+            <a:r>
+              <a:rPr lang="en-US" sz="3200" dirty="0"/>
+              <a:t>’</a:t>
             </a:r>
           </a:p>
           <a:p>
@@ -4571,7 +4423,7 @@
                             </p:stCondLst>
                             <p:childTnLst>
                               <p:par>
-                                <p:cTn id="13" presetID="1" presetClass="entr" presetSubtype="0" fill="hold" nodeType="clickEffect">
+                                <p:cTn id="13" presetID="1" presetClass="entr" presetSubtype="0" fill="hold" grpId="0" nodeType="clickEffect">
                                   <p:stCondLst>
                                     <p:cond delay="0"/>
                                   </p:stCondLst>
@@ -4584,7 +4436,11 @@
                                           </p:stCondLst>
                                         </p:cTn>
                                         <p:tgtEl>
-                                          <p:spTgt spid="18"/>
+                                          <p:spTgt spid="4">
+                                            <p:txEl>
+                                              <p:pRg st="2" end="2"/>
+                                            </p:txEl>
+                                          </p:spTgt>
                                         </p:tgtEl>
                                         <p:attrNameLst>
                                           <p:attrName>style.visibility</p:attrName>
@@ -4616,7 +4472,7 @@
                             </p:stCondLst>
                             <p:childTnLst>
                               <p:par>
-                                <p:cTn id="17" presetID="1" presetClass="entr" presetSubtype="0" fill="hold" grpId="0" nodeType="clickEffect">
+                                <p:cTn id="17" presetID="1" presetClass="entr" presetSubtype="0" fill="hold" nodeType="clickEffect">
                                   <p:stCondLst>
                                     <p:cond delay="0"/>
                                   </p:stCondLst>
@@ -4629,11 +4485,7 @@
                                           </p:stCondLst>
                                         </p:cTn>
                                         <p:tgtEl>
-                                          <p:spTgt spid="4">
-                                            <p:txEl>
-                                              <p:pRg st="3" end="3"/>
-                                            </p:txEl>
-                                          </p:spTgt>
+                                          <p:spTgt spid="18"/>
                                         </p:tgtEl>
                                         <p:attrNameLst>
                                           <p:attrName>style.visibility</p:attrName>
@@ -4646,15 +4498,33 @@
                                   </p:childTnLst>
                                 </p:cTn>
                               </p:par>
+                            </p:childTnLst>
+                          </p:cTn>
+                        </p:par>
+                      </p:childTnLst>
+                    </p:cTn>
+                  </p:par>
+                  <p:par>
+                    <p:cTn id="19" fill="hold">
+                      <p:stCondLst>
+                        <p:cond delay="indefinite"/>
+                      </p:stCondLst>
+                      <p:childTnLst>
+                        <p:par>
+                          <p:cTn id="20" fill="hold">
+                            <p:stCondLst>
+                              <p:cond delay="0"/>
+                            </p:stCondLst>
+                            <p:childTnLst>
                               <p:par>
-                                <p:cTn id="19" presetID="1" presetClass="entr" presetSubtype="0" fill="hold" grpId="0" nodeType="withEffect">
+                                <p:cTn id="21" presetID="1" presetClass="entr" presetSubtype="0" fill="hold" grpId="0" nodeType="clickEffect">
                                   <p:stCondLst>
                                     <p:cond delay="0"/>
                                   </p:stCondLst>
                                   <p:childTnLst>
                                     <p:set>
                                       <p:cBhvr>
-                                        <p:cTn id="20" dur="1" fill="hold">
+                                        <p:cTn id="22" dur="1" fill="hold">
                                           <p:stCondLst>
                                             <p:cond delay="0"/>
                                           </p:stCondLst>
@@ -4677,6 +4547,37 @@
                                   </p:childTnLst>
                                 </p:cTn>
                               </p:par>
+                              <p:par>
+                                <p:cTn id="23" presetID="1" presetClass="entr" presetSubtype="0" fill="hold" grpId="0" nodeType="withEffect">
+                                  <p:stCondLst>
+                                    <p:cond delay="0"/>
+                                  </p:stCondLst>
+                                  <p:childTnLst>
+                                    <p:set>
+                                      <p:cBhvr>
+                                        <p:cTn id="24" dur="1" fill="hold">
+                                          <p:stCondLst>
+                                            <p:cond delay="0"/>
+                                          </p:stCondLst>
+                                        </p:cTn>
+                                        <p:tgtEl>
+                                          <p:spTgt spid="4">
+                                            <p:txEl>
+                                              <p:pRg st="5" end="5"/>
+                                            </p:txEl>
+                                          </p:spTgt>
+                                        </p:tgtEl>
+                                        <p:attrNameLst>
+                                          <p:attrName>style.visibility</p:attrName>
+                                        </p:attrNameLst>
+                                      </p:cBhvr>
+                                      <p:to>
+                                        <p:strVal val="visible"/>
+                                      </p:to>
+                                    </p:set>
+                                  </p:childTnLst>
+                                </p:cTn>
+                              </p:par>
                             </p:childTnLst>
                           </p:cTn>
                         </p:par>
@@ -4684,26 +4585,26 @@
                     </p:cTn>
                   </p:par>
                   <p:par>
-                    <p:cTn id="21" fill="hold">
+                    <p:cTn id="25" fill="hold">
                       <p:stCondLst>
                         <p:cond delay="indefinite"/>
                       </p:stCondLst>
                       <p:childTnLst>
                         <p:par>
-                          <p:cTn id="22" fill="hold">
+                          <p:cTn id="26" fill="hold">
                             <p:stCondLst>
                               <p:cond delay="0"/>
                             </p:stCondLst>
                             <p:childTnLst>
                               <p:par>
-                                <p:cTn id="23" presetID="1" presetClass="entr" presetSubtype="0" fill="hold" nodeType="clickEffect">
+                                <p:cTn id="27" presetID="1" presetClass="entr" presetSubtype="0" fill="hold" nodeType="clickEffect">
                                   <p:stCondLst>
                                     <p:cond delay="0"/>
                                   </p:stCondLst>
                                   <p:childTnLst>
                                     <p:set>
                                       <p:cBhvr>
-                                        <p:cTn id="24" dur="1" fill="hold">
+                                        <p:cTn id="28" dur="1" fill="hold">
                                           <p:stCondLst>
                                             <p:cond delay="0"/>
                                           </p:stCondLst>
@@ -4723,14 +4624,14 @@
                                 </p:cTn>
                               </p:par>
                               <p:par>
-                                <p:cTn id="25" presetID="1" presetClass="entr" presetSubtype="0" fill="hold" grpId="0" nodeType="withEffect">
+                                <p:cTn id="29" presetID="1" presetClass="entr" presetSubtype="0" fill="hold" grpId="0" nodeType="withEffect">
                                   <p:stCondLst>
                                     <p:cond delay="0"/>
                                   </p:stCondLst>
                                   <p:childTnLst>
                                     <p:set>
                                       <p:cBhvr>
-                                        <p:cTn id="26" dur="1" fill="hold">
+                                        <p:cTn id="30" dur="1" fill="hold">
                                           <p:stCondLst>
                                             <p:cond delay="0"/>
                                           </p:stCondLst>
@@ -4738,7 +4639,7 @@
                                         <p:tgtEl>
                                           <p:spTgt spid="4">
                                             <p:txEl>
-                                              <p:pRg st="5" end="5"/>
+                                              <p:pRg st="6" end="6"/>
                                             </p:txEl>
                                           </p:spTgt>
                                         </p:tgtEl>
@@ -4787,7 +4688,7 @@
 </p:sld>
 </file>
 
-<file path=ppt/slides/slide5.xml><?xml version="1.0" encoding="utf-8"?>
+<file path=ppt/slides/slide4.xml><?xml version="1.0" encoding="utf-8"?>
 <p:sld xmlns:a="http://schemas.openxmlformats.org/drawingml/2006/main" xmlns:r="http://schemas.openxmlformats.org/officeDocument/2006/relationships" xmlns:p="http://schemas.openxmlformats.org/presentationml/2006/main">
   <p:cSld>
     <p:spTree>
@@ -4847,7 +4748,7 @@
 </p:sld>
 </file>
 
-<file path=ppt/slides/slide6.xml><?xml version="1.0" encoding="utf-8"?>
+<file path=ppt/slides/slide5.xml><?xml version="1.0" encoding="utf-8"?>
 <p:sld xmlns:a="http://schemas.openxmlformats.org/drawingml/2006/main" xmlns:r="http://schemas.openxmlformats.org/officeDocument/2006/relationships" xmlns:p="http://schemas.openxmlformats.org/presentationml/2006/main">
   <p:cSld>
     <p:spTree>
@@ -19273,7 +19174,7 @@
 </p:sld>
 </file>
 
-<file path=ppt/slides/slide7.xml><?xml version="1.0" encoding="utf-8"?>
+<file path=ppt/slides/slide6.xml><?xml version="1.0" encoding="utf-8"?>
 <p:sld xmlns:a="http://schemas.openxmlformats.org/drawingml/2006/main" xmlns:r="http://schemas.openxmlformats.org/officeDocument/2006/relationships" xmlns:p="http://schemas.openxmlformats.org/presentationml/2006/main">
   <p:cSld>
     <p:spTree>
@@ -19370,6 +19271,145 @@
     <p:extLst>
       <p:ext uri="{BB962C8B-B14F-4D97-AF65-F5344CB8AC3E}">
         <p14:creationId xmlns:p14="http://schemas.microsoft.com/office/powerpoint/2010/main" val="3340381882"/>
+      </p:ext>
+    </p:extLst>
+  </p:cSld>
+  <p:clrMapOvr>
+    <a:masterClrMapping/>
+  </p:clrMapOvr>
+</p:sld>
+</file>
+
+<file path=ppt/slides/slide7.xml><?xml version="1.0" encoding="utf-8"?>
+<p:sld xmlns:a="http://schemas.openxmlformats.org/drawingml/2006/main" xmlns:r="http://schemas.openxmlformats.org/officeDocument/2006/relationships" xmlns:p="http://schemas.openxmlformats.org/presentationml/2006/main">
+  <p:cSld>
+    <p:spTree>
+      <p:nvGrpSpPr>
+        <p:cNvPr id="1" name=""/>
+        <p:cNvGrpSpPr/>
+        <p:nvPr/>
+      </p:nvGrpSpPr>
+      <p:grpSpPr>
+        <a:xfrm>
+          <a:off x="0" y="0"/>
+          <a:ext cx="0" cy="0"/>
+          <a:chOff x="0" y="0"/>
+          <a:chExt cx="0" cy="0"/>
+        </a:xfrm>
+      </p:grpSpPr>
+      <p:sp>
+        <p:nvSpPr>
+          <p:cNvPr id="2" name="Title 1">
+            <a:extLst>
+              <a:ext uri="{FF2B5EF4-FFF2-40B4-BE49-F238E27FC236}">
+                <a16:creationId xmlns:a16="http://schemas.microsoft.com/office/drawing/2014/main" id="{25407095-D418-1F16-6D1B-F1B1EFC746A0}"/>
+              </a:ext>
+            </a:extLst>
+          </p:cNvPr>
+          <p:cNvSpPr>
+            <a:spLocks noGrp="1"/>
+          </p:cNvSpPr>
+          <p:nvPr>
+            <p:ph type="title"/>
+          </p:nvPr>
+        </p:nvSpPr>
+        <p:spPr/>
+        <p:txBody>
+          <a:bodyPr/>
+          <a:lstStyle/>
+          <a:p>
+            <a:r>
+              <a:rPr lang="en-US" dirty="0"/>
+              <a:t>KPIs &amp; Target Variables</a:t>
+            </a:r>
+          </a:p>
+        </p:txBody>
+      </p:sp>
+      <p:sp>
+        <p:nvSpPr>
+          <p:cNvPr id="3" name="Content Placeholder 2">
+            <a:extLst>
+              <a:ext uri="{FF2B5EF4-FFF2-40B4-BE49-F238E27FC236}">
+                <a16:creationId xmlns:a16="http://schemas.microsoft.com/office/drawing/2014/main" id="{E9562A2E-F841-79EF-E681-C3A7C25E258E}"/>
+              </a:ext>
+            </a:extLst>
+          </p:cNvPr>
+          <p:cNvSpPr>
+            <a:spLocks noGrp="1"/>
+          </p:cNvSpPr>
+          <p:nvPr>
+            <p:ph idx="1"/>
+          </p:nvPr>
+        </p:nvSpPr>
+        <p:spPr/>
+        <p:txBody>
+          <a:bodyPr/>
+          <a:lstStyle/>
+          <a:p>
+            <a:pPr marL="0" indent="0">
+              <a:buNone/>
+            </a:pPr>
+            <a:r>
+              <a:rPr lang="en-US" dirty="0"/>
+              <a:t>KPI: Level of accident severity</a:t>
+            </a:r>
+          </a:p>
+          <a:p>
+            <a:pPr marL="0" indent="0">
+              <a:buNone/>
+            </a:pPr>
+            <a:endParaRPr lang="en-US" dirty="0"/>
+          </a:p>
+          <a:p>
+            <a:pPr marL="514350" indent="-514350">
+              <a:buFont typeface="+mj-lt"/>
+              <a:buAutoNum type="arabicPeriod"/>
+            </a:pPr>
+            <a:r>
+              <a:rPr lang="en-US" dirty="0"/>
+              <a:t>Level of Aircraft Damage	</a:t>
+            </a:r>
+          </a:p>
+          <a:p>
+            <a:pPr lvl="1"/>
+            <a:r>
+              <a:rPr lang="en-US" dirty="0"/>
+              <a:t>Destroyed, substantial, minor, none</a:t>
+            </a:r>
+          </a:p>
+          <a:p>
+            <a:pPr marL="514350" indent="-514350">
+              <a:buFont typeface="+mj-lt"/>
+              <a:buAutoNum type="arabicPeriod"/>
+            </a:pPr>
+            <a:r>
+              <a:rPr lang="en-US" dirty="0"/>
+              <a:t>Proportion of injuries </a:t>
+            </a:r>
+          </a:p>
+          <a:p>
+            <a:pPr lvl="1"/>
+            <a:r>
+              <a:rPr lang="en-US" dirty="0"/>
+              <a:t>Fatal, serious, minor, none</a:t>
+            </a:r>
+          </a:p>
+          <a:p>
+            <a:pPr marL="514350" indent="-514350">
+              <a:buFont typeface="+mj-lt"/>
+              <a:buAutoNum type="arabicPeriod"/>
+            </a:pPr>
+            <a:r>
+              <a:rPr lang="en-US" dirty="0"/>
+              <a:t>(Number of accidents in given month)</a:t>
+            </a:r>
+          </a:p>
+        </p:txBody>
+      </p:sp>
+    </p:spTree>
+    <p:extLst>
+      <p:ext uri="{BB962C8B-B14F-4D97-AF65-F5344CB8AC3E}">
+        <p14:creationId xmlns:p14="http://schemas.microsoft.com/office/powerpoint/2010/main" val="3544964793"/>
       </p:ext>
     </p:extLst>
   </p:cSld>

</xml_diff>

<commit_message>
updated presentation slides + figures
</commit_message>
<xml_diff>
--- a/checkpoints/presentation.pptx
+++ b/checkpoints/presentation.pptx
@@ -5,19 +5,20 @@
     <p:sldMasterId id="2147483648" r:id="rId1"/>
   </p:sldMasterIdLst>
   <p:notesMasterIdLst>
-    <p:notesMasterId r:id="rId12"/>
+    <p:notesMasterId r:id="rId13"/>
   </p:notesMasterIdLst>
   <p:sldIdLst>
     <p:sldId id="256" r:id="rId2"/>
     <p:sldId id="257" r:id="rId3"/>
-    <p:sldId id="264" r:id="rId4"/>
+    <p:sldId id="266" r:id="rId4"/>
     <p:sldId id="267" r:id="rId5"/>
-    <p:sldId id="263" r:id="rId6"/>
-    <p:sldId id="265" r:id="rId7"/>
-    <p:sldId id="266" r:id="rId8"/>
-    <p:sldId id="259" r:id="rId9"/>
-    <p:sldId id="260" r:id="rId10"/>
-    <p:sldId id="261" r:id="rId11"/>
+    <p:sldId id="264" r:id="rId6"/>
+    <p:sldId id="268" r:id="rId7"/>
+    <p:sldId id="263" r:id="rId8"/>
+    <p:sldId id="269" r:id="rId9"/>
+    <p:sldId id="259" r:id="rId10"/>
+    <p:sldId id="260" r:id="rId11"/>
+    <p:sldId id="261" r:id="rId12"/>
   </p:sldIdLst>
   <p:sldSz cx="12192000" cy="6858000"/>
   <p:notesSz cx="6858000" cy="9144000"/>
@@ -212,7 +213,7 @@
           <a:p>
             <a:fld id="{8ECDFA8E-1EEE-EA46-84ED-D615946346B4}" type="datetimeFigureOut">
               <a:rPr lang="en-US" smtClean="0"/>
-              <a:t>6/25/25</a:t>
+              <a:t>6/26/25</a:t>
             </a:fld>
             <a:endParaRPr lang="en-US"/>
           </a:p>
@@ -562,7 +563,7 @@
           <a:p>
             <a:fld id="{56D03F11-5284-764B-8EF0-4EDB2FE5ACBE}" type="slidenum">
               <a:rPr lang="en-US" smtClean="0"/>
-              <a:t>5</a:t>
+              <a:t>7</a:t>
             </a:fld>
             <a:endParaRPr lang="en-US"/>
           </a:p>
@@ -728,7 +729,7 @@
           <a:p>
             <a:fld id="{67345697-3805-D740-8DCB-C1E09C02C100}" type="datetimeFigureOut">
               <a:rPr lang="en-US" smtClean="0"/>
-              <a:t>6/25/25</a:t>
+              <a:t>6/26/25</a:t>
             </a:fld>
             <a:endParaRPr lang="en-US"/>
           </a:p>
@@ -926,7 +927,7 @@
           <a:p>
             <a:fld id="{67345697-3805-D740-8DCB-C1E09C02C100}" type="datetimeFigureOut">
               <a:rPr lang="en-US" smtClean="0"/>
-              <a:t>6/25/25</a:t>
+              <a:t>6/26/25</a:t>
             </a:fld>
             <a:endParaRPr lang="en-US"/>
           </a:p>
@@ -1134,7 +1135,7 @@
           <a:p>
             <a:fld id="{67345697-3805-D740-8DCB-C1E09C02C100}" type="datetimeFigureOut">
               <a:rPr lang="en-US" smtClean="0"/>
-              <a:t>6/25/25</a:t>
+              <a:t>6/26/25</a:t>
             </a:fld>
             <a:endParaRPr lang="en-US"/>
           </a:p>
@@ -1332,7 +1333,7 @@
           <a:p>
             <a:fld id="{67345697-3805-D740-8DCB-C1E09C02C100}" type="datetimeFigureOut">
               <a:rPr lang="en-US" smtClean="0"/>
-              <a:t>6/25/25</a:t>
+              <a:t>6/26/25</a:t>
             </a:fld>
             <a:endParaRPr lang="en-US"/>
           </a:p>
@@ -1607,7 +1608,7 @@
           <a:p>
             <a:fld id="{67345697-3805-D740-8DCB-C1E09C02C100}" type="datetimeFigureOut">
               <a:rPr lang="en-US" smtClean="0"/>
-              <a:t>6/25/25</a:t>
+              <a:t>6/26/25</a:t>
             </a:fld>
             <a:endParaRPr lang="en-US"/>
           </a:p>
@@ -1872,7 +1873,7 @@
           <a:p>
             <a:fld id="{67345697-3805-D740-8DCB-C1E09C02C100}" type="datetimeFigureOut">
               <a:rPr lang="en-US" smtClean="0"/>
-              <a:t>6/25/25</a:t>
+              <a:t>6/26/25</a:t>
             </a:fld>
             <a:endParaRPr lang="en-US"/>
           </a:p>
@@ -2284,7 +2285,7 @@
           <a:p>
             <a:fld id="{67345697-3805-D740-8DCB-C1E09C02C100}" type="datetimeFigureOut">
               <a:rPr lang="en-US" smtClean="0"/>
-              <a:t>6/25/25</a:t>
+              <a:t>6/26/25</a:t>
             </a:fld>
             <a:endParaRPr lang="en-US"/>
           </a:p>
@@ -2425,7 +2426,7 @@
           <a:p>
             <a:fld id="{67345697-3805-D740-8DCB-C1E09C02C100}" type="datetimeFigureOut">
               <a:rPr lang="en-US" smtClean="0"/>
-              <a:t>6/25/25</a:t>
+              <a:t>6/26/25</a:t>
             </a:fld>
             <a:endParaRPr lang="en-US"/>
           </a:p>
@@ -2538,7 +2539,7 @@
           <a:p>
             <a:fld id="{67345697-3805-D740-8DCB-C1E09C02C100}" type="datetimeFigureOut">
               <a:rPr lang="en-US" smtClean="0"/>
-              <a:t>6/25/25</a:t>
+              <a:t>6/26/25</a:t>
             </a:fld>
             <a:endParaRPr lang="en-US"/>
           </a:p>
@@ -2849,7 +2850,7 @@
           <a:p>
             <a:fld id="{67345697-3805-D740-8DCB-C1E09C02C100}" type="datetimeFigureOut">
               <a:rPr lang="en-US" smtClean="0"/>
-              <a:t>6/25/25</a:t>
+              <a:t>6/26/25</a:t>
             </a:fld>
             <a:endParaRPr lang="en-US"/>
           </a:p>
@@ -3137,7 +3138,7 @@
           <a:p>
             <a:fld id="{67345697-3805-D740-8DCB-C1E09C02C100}" type="datetimeFigureOut">
               <a:rPr lang="en-US" smtClean="0"/>
-              <a:t>6/25/25</a:t>
+              <a:t>6/26/25</a:t>
             </a:fld>
             <a:endParaRPr lang="en-US"/>
           </a:p>
@@ -3378,7 +3379,7 @@
           <a:p>
             <a:fld id="{67345697-3805-D740-8DCB-C1E09C02C100}" type="datetimeFigureOut">
               <a:rPr lang="en-US" smtClean="0"/>
-              <a:t>6/25/25</a:t>
+              <a:t>6/26/25</a:t>
             </a:fld>
             <a:endParaRPr lang="en-US"/>
           </a:p>
@@ -3915,6 +3916,98 @@
           <p:cNvPr id="2" name="Title 1">
             <a:extLst>
               <a:ext uri="{FF2B5EF4-FFF2-40B4-BE49-F238E27FC236}">
+                <a16:creationId xmlns:a16="http://schemas.microsoft.com/office/drawing/2014/main" id="{F3BD8116-D657-9D01-07B7-E4E7DC22CD03}"/>
+              </a:ext>
+            </a:extLst>
+          </p:cNvPr>
+          <p:cNvSpPr>
+            <a:spLocks noGrp="1"/>
+          </p:cNvSpPr>
+          <p:nvPr>
+            <p:ph type="title"/>
+          </p:nvPr>
+        </p:nvSpPr>
+        <p:spPr/>
+        <p:txBody>
+          <a:bodyPr/>
+          <a:lstStyle/>
+          <a:p>
+            <a:r>
+              <a:rPr lang="en-US" dirty="0"/>
+              <a:t>Results</a:t>
+            </a:r>
+          </a:p>
+        </p:txBody>
+      </p:sp>
+      <p:sp>
+        <p:nvSpPr>
+          <p:cNvPr id="3" name="Content Placeholder 2">
+            <a:extLst>
+              <a:ext uri="{FF2B5EF4-FFF2-40B4-BE49-F238E27FC236}">
+                <a16:creationId xmlns:a16="http://schemas.microsoft.com/office/drawing/2014/main" id="{2BB86529-0ED0-A257-972F-F939AE2F796E}"/>
+              </a:ext>
+            </a:extLst>
+          </p:cNvPr>
+          <p:cNvSpPr>
+            <a:spLocks noGrp="1"/>
+          </p:cNvSpPr>
+          <p:nvPr>
+            <p:ph idx="1"/>
+          </p:nvPr>
+        </p:nvSpPr>
+        <p:spPr/>
+        <p:txBody>
+          <a:bodyPr/>
+          <a:lstStyle/>
+          <a:p>
+            <a:r>
+              <a:rPr lang="en-US" dirty="0"/>
+              <a:t>Predicting damage: no substantial improvement over baseline</a:t>
+            </a:r>
+          </a:p>
+          <a:p>
+            <a:r>
+              <a:rPr lang="en-US" dirty="0"/>
+              <a:t>Proportion of injuries:</a:t>
+            </a:r>
+          </a:p>
+        </p:txBody>
+      </p:sp>
+    </p:spTree>
+    <p:extLst>
+      <p:ext uri="{BB962C8B-B14F-4D97-AF65-F5344CB8AC3E}">
+        <p14:creationId xmlns:p14="http://schemas.microsoft.com/office/powerpoint/2010/main" val="433622941"/>
+      </p:ext>
+    </p:extLst>
+  </p:cSld>
+  <p:clrMapOvr>
+    <a:masterClrMapping/>
+  </p:clrMapOvr>
+</p:sld>
+</file>
+
+<file path=ppt/slides/slide11.xml><?xml version="1.0" encoding="utf-8"?>
+<p:sld xmlns:a="http://schemas.openxmlformats.org/drawingml/2006/main" xmlns:r="http://schemas.openxmlformats.org/officeDocument/2006/relationships" xmlns:p="http://schemas.openxmlformats.org/presentationml/2006/main">
+  <p:cSld>
+    <p:spTree>
+      <p:nvGrpSpPr>
+        <p:cNvPr id="1" name=""/>
+        <p:cNvGrpSpPr/>
+        <p:nvPr/>
+      </p:nvGrpSpPr>
+      <p:grpSpPr>
+        <a:xfrm>
+          <a:off x="0" y="0"/>
+          <a:ext cx="0" cy="0"/>
+          <a:chOff x="0" y="0"/>
+          <a:chExt cx="0" cy="0"/>
+        </a:xfrm>
+      </p:grpSpPr>
+      <p:sp>
+        <p:nvSpPr>
+          <p:cNvPr id="2" name="Title 1">
+            <a:extLst>
+              <a:ext uri="{FF2B5EF4-FFF2-40B4-BE49-F238E27FC236}">
                 <a16:creationId xmlns:a16="http://schemas.microsoft.com/office/drawing/2014/main" id="{A085E5D0-482F-DB14-AF8A-B7C0EAD986F7}"/>
               </a:ext>
             </a:extLst>
@@ -4098,6 +4191,205 @@
 </file>
 
 <file path=ppt/slides/slide3.xml><?xml version="1.0" encoding="utf-8"?>
+<p:sld xmlns:a="http://schemas.openxmlformats.org/drawingml/2006/main" xmlns:r="http://schemas.openxmlformats.org/officeDocument/2006/relationships" xmlns:p="http://schemas.openxmlformats.org/presentationml/2006/main">
+  <p:cSld>
+    <p:spTree>
+      <p:nvGrpSpPr>
+        <p:cNvPr id="1" name=""/>
+        <p:cNvGrpSpPr/>
+        <p:nvPr/>
+      </p:nvGrpSpPr>
+      <p:grpSpPr>
+        <a:xfrm>
+          <a:off x="0" y="0"/>
+          <a:ext cx="0" cy="0"/>
+          <a:chOff x="0" y="0"/>
+          <a:chExt cx="0" cy="0"/>
+        </a:xfrm>
+      </p:grpSpPr>
+      <p:sp>
+        <p:nvSpPr>
+          <p:cNvPr id="2" name="Title 1">
+            <a:extLst>
+              <a:ext uri="{FF2B5EF4-FFF2-40B4-BE49-F238E27FC236}">
+                <a16:creationId xmlns:a16="http://schemas.microsoft.com/office/drawing/2014/main" id="{25407095-D418-1F16-6D1B-F1B1EFC746A0}"/>
+              </a:ext>
+            </a:extLst>
+          </p:cNvPr>
+          <p:cNvSpPr>
+            <a:spLocks noGrp="1"/>
+          </p:cNvSpPr>
+          <p:nvPr>
+            <p:ph type="title"/>
+          </p:nvPr>
+        </p:nvSpPr>
+        <p:spPr/>
+        <p:txBody>
+          <a:bodyPr/>
+          <a:lstStyle/>
+          <a:p>
+            <a:r>
+              <a:rPr lang="en-US" dirty="0"/>
+              <a:t>KPIs &amp; Target Variables</a:t>
+            </a:r>
+          </a:p>
+        </p:txBody>
+      </p:sp>
+      <p:sp>
+        <p:nvSpPr>
+          <p:cNvPr id="3" name="Content Placeholder 2">
+            <a:extLst>
+              <a:ext uri="{FF2B5EF4-FFF2-40B4-BE49-F238E27FC236}">
+                <a16:creationId xmlns:a16="http://schemas.microsoft.com/office/drawing/2014/main" id="{E9562A2E-F841-79EF-E681-C3A7C25E258E}"/>
+              </a:ext>
+            </a:extLst>
+          </p:cNvPr>
+          <p:cNvSpPr>
+            <a:spLocks noGrp="1"/>
+          </p:cNvSpPr>
+          <p:nvPr>
+            <p:ph idx="1"/>
+          </p:nvPr>
+        </p:nvSpPr>
+        <p:spPr/>
+        <p:txBody>
+          <a:bodyPr/>
+          <a:lstStyle/>
+          <a:p>
+            <a:pPr marL="0" indent="0">
+              <a:buNone/>
+            </a:pPr>
+            <a:r>
+              <a:rPr lang="en-US" dirty="0"/>
+              <a:t>KPI: Level of accident severity</a:t>
+            </a:r>
+          </a:p>
+          <a:p>
+            <a:pPr marL="0" indent="0">
+              <a:buNone/>
+            </a:pPr>
+            <a:endParaRPr lang="en-US" dirty="0"/>
+          </a:p>
+          <a:p>
+            <a:pPr marL="514350" indent="-514350">
+              <a:buFont typeface="+mj-lt"/>
+              <a:buAutoNum type="arabicPeriod"/>
+            </a:pPr>
+            <a:r>
+              <a:rPr lang="en-US" dirty="0"/>
+              <a:t>Level of Aircraft Damage	</a:t>
+            </a:r>
+          </a:p>
+          <a:p>
+            <a:pPr lvl="1"/>
+            <a:r>
+              <a:rPr lang="en-US" dirty="0"/>
+              <a:t>Destroyed, substantial, minor, none</a:t>
+            </a:r>
+          </a:p>
+          <a:p>
+            <a:pPr marL="514350" indent="-514350">
+              <a:buFont typeface="+mj-lt"/>
+              <a:buAutoNum type="arabicPeriod"/>
+            </a:pPr>
+            <a:r>
+              <a:rPr lang="en-US" dirty="0"/>
+              <a:t>Proportion of injuries </a:t>
+            </a:r>
+          </a:p>
+          <a:p>
+            <a:pPr lvl="1"/>
+            <a:r>
+              <a:rPr lang="en-US" dirty="0"/>
+              <a:t>Fatal, serious, minor, none</a:t>
+            </a:r>
+          </a:p>
+          <a:p>
+            <a:pPr marL="514350" indent="-514350">
+              <a:buFont typeface="+mj-lt"/>
+              <a:buAutoNum type="arabicPeriod"/>
+            </a:pPr>
+            <a:r>
+              <a:rPr lang="en-US" dirty="0"/>
+              <a:t>(Number of accidents in given month)</a:t>
+            </a:r>
+          </a:p>
+        </p:txBody>
+      </p:sp>
+    </p:spTree>
+    <p:extLst>
+      <p:ext uri="{BB962C8B-B14F-4D97-AF65-F5344CB8AC3E}">
+        <p14:creationId xmlns:p14="http://schemas.microsoft.com/office/powerpoint/2010/main" val="3544964793"/>
+      </p:ext>
+    </p:extLst>
+  </p:cSld>
+  <p:clrMapOvr>
+    <a:masterClrMapping/>
+  </p:clrMapOvr>
+</p:sld>
+</file>
+
+<file path=ppt/slides/slide4.xml><?xml version="1.0" encoding="utf-8"?>
+<p:sld xmlns:a="http://schemas.openxmlformats.org/drawingml/2006/main" xmlns:r="http://schemas.openxmlformats.org/officeDocument/2006/relationships" xmlns:p="http://schemas.openxmlformats.org/presentationml/2006/main">
+  <p:cSld>
+    <p:spTree>
+      <p:nvGrpSpPr>
+        <p:cNvPr id="1" name=""/>
+        <p:cNvGrpSpPr/>
+        <p:nvPr/>
+      </p:nvGrpSpPr>
+      <p:grpSpPr>
+        <a:xfrm>
+          <a:off x="0" y="0"/>
+          <a:ext cx="0" cy="0"/>
+          <a:chOff x="0" y="0"/>
+          <a:chExt cx="0" cy="0"/>
+        </a:xfrm>
+      </p:grpSpPr>
+      <p:pic>
+        <p:nvPicPr>
+          <p:cNvPr id="7" name="Picture 6">
+            <a:extLst>
+              <a:ext uri="{FF2B5EF4-FFF2-40B4-BE49-F238E27FC236}">
+                <a16:creationId xmlns:a16="http://schemas.microsoft.com/office/drawing/2014/main" id="{D5B720FC-987D-1814-AD34-C232BBDA8A8C}"/>
+              </a:ext>
+            </a:extLst>
+          </p:cNvPr>
+          <p:cNvPicPr>
+            <a:picLocks noChangeAspect="1"/>
+          </p:cNvPicPr>
+          <p:nvPr/>
+        </p:nvPicPr>
+        <p:blipFill>
+          <a:blip r:embed="rId2"/>
+          <a:stretch>
+            <a:fillRect/>
+          </a:stretch>
+        </p:blipFill>
+        <p:spPr>
+          <a:xfrm>
+            <a:off x="1842654" y="33224"/>
+            <a:ext cx="9055400" cy="6791551"/>
+          </a:xfrm>
+          <a:prstGeom prst="rect">
+            <a:avLst/>
+          </a:prstGeom>
+        </p:spPr>
+      </p:pic>
+    </p:spTree>
+    <p:extLst>
+      <p:ext uri="{BB962C8B-B14F-4D97-AF65-F5344CB8AC3E}">
+        <p14:creationId xmlns:p14="http://schemas.microsoft.com/office/powerpoint/2010/main" val="1717326656"/>
+      </p:ext>
+    </p:extLst>
+  </p:cSld>
+  <p:clrMapOvr>
+    <a:masterClrMapping/>
+  </p:clrMapOvr>
+</p:sld>
+</file>
+
+<file path=ppt/slides/slide5.xml><?xml version="1.0" encoding="utf-8"?>
 <p:sld xmlns:a="http://schemas.openxmlformats.org/drawingml/2006/main" xmlns:r="http://schemas.openxmlformats.org/officeDocument/2006/relationships" xmlns:p="http://schemas.openxmlformats.org/presentationml/2006/main">
   <p:cSld>
     <p:spTree>
@@ -4688,7 +4980,7 @@
 </p:sld>
 </file>
 
-<file path=ppt/slides/slide4.xml><?xml version="1.0" encoding="utf-8"?>
+<file path=ppt/slides/slide6.xml><?xml version="1.0" encoding="utf-8"?>
 <p:sld xmlns:a="http://schemas.openxmlformats.org/drawingml/2006/main" xmlns:r="http://schemas.openxmlformats.org/officeDocument/2006/relationships" xmlns:p="http://schemas.openxmlformats.org/presentationml/2006/main">
   <p:cSld>
     <p:spTree>
@@ -4705,50 +4997,2734 @@
           <a:chExt cx="0" cy="0"/>
         </a:xfrm>
       </p:grpSpPr>
-      <p:pic>
-        <p:nvPicPr>
-          <p:cNvPr id="7" name="Picture 6">
+      <p:sp>
+        <p:nvSpPr>
+          <p:cNvPr id="2" name="Title 1">
             <a:extLst>
               <a:ext uri="{FF2B5EF4-FFF2-40B4-BE49-F238E27FC236}">
-                <a16:creationId xmlns:a16="http://schemas.microsoft.com/office/drawing/2014/main" id="{D5B720FC-987D-1814-AD34-C232BBDA8A8C}"/>
+                <a16:creationId xmlns:a16="http://schemas.microsoft.com/office/drawing/2014/main" id="{127484A7-62CB-9C6C-4B0B-B884BD641988}"/>
               </a:ext>
             </a:extLst>
           </p:cNvPr>
-          <p:cNvPicPr>
-            <a:picLocks noChangeAspect="1"/>
-          </p:cNvPicPr>
+          <p:cNvSpPr>
+            <a:spLocks noGrp="1"/>
+          </p:cNvSpPr>
+          <p:nvPr>
+            <p:ph type="title"/>
+          </p:nvPr>
+        </p:nvSpPr>
+        <p:spPr/>
+        <p:txBody>
+          <a:bodyPr/>
+          <a:lstStyle/>
+          <a:p>
+            <a:r>
+              <a:rPr lang="en-US" dirty="0"/>
+              <a:t>Merged datasets to get aircraft-level data</a:t>
+            </a:r>
+          </a:p>
+        </p:txBody>
+      </p:sp>
+      <p:graphicFrame>
+        <p:nvGraphicFramePr>
+          <p:cNvPr id="4" name="Content Placeholder 3">
+            <a:extLst>
+              <a:ext uri="{FF2B5EF4-FFF2-40B4-BE49-F238E27FC236}">
+                <a16:creationId xmlns:a16="http://schemas.microsoft.com/office/drawing/2014/main" id="{6988289F-82F6-CD62-8506-F1A3B02C39D1}"/>
+              </a:ext>
+            </a:extLst>
+          </p:cNvPr>
+          <p:cNvGraphicFramePr>
+            <a:graphicFrameLocks noGrp="1"/>
+          </p:cNvGraphicFramePr>
+          <p:nvPr>
+            <p:ph idx="1"/>
+            <p:extLst>
+              <p:ext uri="{D42A27DB-BD31-4B8C-83A1-F6EECF244321}">
+                <p14:modId xmlns:p14="http://schemas.microsoft.com/office/powerpoint/2010/main" val="4252286901"/>
+              </p:ext>
+            </p:extLst>
+          </p:nvPr>
+        </p:nvGraphicFramePr>
+        <p:xfrm>
+          <a:off x="553997" y="2344608"/>
+          <a:ext cx="4957117" cy="3337560"/>
+        </p:xfrm>
+        <a:graphic>
+          <a:graphicData uri="http://schemas.openxmlformats.org/drawingml/2006/table">
+            <a:tbl>
+              <a:tblPr firstRow="1">
+                <a:tableStyleId>{5C22544A-7EE6-4342-B048-85BDC9FD1C3A}</a:tableStyleId>
+              </a:tblPr>
+              <a:tblGrid>
+                <a:gridCol w="1653611">
+                  <a:extLst>
+                    <a:ext uri="{9D8B030D-6E8A-4147-A177-3AD203B41FA5}">
+                      <a16:colId xmlns:a16="http://schemas.microsoft.com/office/drawing/2014/main" val="2894027781"/>
+                    </a:ext>
+                  </a:extLst>
+                </a:gridCol>
+                <a:gridCol w="1651134">
+                  <a:extLst>
+                    <a:ext uri="{9D8B030D-6E8A-4147-A177-3AD203B41FA5}">
+                      <a16:colId xmlns:a16="http://schemas.microsoft.com/office/drawing/2014/main" val="2927323744"/>
+                    </a:ext>
+                  </a:extLst>
+                </a:gridCol>
+                <a:gridCol w="1652372">
+                  <a:extLst>
+                    <a:ext uri="{9D8B030D-6E8A-4147-A177-3AD203B41FA5}">
+                      <a16:colId xmlns:a16="http://schemas.microsoft.com/office/drawing/2014/main" val="996186078"/>
+                    </a:ext>
+                  </a:extLst>
+                </a:gridCol>
+              </a:tblGrid>
+              <a:tr h="370840">
+                <a:tc>
+                  <a:txBody>
+                    <a:bodyPr/>
+                    <a:lstStyle/>
+                    <a:p>
+                      <a:pPr algn="ctr"/>
+                      <a:r>
+                        <a:rPr lang="en-US" dirty="0"/>
+                        <a:t>Light condition</a:t>
+                      </a:r>
+                    </a:p>
+                  </a:txBody>
+                  <a:tcPr>
+                    <a:lnL w="12700" cap="flat" cmpd="sng" algn="ctr">
+                      <a:solidFill>
+                        <a:schemeClr val="tx1"/>
+                      </a:solidFill>
+                      <a:prstDash val="solid"/>
+                      <a:round/>
+                      <a:headEnd type="none" w="med" len="med"/>
+                      <a:tailEnd type="none" w="med" len="med"/>
+                    </a:lnL>
+                    <a:lnR w="12700" cap="flat" cmpd="sng" algn="ctr">
+                      <a:solidFill>
+                        <a:schemeClr val="tx1"/>
+                      </a:solidFill>
+                      <a:prstDash val="solid"/>
+                      <a:round/>
+                      <a:headEnd type="none" w="med" len="med"/>
+                      <a:tailEnd type="none" w="med" len="med"/>
+                    </a:lnR>
+                    <a:lnT w="12700" cap="flat" cmpd="sng" algn="ctr">
+                      <a:solidFill>
+                        <a:schemeClr val="tx1"/>
+                      </a:solidFill>
+                      <a:prstDash val="solid"/>
+                      <a:round/>
+                      <a:headEnd type="none" w="med" len="med"/>
+                      <a:tailEnd type="none" w="med" len="med"/>
+                    </a:lnT>
+                    <a:lnB w="12700" cap="flat" cmpd="sng" algn="ctr">
+                      <a:solidFill>
+                        <a:schemeClr val="tx1"/>
+                      </a:solidFill>
+                      <a:prstDash val="solid"/>
+                      <a:round/>
+                      <a:headEnd type="none" w="med" len="med"/>
+                      <a:tailEnd type="none" w="med" len="med"/>
+                    </a:lnB>
+                  </a:tcPr>
+                </a:tc>
+                <a:tc>
+                  <a:txBody>
+                    <a:bodyPr/>
+                    <a:lstStyle/>
+                    <a:p>
+                      <a:pPr algn="ctr"/>
+                      <a:r>
+                        <a:rPr lang="en-US" dirty="0"/>
+                        <a:t>Make</a:t>
+                      </a:r>
+                    </a:p>
+                  </a:txBody>
+                  <a:tcPr>
+                    <a:lnL w="12700" cap="flat" cmpd="sng" algn="ctr">
+                      <a:solidFill>
+                        <a:schemeClr val="tx1"/>
+                      </a:solidFill>
+                      <a:prstDash val="solid"/>
+                      <a:round/>
+                      <a:headEnd type="none" w="med" len="med"/>
+                      <a:tailEnd type="none" w="med" len="med"/>
+                    </a:lnL>
+                    <a:lnR w="12700" cap="flat" cmpd="sng" algn="ctr">
+                      <a:solidFill>
+                        <a:schemeClr val="tx1"/>
+                      </a:solidFill>
+                      <a:prstDash val="solid"/>
+                      <a:round/>
+                      <a:headEnd type="none" w="med" len="med"/>
+                      <a:tailEnd type="none" w="med" len="med"/>
+                    </a:lnR>
+                    <a:lnT w="12700" cap="flat" cmpd="sng" algn="ctr">
+                      <a:solidFill>
+                        <a:schemeClr val="tx1"/>
+                      </a:solidFill>
+                      <a:prstDash val="solid"/>
+                      <a:round/>
+                      <a:headEnd type="none" w="med" len="med"/>
+                      <a:tailEnd type="none" w="med" len="med"/>
+                    </a:lnT>
+                    <a:lnB w="12700" cap="flat" cmpd="sng" algn="ctr">
+                      <a:solidFill>
+                        <a:schemeClr val="tx1"/>
+                      </a:solidFill>
+                      <a:prstDash val="solid"/>
+                      <a:round/>
+                      <a:headEnd type="none" w="med" len="med"/>
+                      <a:tailEnd type="none" w="med" len="med"/>
+                    </a:lnB>
+                  </a:tcPr>
+                </a:tc>
+                <a:tc>
+                  <a:txBody>
+                    <a:bodyPr/>
+                    <a:lstStyle/>
+                    <a:p>
+                      <a:pPr algn="ctr"/>
+                      <a:r>
+                        <a:rPr lang="en-US" dirty="0"/>
+                        <a:t>Fatalities</a:t>
+                      </a:r>
+                    </a:p>
+                  </a:txBody>
+                  <a:tcPr>
+                    <a:lnL w="12700" cap="flat" cmpd="sng" algn="ctr">
+                      <a:solidFill>
+                        <a:schemeClr val="tx1"/>
+                      </a:solidFill>
+                      <a:prstDash val="solid"/>
+                      <a:round/>
+                      <a:headEnd type="none" w="med" len="med"/>
+                      <a:tailEnd type="none" w="med" len="med"/>
+                    </a:lnL>
+                    <a:lnR w="12700" cap="flat" cmpd="sng" algn="ctr">
+                      <a:solidFill>
+                        <a:schemeClr val="tx1"/>
+                      </a:solidFill>
+                      <a:prstDash val="solid"/>
+                      <a:round/>
+                      <a:headEnd type="none" w="med" len="med"/>
+                      <a:tailEnd type="none" w="med" len="med"/>
+                    </a:lnR>
+                    <a:lnT w="12700" cap="flat" cmpd="sng" algn="ctr">
+                      <a:solidFill>
+                        <a:schemeClr val="tx1"/>
+                      </a:solidFill>
+                      <a:prstDash val="solid"/>
+                      <a:round/>
+                      <a:headEnd type="none" w="med" len="med"/>
+                      <a:tailEnd type="none" w="med" len="med"/>
+                    </a:lnT>
+                    <a:lnB w="12700" cap="flat" cmpd="sng" algn="ctr">
+                      <a:solidFill>
+                        <a:schemeClr val="tx1"/>
+                      </a:solidFill>
+                      <a:prstDash val="solid"/>
+                      <a:round/>
+                      <a:headEnd type="none" w="med" len="med"/>
+                      <a:tailEnd type="none" w="med" len="med"/>
+                    </a:lnB>
+                  </a:tcPr>
+                </a:tc>
+                <a:extLst>
+                  <a:ext uri="{0D108BD9-81ED-4DB2-BD59-A6C34878D82A}">
+                    <a16:rowId xmlns:a16="http://schemas.microsoft.com/office/drawing/2014/main" val="3329666342"/>
+                  </a:ext>
+                </a:extLst>
+              </a:tr>
+              <a:tr h="370840">
+                <a:tc rowSpan="2">
+                  <a:txBody>
+                    <a:bodyPr/>
+                    <a:lstStyle/>
+                    <a:p>
+                      <a:pPr algn="ctr"/>
+                      <a:r>
+                        <a:rPr lang="en-US" dirty="0"/>
+                        <a:t>Light</a:t>
+                      </a:r>
+                    </a:p>
+                  </a:txBody>
+                  <a:tcPr anchor="ctr">
+                    <a:lnL w="12700" cap="flat" cmpd="sng" algn="ctr">
+                      <a:solidFill>
+                        <a:schemeClr val="tx1"/>
+                      </a:solidFill>
+                      <a:prstDash val="solid"/>
+                      <a:round/>
+                      <a:headEnd type="none" w="med" len="med"/>
+                      <a:tailEnd type="none" w="med" len="med"/>
+                    </a:lnL>
+                    <a:lnR w="12700" cap="flat" cmpd="sng" algn="ctr">
+                      <a:solidFill>
+                        <a:schemeClr val="tx1"/>
+                      </a:solidFill>
+                      <a:prstDash val="solid"/>
+                      <a:round/>
+                      <a:headEnd type="none" w="med" len="med"/>
+                      <a:tailEnd type="none" w="med" len="med"/>
+                    </a:lnR>
+                    <a:lnT w="12700" cap="flat" cmpd="sng" algn="ctr">
+                      <a:solidFill>
+                        <a:schemeClr val="tx1"/>
+                      </a:solidFill>
+                      <a:prstDash val="solid"/>
+                      <a:round/>
+                      <a:headEnd type="none" w="med" len="med"/>
+                      <a:tailEnd type="none" w="med" len="med"/>
+                    </a:lnT>
+                    <a:lnB w="12700" cap="flat" cmpd="sng" algn="ctr">
+                      <a:solidFill>
+                        <a:schemeClr val="tx1"/>
+                      </a:solidFill>
+                      <a:prstDash val="solid"/>
+                      <a:round/>
+                      <a:headEnd type="none" w="med" len="med"/>
+                      <a:tailEnd type="none" w="med" len="med"/>
+                    </a:lnB>
+                  </a:tcPr>
+                </a:tc>
+                <a:tc rowSpan="2">
+                  <a:txBody>
+                    <a:bodyPr/>
+                    <a:lstStyle/>
+                    <a:p>
+                      <a:pPr algn="ctr"/>
+                      <a:r>
+                        <a:rPr lang="en-US" dirty="0"/>
+                        <a:t>Cessna</a:t>
+                      </a:r>
+                    </a:p>
+                  </a:txBody>
+                  <a:tcPr anchor="ctr">
+                    <a:lnL w="12700" cap="flat" cmpd="sng" algn="ctr">
+                      <a:solidFill>
+                        <a:schemeClr val="tx1"/>
+                      </a:solidFill>
+                      <a:prstDash val="solid"/>
+                      <a:round/>
+                      <a:headEnd type="none" w="med" len="med"/>
+                      <a:tailEnd type="none" w="med" len="med"/>
+                    </a:lnL>
+                    <a:lnR w="12700" cap="flat" cmpd="sng" algn="ctr">
+                      <a:solidFill>
+                        <a:schemeClr val="tx1"/>
+                      </a:solidFill>
+                      <a:prstDash val="solid"/>
+                      <a:round/>
+                      <a:headEnd type="none" w="med" len="med"/>
+                      <a:tailEnd type="none" w="med" len="med"/>
+                    </a:lnR>
+                    <a:lnT w="12700" cap="flat" cmpd="sng" algn="ctr">
+                      <a:solidFill>
+                        <a:schemeClr val="tx1"/>
+                      </a:solidFill>
+                      <a:prstDash val="solid"/>
+                      <a:round/>
+                      <a:headEnd type="none" w="med" len="med"/>
+                      <a:tailEnd type="none" w="med" len="med"/>
+                    </a:lnT>
+                    <a:lnB w="12700" cap="flat" cmpd="sng" algn="ctr">
+                      <a:solidFill>
+                        <a:schemeClr val="tx1"/>
+                      </a:solidFill>
+                      <a:prstDash val="solid"/>
+                      <a:round/>
+                      <a:headEnd type="none" w="med" len="med"/>
+                      <a:tailEnd type="none" w="med" len="med"/>
+                    </a:lnB>
+                  </a:tcPr>
+                </a:tc>
+                <a:tc>
+                  <a:txBody>
+                    <a:bodyPr/>
+                    <a:lstStyle/>
+                    <a:p>
+                      <a:pPr algn="ctr"/>
+                      <a:r>
+                        <a:rPr lang="en-US" dirty="0"/>
+                        <a:t>Crew: 0</a:t>
+                      </a:r>
+                    </a:p>
+                  </a:txBody>
+                  <a:tcPr anchor="ctr">
+                    <a:lnL w="12700" cap="flat" cmpd="sng" algn="ctr">
+                      <a:solidFill>
+                        <a:schemeClr val="tx1"/>
+                      </a:solidFill>
+                      <a:prstDash val="solid"/>
+                      <a:round/>
+                      <a:headEnd type="none" w="med" len="med"/>
+                      <a:tailEnd type="none" w="med" len="med"/>
+                    </a:lnL>
+                    <a:lnR w="12700" cap="flat" cmpd="sng" algn="ctr">
+                      <a:solidFill>
+                        <a:schemeClr val="tx1"/>
+                      </a:solidFill>
+                      <a:prstDash val="solid"/>
+                      <a:round/>
+                      <a:headEnd type="none" w="med" len="med"/>
+                      <a:tailEnd type="none" w="med" len="med"/>
+                    </a:lnR>
+                    <a:lnT w="12700" cap="flat" cmpd="sng" algn="ctr">
+                      <a:solidFill>
+                        <a:schemeClr val="tx1"/>
+                      </a:solidFill>
+                      <a:prstDash val="solid"/>
+                      <a:round/>
+                      <a:headEnd type="none" w="med" len="med"/>
+                      <a:tailEnd type="none" w="med" len="med"/>
+                    </a:lnT>
+                    <a:lnB w="12700" cap="flat" cmpd="sng" algn="ctr">
+                      <a:solidFill>
+                        <a:schemeClr val="tx1"/>
+                      </a:solidFill>
+                      <a:prstDash val="solid"/>
+                      <a:round/>
+                      <a:headEnd type="none" w="med" len="med"/>
+                      <a:tailEnd type="none" w="med" len="med"/>
+                    </a:lnB>
+                  </a:tcPr>
+                </a:tc>
+                <a:extLst>
+                  <a:ext uri="{0D108BD9-81ED-4DB2-BD59-A6C34878D82A}">
+                    <a16:rowId xmlns:a16="http://schemas.microsoft.com/office/drawing/2014/main" val="1401277977"/>
+                  </a:ext>
+                </a:extLst>
+              </a:tr>
+              <a:tr h="370840">
+                <a:tc vMerge="1">
+                  <a:txBody>
+                    <a:bodyPr/>
+                    <a:lstStyle/>
+                    <a:p>
+                      <a:endParaRPr lang="en-US" dirty="0"/>
+                    </a:p>
+                  </a:txBody>
+                  <a:tcPr/>
+                </a:tc>
+                <a:tc vMerge="1">
+                  <a:txBody>
+                    <a:bodyPr/>
+                    <a:lstStyle/>
+                    <a:p>
+                      <a:endParaRPr lang="en-US" dirty="0"/>
+                    </a:p>
+                  </a:txBody>
+                  <a:tcPr/>
+                </a:tc>
+                <a:tc>
+                  <a:txBody>
+                    <a:bodyPr/>
+                    <a:lstStyle/>
+                    <a:p>
+                      <a:pPr algn="ctr"/>
+                      <a:r>
+                        <a:rPr lang="en-US" dirty="0"/>
+                        <a:t>Pass: 0</a:t>
+                      </a:r>
+                    </a:p>
+                  </a:txBody>
+                  <a:tcPr anchor="ctr">
+                    <a:lnL w="12700" cap="flat" cmpd="sng" algn="ctr">
+                      <a:solidFill>
+                        <a:schemeClr val="tx1"/>
+                      </a:solidFill>
+                      <a:prstDash val="solid"/>
+                      <a:round/>
+                      <a:headEnd type="none" w="med" len="med"/>
+                      <a:tailEnd type="none" w="med" len="med"/>
+                    </a:lnL>
+                    <a:lnR w="12700" cap="flat" cmpd="sng" algn="ctr">
+                      <a:solidFill>
+                        <a:schemeClr val="tx1"/>
+                      </a:solidFill>
+                      <a:prstDash val="solid"/>
+                      <a:round/>
+                      <a:headEnd type="none" w="med" len="med"/>
+                      <a:tailEnd type="none" w="med" len="med"/>
+                    </a:lnR>
+                    <a:lnT w="12700" cap="flat" cmpd="sng" algn="ctr">
+                      <a:solidFill>
+                        <a:schemeClr val="tx1"/>
+                      </a:solidFill>
+                      <a:prstDash val="solid"/>
+                      <a:round/>
+                      <a:headEnd type="none" w="med" len="med"/>
+                      <a:tailEnd type="none" w="med" len="med"/>
+                    </a:lnT>
+                    <a:lnB w="12700" cap="flat" cmpd="sng" algn="ctr">
+                      <a:solidFill>
+                        <a:schemeClr val="tx1"/>
+                      </a:solidFill>
+                      <a:prstDash val="solid"/>
+                      <a:round/>
+                      <a:headEnd type="none" w="med" len="med"/>
+                      <a:tailEnd type="none" w="med" len="med"/>
+                    </a:lnB>
+                  </a:tcPr>
+                </a:tc>
+                <a:extLst>
+                  <a:ext uri="{0D108BD9-81ED-4DB2-BD59-A6C34878D82A}">
+                    <a16:rowId xmlns:a16="http://schemas.microsoft.com/office/drawing/2014/main" val="2592911948"/>
+                  </a:ext>
+                </a:extLst>
+              </a:tr>
+              <a:tr h="370840">
+                <a:tc rowSpan="2">
+                  <a:txBody>
+                    <a:bodyPr/>
+                    <a:lstStyle/>
+                    <a:p>
+                      <a:pPr algn="ctr"/>
+                      <a:r>
+                        <a:rPr lang="en-US" dirty="0"/>
+                        <a:t>Dark</a:t>
+                      </a:r>
+                    </a:p>
+                  </a:txBody>
+                  <a:tcPr anchor="ctr">
+                    <a:lnL w="12700" cap="flat" cmpd="sng" algn="ctr">
+                      <a:solidFill>
+                        <a:schemeClr val="tx1"/>
+                      </a:solidFill>
+                      <a:prstDash val="solid"/>
+                      <a:round/>
+                      <a:headEnd type="none" w="med" len="med"/>
+                      <a:tailEnd type="none" w="med" len="med"/>
+                    </a:lnL>
+                    <a:lnR w="12700" cap="flat" cmpd="sng" algn="ctr">
+                      <a:solidFill>
+                        <a:schemeClr val="tx1"/>
+                      </a:solidFill>
+                      <a:prstDash val="solid"/>
+                      <a:round/>
+                      <a:headEnd type="none" w="med" len="med"/>
+                      <a:tailEnd type="none" w="med" len="med"/>
+                    </a:lnR>
+                    <a:lnT w="12700" cap="flat" cmpd="sng" algn="ctr">
+                      <a:solidFill>
+                        <a:schemeClr val="tx1"/>
+                      </a:solidFill>
+                      <a:prstDash val="solid"/>
+                      <a:round/>
+                      <a:headEnd type="none" w="med" len="med"/>
+                      <a:tailEnd type="none" w="med" len="med"/>
+                    </a:lnT>
+                    <a:lnB w="12700" cap="flat" cmpd="sng" algn="ctr">
+                      <a:solidFill>
+                        <a:schemeClr val="tx1"/>
+                      </a:solidFill>
+                      <a:prstDash val="solid"/>
+                      <a:round/>
+                      <a:headEnd type="none" w="med" len="med"/>
+                      <a:tailEnd type="none" w="med" len="med"/>
+                    </a:lnB>
+                  </a:tcPr>
+                </a:tc>
+                <a:tc rowSpan="2">
+                  <a:txBody>
+                    <a:bodyPr/>
+                    <a:lstStyle/>
+                    <a:p>
+                      <a:pPr algn="ctr"/>
+                      <a:r>
+                        <a:rPr lang="en-US" dirty="0"/>
+                        <a:t>Boeing</a:t>
+                      </a:r>
+                    </a:p>
+                  </a:txBody>
+                  <a:tcPr anchor="ctr">
+                    <a:lnL w="12700" cap="flat" cmpd="sng" algn="ctr">
+                      <a:solidFill>
+                        <a:schemeClr val="tx1"/>
+                      </a:solidFill>
+                      <a:prstDash val="solid"/>
+                      <a:round/>
+                      <a:headEnd type="none" w="med" len="med"/>
+                      <a:tailEnd type="none" w="med" len="med"/>
+                    </a:lnL>
+                    <a:lnR w="12700" cap="flat" cmpd="sng" algn="ctr">
+                      <a:solidFill>
+                        <a:schemeClr val="tx1"/>
+                      </a:solidFill>
+                      <a:prstDash val="solid"/>
+                      <a:round/>
+                      <a:headEnd type="none" w="med" len="med"/>
+                      <a:tailEnd type="none" w="med" len="med"/>
+                    </a:lnR>
+                    <a:lnT w="12700" cap="flat" cmpd="sng" algn="ctr">
+                      <a:solidFill>
+                        <a:schemeClr val="tx1"/>
+                      </a:solidFill>
+                      <a:prstDash val="solid"/>
+                      <a:round/>
+                      <a:headEnd type="none" w="med" len="med"/>
+                      <a:tailEnd type="none" w="med" len="med"/>
+                    </a:lnT>
+                    <a:lnB w="12700" cap="flat" cmpd="sng" algn="ctr">
+                      <a:solidFill>
+                        <a:schemeClr val="tx1"/>
+                      </a:solidFill>
+                      <a:prstDash val="solid"/>
+                      <a:round/>
+                      <a:headEnd type="none" w="med" len="med"/>
+                      <a:tailEnd type="none" w="med" len="med"/>
+                    </a:lnB>
+                  </a:tcPr>
+                </a:tc>
+                <a:tc>
+                  <a:txBody>
+                    <a:bodyPr/>
+                    <a:lstStyle/>
+                    <a:p>
+                      <a:pPr algn="ctr"/>
+                      <a:r>
+                        <a:rPr lang="en-US" dirty="0"/>
+                        <a:t>Crew: 1</a:t>
+                      </a:r>
+                    </a:p>
+                  </a:txBody>
+                  <a:tcPr anchor="ctr">
+                    <a:lnL w="12700" cap="flat" cmpd="sng" algn="ctr">
+                      <a:solidFill>
+                        <a:schemeClr val="tx1"/>
+                      </a:solidFill>
+                      <a:prstDash val="solid"/>
+                      <a:round/>
+                      <a:headEnd type="none" w="med" len="med"/>
+                      <a:tailEnd type="none" w="med" len="med"/>
+                    </a:lnL>
+                    <a:lnR w="12700" cap="flat" cmpd="sng" algn="ctr">
+                      <a:solidFill>
+                        <a:schemeClr val="tx1"/>
+                      </a:solidFill>
+                      <a:prstDash val="solid"/>
+                      <a:round/>
+                      <a:headEnd type="none" w="med" len="med"/>
+                      <a:tailEnd type="none" w="med" len="med"/>
+                    </a:lnR>
+                    <a:lnT w="12700" cap="flat" cmpd="sng" algn="ctr">
+                      <a:solidFill>
+                        <a:schemeClr val="tx1"/>
+                      </a:solidFill>
+                      <a:prstDash val="solid"/>
+                      <a:round/>
+                      <a:headEnd type="none" w="med" len="med"/>
+                      <a:tailEnd type="none" w="med" len="med"/>
+                    </a:lnT>
+                    <a:lnB w="12700" cap="flat" cmpd="sng" algn="ctr">
+                      <a:solidFill>
+                        <a:schemeClr val="tx1"/>
+                      </a:solidFill>
+                      <a:prstDash val="solid"/>
+                      <a:round/>
+                      <a:headEnd type="none" w="med" len="med"/>
+                      <a:tailEnd type="none" w="med" len="med"/>
+                    </a:lnB>
+                  </a:tcPr>
+                </a:tc>
+                <a:extLst>
+                  <a:ext uri="{0D108BD9-81ED-4DB2-BD59-A6C34878D82A}">
+                    <a16:rowId xmlns:a16="http://schemas.microsoft.com/office/drawing/2014/main" val="166084119"/>
+                  </a:ext>
+                </a:extLst>
+              </a:tr>
+              <a:tr h="370840">
+                <a:tc vMerge="1">
+                  <a:txBody>
+                    <a:bodyPr/>
+                    <a:lstStyle/>
+                    <a:p>
+                      <a:endParaRPr lang="en-US" dirty="0"/>
+                    </a:p>
+                  </a:txBody>
+                  <a:tcPr/>
+                </a:tc>
+                <a:tc vMerge="1">
+                  <a:txBody>
+                    <a:bodyPr/>
+                    <a:lstStyle/>
+                    <a:p>
+                      <a:endParaRPr lang="en-US" dirty="0"/>
+                    </a:p>
+                  </a:txBody>
+                  <a:tcPr/>
+                </a:tc>
+                <a:tc>
+                  <a:txBody>
+                    <a:bodyPr/>
+                    <a:lstStyle/>
+                    <a:p>
+                      <a:pPr algn="ctr"/>
+                      <a:r>
+                        <a:rPr lang="en-US" dirty="0"/>
+                        <a:t>Pass: 4</a:t>
+                      </a:r>
+                    </a:p>
+                  </a:txBody>
+                  <a:tcPr anchor="ctr">
+                    <a:lnL w="12700" cap="flat" cmpd="sng" algn="ctr">
+                      <a:solidFill>
+                        <a:schemeClr val="tx1"/>
+                      </a:solidFill>
+                      <a:prstDash val="solid"/>
+                      <a:round/>
+                      <a:headEnd type="none" w="med" len="med"/>
+                      <a:tailEnd type="none" w="med" len="med"/>
+                    </a:lnL>
+                    <a:lnR w="12700" cap="flat" cmpd="sng" algn="ctr">
+                      <a:solidFill>
+                        <a:schemeClr val="tx1"/>
+                      </a:solidFill>
+                      <a:prstDash val="solid"/>
+                      <a:round/>
+                      <a:headEnd type="none" w="med" len="med"/>
+                      <a:tailEnd type="none" w="med" len="med"/>
+                    </a:lnR>
+                    <a:lnT w="12700" cap="flat" cmpd="sng" algn="ctr">
+                      <a:solidFill>
+                        <a:schemeClr val="tx1"/>
+                      </a:solidFill>
+                      <a:prstDash val="solid"/>
+                      <a:round/>
+                      <a:headEnd type="none" w="med" len="med"/>
+                      <a:tailEnd type="none" w="med" len="med"/>
+                    </a:lnT>
+                    <a:lnB w="12700" cap="flat" cmpd="sng" algn="ctr">
+                      <a:solidFill>
+                        <a:schemeClr val="tx1"/>
+                      </a:solidFill>
+                      <a:prstDash val="solid"/>
+                      <a:round/>
+                      <a:headEnd type="none" w="med" len="med"/>
+                      <a:tailEnd type="none" w="med" len="med"/>
+                    </a:lnB>
+                  </a:tcPr>
+                </a:tc>
+                <a:extLst>
+                  <a:ext uri="{0D108BD9-81ED-4DB2-BD59-A6C34878D82A}">
+                    <a16:rowId xmlns:a16="http://schemas.microsoft.com/office/drawing/2014/main" val="3547454354"/>
+                  </a:ext>
+                </a:extLst>
+              </a:tr>
+              <a:tr h="370840">
+                <a:tc rowSpan="4">
+                  <a:txBody>
+                    <a:bodyPr/>
+                    <a:lstStyle/>
+                    <a:p>
+                      <a:pPr algn="ctr"/>
+                      <a:r>
+                        <a:rPr lang="en-US" dirty="0"/>
+                        <a:t>Dark</a:t>
+                      </a:r>
+                    </a:p>
+                  </a:txBody>
+                  <a:tcPr anchor="ctr">
+                    <a:lnL w="12700" cap="flat" cmpd="sng" algn="ctr">
+                      <a:solidFill>
+                        <a:schemeClr val="tx1"/>
+                      </a:solidFill>
+                      <a:prstDash val="solid"/>
+                      <a:round/>
+                      <a:headEnd type="none" w="med" len="med"/>
+                      <a:tailEnd type="none" w="med" len="med"/>
+                    </a:lnL>
+                    <a:lnR w="12700" cap="flat" cmpd="sng" algn="ctr">
+                      <a:solidFill>
+                        <a:schemeClr val="tx1"/>
+                      </a:solidFill>
+                      <a:prstDash val="solid"/>
+                      <a:round/>
+                      <a:headEnd type="none" w="med" len="med"/>
+                      <a:tailEnd type="none" w="med" len="med"/>
+                    </a:lnR>
+                    <a:lnT w="12700" cap="flat" cmpd="sng" algn="ctr">
+                      <a:solidFill>
+                        <a:schemeClr val="tx1"/>
+                      </a:solidFill>
+                      <a:prstDash val="solid"/>
+                      <a:round/>
+                      <a:headEnd type="none" w="med" len="med"/>
+                      <a:tailEnd type="none" w="med" len="med"/>
+                    </a:lnT>
+                    <a:lnB w="12700" cap="flat" cmpd="sng" algn="ctr">
+                      <a:solidFill>
+                        <a:schemeClr val="tx1"/>
+                      </a:solidFill>
+                      <a:prstDash val="solid"/>
+                      <a:round/>
+                      <a:headEnd type="none" w="med" len="med"/>
+                      <a:tailEnd type="none" w="med" len="med"/>
+                    </a:lnB>
+                  </a:tcPr>
+                </a:tc>
+                <a:tc rowSpan="2">
+                  <a:txBody>
+                    <a:bodyPr/>
+                    <a:lstStyle/>
+                    <a:p>
+                      <a:pPr algn="ctr"/>
+                      <a:r>
+                        <a:rPr lang="en-US" dirty="0"/>
+                        <a:t>Cessna</a:t>
+                      </a:r>
+                    </a:p>
+                  </a:txBody>
+                  <a:tcPr anchor="ctr">
+                    <a:lnL w="12700" cap="flat" cmpd="sng" algn="ctr">
+                      <a:solidFill>
+                        <a:schemeClr val="tx1"/>
+                      </a:solidFill>
+                      <a:prstDash val="solid"/>
+                      <a:round/>
+                      <a:headEnd type="none" w="med" len="med"/>
+                      <a:tailEnd type="none" w="med" len="med"/>
+                    </a:lnL>
+                    <a:lnR w="12700" cap="flat" cmpd="sng" algn="ctr">
+                      <a:solidFill>
+                        <a:schemeClr val="tx1"/>
+                      </a:solidFill>
+                      <a:prstDash val="solid"/>
+                      <a:round/>
+                      <a:headEnd type="none" w="med" len="med"/>
+                      <a:tailEnd type="none" w="med" len="med"/>
+                    </a:lnR>
+                    <a:lnT w="12700" cap="flat" cmpd="sng" algn="ctr">
+                      <a:solidFill>
+                        <a:schemeClr val="tx1"/>
+                      </a:solidFill>
+                      <a:prstDash val="solid"/>
+                      <a:round/>
+                      <a:headEnd type="none" w="med" len="med"/>
+                      <a:tailEnd type="none" w="med" len="med"/>
+                    </a:lnT>
+                    <a:lnB w="12700" cap="flat" cmpd="sng" algn="ctr">
+                      <a:solidFill>
+                        <a:schemeClr val="tx1"/>
+                      </a:solidFill>
+                      <a:prstDash val="solid"/>
+                      <a:round/>
+                      <a:headEnd type="none" w="med" len="med"/>
+                      <a:tailEnd type="none" w="med" len="med"/>
+                    </a:lnB>
+                  </a:tcPr>
+                </a:tc>
+                <a:tc>
+                  <a:txBody>
+                    <a:bodyPr/>
+                    <a:lstStyle/>
+                    <a:p>
+                      <a:pPr algn="ctr"/>
+                      <a:r>
+                        <a:rPr lang="en-US" dirty="0"/>
+                        <a:t>Crew: 2</a:t>
+                      </a:r>
+                    </a:p>
+                  </a:txBody>
+                  <a:tcPr anchor="ctr">
+                    <a:lnL w="12700" cap="flat" cmpd="sng" algn="ctr">
+                      <a:solidFill>
+                        <a:schemeClr val="tx1"/>
+                      </a:solidFill>
+                      <a:prstDash val="solid"/>
+                      <a:round/>
+                      <a:headEnd type="none" w="med" len="med"/>
+                      <a:tailEnd type="none" w="med" len="med"/>
+                    </a:lnL>
+                    <a:lnR w="12700" cap="flat" cmpd="sng" algn="ctr">
+                      <a:solidFill>
+                        <a:schemeClr val="tx1"/>
+                      </a:solidFill>
+                      <a:prstDash val="solid"/>
+                      <a:round/>
+                      <a:headEnd type="none" w="med" len="med"/>
+                      <a:tailEnd type="none" w="med" len="med"/>
+                    </a:lnR>
+                    <a:lnT w="12700" cap="flat" cmpd="sng" algn="ctr">
+                      <a:solidFill>
+                        <a:schemeClr val="tx1"/>
+                      </a:solidFill>
+                      <a:prstDash val="solid"/>
+                      <a:round/>
+                      <a:headEnd type="none" w="med" len="med"/>
+                      <a:tailEnd type="none" w="med" len="med"/>
+                    </a:lnT>
+                    <a:lnB w="12700" cap="flat" cmpd="sng" algn="ctr">
+                      <a:solidFill>
+                        <a:schemeClr val="tx1"/>
+                      </a:solidFill>
+                      <a:prstDash val="solid"/>
+                      <a:round/>
+                      <a:headEnd type="none" w="med" len="med"/>
+                      <a:tailEnd type="none" w="med" len="med"/>
+                    </a:lnB>
+                  </a:tcPr>
+                </a:tc>
+                <a:extLst>
+                  <a:ext uri="{0D108BD9-81ED-4DB2-BD59-A6C34878D82A}">
+                    <a16:rowId xmlns:a16="http://schemas.microsoft.com/office/drawing/2014/main" val="1332413251"/>
+                  </a:ext>
+                </a:extLst>
+              </a:tr>
+              <a:tr h="370840">
+                <a:tc vMerge="1">
+                  <a:txBody>
+                    <a:bodyPr/>
+                    <a:lstStyle/>
+                    <a:p>
+                      <a:endParaRPr lang="en-US" dirty="0"/>
+                    </a:p>
+                  </a:txBody>
+                  <a:tcPr/>
+                </a:tc>
+                <a:tc vMerge="1">
+                  <a:txBody>
+                    <a:bodyPr/>
+                    <a:lstStyle/>
+                    <a:p>
+                      <a:endParaRPr lang="en-US" dirty="0"/>
+                    </a:p>
+                  </a:txBody>
+                  <a:tcPr/>
+                </a:tc>
+                <a:tc>
+                  <a:txBody>
+                    <a:bodyPr/>
+                    <a:lstStyle/>
+                    <a:p>
+                      <a:pPr algn="ctr"/>
+                      <a:r>
+                        <a:rPr lang="en-US" dirty="0"/>
+                        <a:t>Pass: 0</a:t>
+                      </a:r>
+                    </a:p>
+                  </a:txBody>
+                  <a:tcPr anchor="ctr">
+                    <a:lnL w="12700" cap="flat" cmpd="sng" algn="ctr">
+                      <a:solidFill>
+                        <a:schemeClr val="tx1"/>
+                      </a:solidFill>
+                      <a:prstDash val="solid"/>
+                      <a:round/>
+                      <a:headEnd type="none" w="med" len="med"/>
+                      <a:tailEnd type="none" w="med" len="med"/>
+                    </a:lnL>
+                    <a:lnR w="12700" cap="flat" cmpd="sng" algn="ctr">
+                      <a:solidFill>
+                        <a:schemeClr val="tx1"/>
+                      </a:solidFill>
+                      <a:prstDash val="solid"/>
+                      <a:round/>
+                      <a:headEnd type="none" w="med" len="med"/>
+                      <a:tailEnd type="none" w="med" len="med"/>
+                    </a:lnR>
+                    <a:lnT w="12700" cap="flat" cmpd="sng" algn="ctr">
+                      <a:solidFill>
+                        <a:schemeClr val="tx1"/>
+                      </a:solidFill>
+                      <a:prstDash val="solid"/>
+                      <a:round/>
+                      <a:headEnd type="none" w="med" len="med"/>
+                      <a:tailEnd type="none" w="med" len="med"/>
+                    </a:lnT>
+                    <a:lnB w="12700" cap="flat" cmpd="sng" algn="ctr">
+                      <a:solidFill>
+                        <a:schemeClr val="tx1"/>
+                      </a:solidFill>
+                      <a:prstDash val="solid"/>
+                      <a:round/>
+                      <a:headEnd type="none" w="med" len="med"/>
+                      <a:tailEnd type="none" w="med" len="med"/>
+                    </a:lnB>
+                  </a:tcPr>
+                </a:tc>
+                <a:extLst>
+                  <a:ext uri="{0D108BD9-81ED-4DB2-BD59-A6C34878D82A}">
+                    <a16:rowId xmlns:a16="http://schemas.microsoft.com/office/drawing/2014/main" val="1384792510"/>
+                  </a:ext>
+                </a:extLst>
+              </a:tr>
+              <a:tr h="370840">
+                <a:tc vMerge="1">
+                  <a:txBody>
+                    <a:bodyPr/>
+                    <a:lstStyle/>
+                    <a:p>
+                      <a:endParaRPr lang="en-US" dirty="0"/>
+                    </a:p>
+                  </a:txBody>
+                  <a:tcPr/>
+                </a:tc>
+                <a:tc rowSpan="2">
+                  <a:txBody>
+                    <a:bodyPr/>
+                    <a:lstStyle/>
+                    <a:p>
+                      <a:pPr algn="ctr"/>
+                      <a:r>
+                        <a:rPr lang="en-US" dirty="0"/>
+                        <a:t>Piper</a:t>
+                      </a:r>
+                    </a:p>
+                  </a:txBody>
+                  <a:tcPr anchor="ctr">
+                    <a:lnL w="12700" cap="flat" cmpd="sng" algn="ctr">
+                      <a:solidFill>
+                        <a:schemeClr val="tx1"/>
+                      </a:solidFill>
+                      <a:prstDash val="solid"/>
+                      <a:round/>
+                      <a:headEnd type="none" w="med" len="med"/>
+                      <a:tailEnd type="none" w="med" len="med"/>
+                    </a:lnL>
+                    <a:lnR w="12700" cap="flat" cmpd="sng" algn="ctr">
+                      <a:solidFill>
+                        <a:schemeClr val="tx1"/>
+                      </a:solidFill>
+                      <a:prstDash val="solid"/>
+                      <a:round/>
+                      <a:headEnd type="none" w="med" len="med"/>
+                      <a:tailEnd type="none" w="med" len="med"/>
+                    </a:lnR>
+                    <a:lnT w="12700" cap="flat" cmpd="sng" algn="ctr">
+                      <a:solidFill>
+                        <a:schemeClr val="tx1"/>
+                      </a:solidFill>
+                      <a:prstDash val="solid"/>
+                      <a:round/>
+                      <a:headEnd type="none" w="med" len="med"/>
+                      <a:tailEnd type="none" w="med" len="med"/>
+                    </a:lnT>
+                    <a:lnB w="12700" cap="flat" cmpd="sng" algn="ctr">
+                      <a:solidFill>
+                        <a:schemeClr val="tx1"/>
+                      </a:solidFill>
+                      <a:prstDash val="solid"/>
+                      <a:round/>
+                      <a:headEnd type="none" w="med" len="med"/>
+                      <a:tailEnd type="none" w="med" len="med"/>
+                    </a:lnB>
+                  </a:tcPr>
+                </a:tc>
+                <a:tc>
+                  <a:txBody>
+                    <a:bodyPr/>
+                    <a:lstStyle/>
+                    <a:p>
+                      <a:pPr algn="ctr"/>
+                      <a:r>
+                        <a:rPr lang="en-US" dirty="0"/>
+                        <a:t>Crew: 0</a:t>
+                      </a:r>
+                    </a:p>
+                  </a:txBody>
+                  <a:tcPr anchor="ctr">
+                    <a:lnL w="12700" cap="flat" cmpd="sng" algn="ctr">
+                      <a:solidFill>
+                        <a:schemeClr val="tx1"/>
+                      </a:solidFill>
+                      <a:prstDash val="solid"/>
+                      <a:round/>
+                      <a:headEnd type="none" w="med" len="med"/>
+                      <a:tailEnd type="none" w="med" len="med"/>
+                    </a:lnL>
+                    <a:lnR w="12700" cap="flat" cmpd="sng" algn="ctr">
+                      <a:solidFill>
+                        <a:schemeClr val="tx1"/>
+                      </a:solidFill>
+                      <a:prstDash val="solid"/>
+                      <a:round/>
+                      <a:headEnd type="none" w="med" len="med"/>
+                      <a:tailEnd type="none" w="med" len="med"/>
+                    </a:lnR>
+                    <a:lnT w="12700" cap="flat" cmpd="sng" algn="ctr">
+                      <a:solidFill>
+                        <a:schemeClr val="tx1"/>
+                      </a:solidFill>
+                      <a:prstDash val="solid"/>
+                      <a:round/>
+                      <a:headEnd type="none" w="med" len="med"/>
+                      <a:tailEnd type="none" w="med" len="med"/>
+                    </a:lnT>
+                    <a:lnB w="12700" cap="flat" cmpd="sng" algn="ctr">
+                      <a:solidFill>
+                        <a:schemeClr val="tx1"/>
+                      </a:solidFill>
+                      <a:prstDash val="solid"/>
+                      <a:round/>
+                      <a:headEnd type="none" w="med" len="med"/>
+                      <a:tailEnd type="none" w="med" len="med"/>
+                    </a:lnB>
+                  </a:tcPr>
+                </a:tc>
+                <a:extLst>
+                  <a:ext uri="{0D108BD9-81ED-4DB2-BD59-A6C34878D82A}">
+                    <a16:rowId xmlns:a16="http://schemas.microsoft.com/office/drawing/2014/main" val="635592282"/>
+                  </a:ext>
+                </a:extLst>
+              </a:tr>
+              <a:tr h="370840">
+                <a:tc vMerge="1">
+                  <a:txBody>
+                    <a:bodyPr/>
+                    <a:lstStyle/>
+                    <a:p>
+                      <a:endParaRPr lang="en-US" dirty="0"/>
+                    </a:p>
+                  </a:txBody>
+                  <a:tcPr/>
+                </a:tc>
+                <a:tc vMerge="1">
+                  <a:txBody>
+                    <a:bodyPr/>
+                    <a:lstStyle/>
+                    <a:p>
+                      <a:endParaRPr lang="en-US" dirty="0"/>
+                    </a:p>
+                  </a:txBody>
+                  <a:tcPr/>
+                </a:tc>
+                <a:tc>
+                  <a:txBody>
+                    <a:bodyPr/>
+                    <a:lstStyle/>
+                    <a:p>
+                      <a:pPr algn="ctr"/>
+                      <a:r>
+                        <a:rPr lang="en-US" dirty="0"/>
+                        <a:t>Pass: 0</a:t>
+                      </a:r>
+                    </a:p>
+                  </a:txBody>
+                  <a:tcPr anchor="ctr">
+                    <a:lnL w="12700" cap="flat" cmpd="sng" algn="ctr">
+                      <a:solidFill>
+                        <a:schemeClr val="tx1"/>
+                      </a:solidFill>
+                      <a:prstDash val="solid"/>
+                      <a:round/>
+                      <a:headEnd type="none" w="med" len="med"/>
+                      <a:tailEnd type="none" w="med" len="med"/>
+                    </a:lnL>
+                    <a:lnR w="12700" cap="flat" cmpd="sng" algn="ctr">
+                      <a:solidFill>
+                        <a:schemeClr val="tx1"/>
+                      </a:solidFill>
+                      <a:prstDash val="solid"/>
+                      <a:round/>
+                      <a:headEnd type="none" w="med" len="med"/>
+                      <a:tailEnd type="none" w="med" len="med"/>
+                    </a:lnR>
+                    <a:lnT w="12700" cap="flat" cmpd="sng" algn="ctr">
+                      <a:solidFill>
+                        <a:schemeClr val="tx1"/>
+                      </a:solidFill>
+                      <a:prstDash val="solid"/>
+                      <a:round/>
+                      <a:headEnd type="none" w="med" len="med"/>
+                      <a:tailEnd type="none" w="med" len="med"/>
+                    </a:lnT>
+                    <a:lnB w="12700" cap="flat" cmpd="sng" algn="ctr">
+                      <a:solidFill>
+                        <a:schemeClr val="tx1"/>
+                      </a:solidFill>
+                      <a:prstDash val="solid"/>
+                      <a:round/>
+                      <a:headEnd type="none" w="med" len="med"/>
+                      <a:tailEnd type="none" w="med" len="med"/>
+                    </a:lnB>
+                  </a:tcPr>
+                </a:tc>
+                <a:extLst>
+                  <a:ext uri="{0D108BD9-81ED-4DB2-BD59-A6C34878D82A}">
+                    <a16:rowId xmlns:a16="http://schemas.microsoft.com/office/drawing/2014/main" val="3308920992"/>
+                  </a:ext>
+                </a:extLst>
+              </a:tr>
+            </a:tbl>
+          </a:graphicData>
+        </a:graphic>
+      </p:graphicFrame>
+      <p:graphicFrame>
+        <p:nvGraphicFramePr>
+          <p:cNvPr id="5" name="Content Placeholder 3">
+            <a:extLst>
+              <a:ext uri="{FF2B5EF4-FFF2-40B4-BE49-F238E27FC236}">
+                <a16:creationId xmlns:a16="http://schemas.microsoft.com/office/drawing/2014/main" id="{91A02AA4-4E54-07AE-BADC-86040295734D}"/>
+              </a:ext>
+            </a:extLst>
+          </p:cNvPr>
+          <p:cNvGraphicFramePr>
+            <a:graphicFrameLocks/>
+          </p:cNvGraphicFramePr>
+          <p:nvPr>
+            <p:extLst>
+              <p:ext uri="{D42A27DB-BD31-4B8C-83A1-F6EECF244321}">
+                <p14:modId xmlns:p14="http://schemas.microsoft.com/office/powerpoint/2010/main" val="2090196200"/>
+              </p:ext>
+            </p:extLst>
+          </p:nvPr>
+        </p:nvGraphicFramePr>
+        <p:xfrm>
+          <a:off x="6680888" y="2344608"/>
+          <a:ext cx="4957117" cy="3337560"/>
+        </p:xfrm>
+        <a:graphic>
+          <a:graphicData uri="http://schemas.openxmlformats.org/drawingml/2006/table">
+            <a:tbl>
+              <a:tblPr firstRow="1">
+                <a:tableStyleId>{5C22544A-7EE6-4342-B048-85BDC9FD1C3A}</a:tableStyleId>
+              </a:tblPr>
+              <a:tblGrid>
+                <a:gridCol w="1653611">
+                  <a:extLst>
+                    <a:ext uri="{9D8B030D-6E8A-4147-A177-3AD203B41FA5}">
+                      <a16:colId xmlns:a16="http://schemas.microsoft.com/office/drawing/2014/main" val="2894027781"/>
+                    </a:ext>
+                  </a:extLst>
+                </a:gridCol>
+                <a:gridCol w="1651134">
+                  <a:extLst>
+                    <a:ext uri="{9D8B030D-6E8A-4147-A177-3AD203B41FA5}">
+                      <a16:colId xmlns:a16="http://schemas.microsoft.com/office/drawing/2014/main" val="2927323744"/>
+                    </a:ext>
+                  </a:extLst>
+                </a:gridCol>
+                <a:gridCol w="1652372">
+                  <a:extLst>
+                    <a:ext uri="{9D8B030D-6E8A-4147-A177-3AD203B41FA5}">
+                      <a16:colId xmlns:a16="http://schemas.microsoft.com/office/drawing/2014/main" val="996186078"/>
+                    </a:ext>
+                  </a:extLst>
+                </a:gridCol>
+              </a:tblGrid>
+              <a:tr h="370840">
+                <a:tc>
+                  <a:txBody>
+                    <a:bodyPr/>
+                    <a:lstStyle/>
+                    <a:p>
+                      <a:pPr algn="ctr"/>
+                      <a:r>
+                        <a:rPr lang="en-US" dirty="0"/>
+                        <a:t>Light condition</a:t>
+                      </a:r>
+                    </a:p>
+                  </a:txBody>
+                  <a:tcPr>
+                    <a:lnL w="12700" cap="flat" cmpd="sng" algn="ctr">
+                      <a:solidFill>
+                        <a:schemeClr val="tx1"/>
+                      </a:solidFill>
+                      <a:prstDash val="solid"/>
+                      <a:round/>
+                      <a:headEnd type="none" w="med" len="med"/>
+                      <a:tailEnd type="none" w="med" len="med"/>
+                    </a:lnL>
+                    <a:lnR w="12700" cap="flat" cmpd="sng" algn="ctr">
+                      <a:solidFill>
+                        <a:schemeClr val="tx1"/>
+                      </a:solidFill>
+                      <a:prstDash val="solid"/>
+                      <a:round/>
+                      <a:headEnd type="none" w="med" len="med"/>
+                      <a:tailEnd type="none" w="med" len="med"/>
+                    </a:lnR>
+                    <a:lnT w="12700" cap="flat" cmpd="sng" algn="ctr">
+                      <a:solidFill>
+                        <a:schemeClr val="tx1"/>
+                      </a:solidFill>
+                      <a:prstDash val="solid"/>
+                      <a:round/>
+                      <a:headEnd type="none" w="med" len="med"/>
+                      <a:tailEnd type="none" w="med" len="med"/>
+                    </a:lnT>
+                    <a:lnB w="12700" cap="flat" cmpd="sng" algn="ctr">
+                      <a:solidFill>
+                        <a:schemeClr val="tx1"/>
+                      </a:solidFill>
+                      <a:prstDash val="solid"/>
+                      <a:round/>
+                      <a:headEnd type="none" w="med" len="med"/>
+                      <a:tailEnd type="none" w="med" len="med"/>
+                    </a:lnB>
+                  </a:tcPr>
+                </a:tc>
+                <a:tc>
+                  <a:txBody>
+                    <a:bodyPr/>
+                    <a:lstStyle/>
+                    <a:p>
+                      <a:pPr algn="ctr"/>
+                      <a:r>
+                        <a:rPr lang="en-US" dirty="0"/>
+                        <a:t>Make</a:t>
+                      </a:r>
+                    </a:p>
+                  </a:txBody>
+                  <a:tcPr>
+                    <a:lnL w="12700" cap="flat" cmpd="sng" algn="ctr">
+                      <a:solidFill>
+                        <a:schemeClr val="tx1"/>
+                      </a:solidFill>
+                      <a:prstDash val="solid"/>
+                      <a:round/>
+                      <a:headEnd type="none" w="med" len="med"/>
+                      <a:tailEnd type="none" w="med" len="med"/>
+                    </a:lnL>
+                    <a:lnR w="12700" cap="flat" cmpd="sng" algn="ctr">
+                      <a:solidFill>
+                        <a:schemeClr val="tx1"/>
+                      </a:solidFill>
+                      <a:prstDash val="solid"/>
+                      <a:round/>
+                      <a:headEnd type="none" w="med" len="med"/>
+                      <a:tailEnd type="none" w="med" len="med"/>
+                    </a:lnR>
+                    <a:lnT w="12700" cap="flat" cmpd="sng" algn="ctr">
+                      <a:solidFill>
+                        <a:schemeClr val="tx1"/>
+                      </a:solidFill>
+                      <a:prstDash val="solid"/>
+                      <a:round/>
+                      <a:headEnd type="none" w="med" len="med"/>
+                      <a:tailEnd type="none" w="med" len="med"/>
+                    </a:lnT>
+                    <a:lnB w="12700" cap="flat" cmpd="sng" algn="ctr">
+                      <a:solidFill>
+                        <a:schemeClr val="tx1"/>
+                      </a:solidFill>
+                      <a:prstDash val="solid"/>
+                      <a:round/>
+                      <a:headEnd type="none" w="med" len="med"/>
+                      <a:tailEnd type="none" w="med" len="med"/>
+                    </a:lnB>
+                  </a:tcPr>
+                </a:tc>
+                <a:tc>
+                  <a:txBody>
+                    <a:bodyPr/>
+                    <a:lstStyle/>
+                    <a:p>
+                      <a:pPr algn="ctr"/>
+                      <a:r>
+                        <a:rPr lang="en-US" dirty="0"/>
+                        <a:t>Fatalities</a:t>
+                      </a:r>
+                    </a:p>
+                  </a:txBody>
+                  <a:tcPr>
+                    <a:lnL w="12700" cap="flat" cmpd="sng" algn="ctr">
+                      <a:solidFill>
+                        <a:schemeClr val="tx1"/>
+                      </a:solidFill>
+                      <a:prstDash val="solid"/>
+                      <a:round/>
+                      <a:headEnd type="none" w="med" len="med"/>
+                      <a:tailEnd type="none" w="med" len="med"/>
+                    </a:lnL>
+                    <a:lnR w="12700" cap="flat" cmpd="sng" algn="ctr">
+                      <a:solidFill>
+                        <a:schemeClr val="tx1"/>
+                      </a:solidFill>
+                      <a:prstDash val="solid"/>
+                      <a:round/>
+                      <a:headEnd type="none" w="med" len="med"/>
+                      <a:tailEnd type="none" w="med" len="med"/>
+                    </a:lnR>
+                    <a:lnT w="12700" cap="flat" cmpd="sng" algn="ctr">
+                      <a:solidFill>
+                        <a:schemeClr val="tx1"/>
+                      </a:solidFill>
+                      <a:prstDash val="solid"/>
+                      <a:round/>
+                      <a:headEnd type="none" w="med" len="med"/>
+                      <a:tailEnd type="none" w="med" len="med"/>
+                    </a:lnT>
+                    <a:lnB w="12700" cap="flat" cmpd="sng" algn="ctr">
+                      <a:solidFill>
+                        <a:schemeClr val="tx1"/>
+                      </a:solidFill>
+                      <a:prstDash val="solid"/>
+                      <a:round/>
+                      <a:headEnd type="none" w="med" len="med"/>
+                      <a:tailEnd type="none" w="med" len="med"/>
+                    </a:lnB>
+                  </a:tcPr>
+                </a:tc>
+                <a:extLst>
+                  <a:ext uri="{0D108BD9-81ED-4DB2-BD59-A6C34878D82A}">
+                    <a16:rowId xmlns:a16="http://schemas.microsoft.com/office/drawing/2014/main" val="3329666342"/>
+                  </a:ext>
+                </a:extLst>
+              </a:tr>
+              <a:tr h="741680">
+                <a:tc>
+                  <a:txBody>
+                    <a:bodyPr/>
+                    <a:lstStyle/>
+                    <a:p>
+                      <a:pPr algn="ctr"/>
+                      <a:r>
+                        <a:rPr lang="en-US" dirty="0"/>
+                        <a:t>Light</a:t>
+                      </a:r>
+                    </a:p>
+                  </a:txBody>
+                  <a:tcPr anchor="ctr">
+                    <a:lnL w="12700" cap="flat" cmpd="sng" algn="ctr">
+                      <a:solidFill>
+                        <a:schemeClr val="tx1"/>
+                      </a:solidFill>
+                      <a:prstDash val="solid"/>
+                      <a:round/>
+                      <a:headEnd type="none" w="med" len="med"/>
+                      <a:tailEnd type="none" w="med" len="med"/>
+                    </a:lnL>
+                    <a:lnR w="12700" cap="flat" cmpd="sng" algn="ctr">
+                      <a:solidFill>
+                        <a:schemeClr val="tx1"/>
+                      </a:solidFill>
+                      <a:prstDash val="solid"/>
+                      <a:round/>
+                      <a:headEnd type="none" w="med" len="med"/>
+                      <a:tailEnd type="none" w="med" len="med"/>
+                    </a:lnR>
+                    <a:lnT w="12700" cap="flat" cmpd="sng" algn="ctr">
+                      <a:solidFill>
+                        <a:schemeClr val="tx1"/>
+                      </a:solidFill>
+                      <a:prstDash val="solid"/>
+                      <a:round/>
+                      <a:headEnd type="none" w="med" len="med"/>
+                      <a:tailEnd type="none" w="med" len="med"/>
+                    </a:lnT>
+                    <a:lnB w="12700" cap="flat" cmpd="sng" algn="ctr">
+                      <a:solidFill>
+                        <a:schemeClr val="tx1"/>
+                      </a:solidFill>
+                      <a:prstDash val="solid"/>
+                      <a:round/>
+                      <a:headEnd type="none" w="med" len="med"/>
+                      <a:tailEnd type="none" w="med" len="med"/>
+                    </a:lnB>
+                  </a:tcPr>
+                </a:tc>
+                <a:tc>
+                  <a:txBody>
+                    <a:bodyPr/>
+                    <a:lstStyle/>
+                    <a:p>
+                      <a:pPr algn="ctr"/>
+                      <a:r>
+                        <a:rPr lang="en-US" dirty="0"/>
+                        <a:t>Cessna</a:t>
+                      </a:r>
+                    </a:p>
+                  </a:txBody>
+                  <a:tcPr anchor="ctr">
+                    <a:lnL w="12700" cap="flat" cmpd="sng" algn="ctr">
+                      <a:solidFill>
+                        <a:schemeClr val="tx1"/>
+                      </a:solidFill>
+                      <a:prstDash val="solid"/>
+                      <a:round/>
+                      <a:headEnd type="none" w="med" len="med"/>
+                      <a:tailEnd type="none" w="med" len="med"/>
+                    </a:lnL>
+                    <a:lnR w="12700" cap="flat" cmpd="sng" algn="ctr">
+                      <a:solidFill>
+                        <a:schemeClr val="tx1"/>
+                      </a:solidFill>
+                      <a:prstDash val="solid"/>
+                      <a:round/>
+                      <a:headEnd type="none" w="med" len="med"/>
+                      <a:tailEnd type="none" w="med" len="med"/>
+                    </a:lnR>
+                    <a:lnT w="12700" cap="flat" cmpd="sng" algn="ctr">
+                      <a:solidFill>
+                        <a:schemeClr val="tx1"/>
+                      </a:solidFill>
+                      <a:prstDash val="solid"/>
+                      <a:round/>
+                      <a:headEnd type="none" w="med" len="med"/>
+                      <a:tailEnd type="none" w="med" len="med"/>
+                    </a:lnT>
+                    <a:lnB w="12700" cap="flat" cmpd="sng" algn="ctr">
+                      <a:solidFill>
+                        <a:schemeClr val="tx1"/>
+                      </a:solidFill>
+                      <a:prstDash val="solid"/>
+                      <a:round/>
+                      <a:headEnd type="none" w="med" len="med"/>
+                      <a:tailEnd type="none" w="med" len="med"/>
+                    </a:lnB>
+                  </a:tcPr>
+                </a:tc>
+                <a:tc>
+                  <a:txBody>
+                    <a:bodyPr/>
+                    <a:lstStyle/>
+                    <a:p>
+                      <a:pPr algn="ctr"/>
+                      <a:r>
+                        <a:rPr lang="en-US" dirty="0"/>
+                        <a:t>0</a:t>
+                      </a:r>
+                    </a:p>
+                  </a:txBody>
+                  <a:tcPr anchor="ctr">
+                    <a:lnL w="12700" cap="flat" cmpd="sng" algn="ctr">
+                      <a:solidFill>
+                        <a:schemeClr val="tx1"/>
+                      </a:solidFill>
+                      <a:prstDash val="solid"/>
+                      <a:round/>
+                      <a:headEnd type="none" w="med" len="med"/>
+                      <a:tailEnd type="none" w="med" len="med"/>
+                    </a:lnL>
+                    <a:lnR w="12700" cap="flat" cmpd="sng" algn="ctr">
+                      <a:solidFill>
+                        <a:schemeClr val="tx1"/>
+                      </a:solidFill>
+                      <a:prstDash val="solid"/>
+                      <a:round/>
+                      <a:headEnd type="none" w="med" len="med"/>
+                      <a:tailEnd type="none" w="med" len="med"/>
+                    </a:lnR>
+                    <a:lnT w="12700" cap="flat" cmpd="sng" algn="ctr">
+                      <a:solidFill>
+                        <a:schemeClr val="tx1"/>
+                      </a:solidFill>
+                      <a:prstDash val="solid"/>
+                      <a:round/>
+                      <a:headEnd type="none" w="med" len="med"/>
+                      <a:tailEnd type="none" w="med" len="med"/>
+                    </a:lnT>
+                    <a:lnB w="12700" cap="flat" cmpd="sng" algn="ctr">
+                      <a:solidFill>
+                        <a:schemeClr val="tx1"/>
+                      </a:solidFill>
+                      <a:prstDash val="solid"/>
+                      <a:round/>
+                      <a:headEnd type="none" w="med" len="med"/>
+                      <a:tailEnd type="none" w="med" len="med"/>
+                    </a:lnB>
+                  </a:tcPr>
+                </a:tc>
+                <a:extLst>
+                  <a:ext uri="{0D108BD9-81ED-4DB2-BD59-A6C34878D82A}">
+                    <a16:rowId xmlns:a16="http://schemas.microsoft.com/office/drawing/2014/main" val="1401277977"/>
+                  </a:ext>
+                </a:extLst>
+              </a:tr>
+              <a:tr h="741680">
+                <a:tc>
+                  <a:txBody>
+                    <a:bodyPr/>
+                    <a:lstStyle/>
+                    <a:p>
+                      <a:pPr algn="ctr"/>
+                      <a:r>
+                        <a:rPr lang="en-US" dirty="0"/>
+                        <a:t>Dark</a:t>
+                      </a:r>
+                    </a:p>
+                  </a:txBody>
+                  <a:tcPr anchor="ctr">
+                    <a:lnL w="12700" cap="flat" cmpd="sng" algn="ctr">
+                      <a:solidFill>
+                        <a:schemeClr val="tx1"/>
+                      </a:solidFill>
+                      <a:prstDash val="solid"/>
+                      <a:round/>
+                      <a:headEnd type="none" w="med" len="med"/>
+                      <a:tailEnd type="none" w="med" len="med"/>
+                    </a:lnL>
+                    <a:lnR w="12700" cap="flat" cmpd="sng" algn="ctr">
+                      <a:solidFill>
+                        <a:schemeClr val="tx1"/>
+                      </a:solidFill>
+                      <a:prstDash val="solid"/>
+                      <a:round/>
+                      <a:headEnd type="none" w="med" len="med"/>
+                      <a:tailEnd type="none" w="med" len="med"/>
+                    </a:lnR>
+                    <a:lnT w="12700" cap="flat" cmpd="sng" algn="ctr">
+                      <a:solidFill>
+                        <a:schemeClr val="tx1"/>
+                      </a:solidFill>
+                      <a:prstDash val="solid"/>
+                      <a:round/>
+                      <a:headEnd type="none" w="med" len="med"/>
+                      <a:tailEnd type="none" w="med" len="med"/>
+                    </a:lnT>
+                    <a:lnB w="12700" cap="flat" cmpd="sng" algn="ctr">
+                      <a:solidFill>
+                        <a:schemeClr val="tx1"/>
+                      </a:solidFill>
+                      <a:prstDash val="solid"/>
+                      <a:round/>
+                      <a:headEnd type="none" w="med" len="med"/>
+                      <a:tailEnd type="none" w="med" len="med"/>
+                    </a:lnB>
+                  </a:tcPr>
+                </a:tc>
+                <a:tc>
+                  <a:txBody>
+                    <a:bodyPr/>
+                    <a:lstStyle/>
+                    <a:p>
+                      <a:pPr algn="ctr"/>
+                      <a:r>
+                        <a:rPr lang="en-US" dirty="0"/>
+                        <a:t>Boeing</a:t>
+                      </a:r>
+                    </a:p>
+                  </a:txBody>
+                  <a:tcPr anchor="ctr">
+                    <a:lnL w="12700" cap="flat" cmpd="sng" algn="ctr">
+                      <a:solidFill>
+                        <a:schemeClr val="tx1"/>
+                      </a:solidFill>
+                      <a:prstDash val="solid"/>
+                      <a:round/>
+                      <a:headEnd type="none" w="med" len="med"/>
+                      <a:tailEnd type="none" w="med" len="med"/>
+                    </a:lnL>
+                    <a:lnR w="12700" cap="flat" cmpd="sng" algn="ctr">
+                      <a:solidFill>
+                        <a:schemeClr val="tx1"/>
+                      </a:solidFill>
+                      <a:prstDash val="solid"/>
+                      <a:round/>
+                      <a:headEnd type="none" w="med" len="med"/>
+                      <a:tailEnd type="none" w="med" len="med"/>
+                    </a:lnR>
+                    <a:lnT w="12700" cap="flat" cmpd="sng" algn="ctr">
+                      <a:solidFill>
+                        <a:schemeClr val="tx1"/>
+                      </a:solidFill>
+                      <a:prstDash val="solid"/>
+                      <a:round/>
+                      <a:headEnd type="none" w="med" len="med"/>
+                      <a:tailEnd type="none" w="med" len="med"/>
+                    </a:lnT>
+                    <a:lnB w="12700" cap="flat" cmpd="sng" algn="ctr">
+                      <a:solidFill>
+                        <a:schemeClr val="tx1"/>
+                      </a:solidFill>
+                      <a:prstDash val="solid"/>
+                      <a:round/>
+                      <a:headEnd type="none" w="med" len="med"/>
+                      <a:tailEnd type="none" w="med" len="med"/>
+                    </a:lnB>
+                  </a:tcPr>
+                </a:tc>
+                <a:tc>
+                  <a:txBody>
+                    <a:bodyPr/>
+                    <a:lstStyle/>
+                    <a:p>
+                      <a:pPr algn="ctr"/>
+                      <a:r>
+                        <a:rPr lang="en-US" dirty="0"/>
+                        <a:t>5</a:t>
+                      </a:r>
+                    </a:p>
+                  </a:txBody>
+                  <a:tcPr anchor="ctr">
+                    <a:lnL w="12700" cap="flat" cmpd="sng" algn="ctr">
+                      <a:solidFill>
+                        <a:schemeClr val="tx1"/>
+                      </a:solidFill>
+                      <a:prstDash val="solid"/>
+                      <a:round/>
+                      <a:headEnd type="none" w="med" len="med"/>
+                      <a:tailEnd type="none" w="med" len="med"/>
+                    </a:lnL>
+                    <a:lnR w="12700" cap="flat" cmpd="sng" algn="ctr">
+                      <a:solidFill>
+                        <a:schemeClr val="tx1"/>
+                      </a:solidFill>
+                      <a:prstDash val="solid"/>
+                      <a:round/>
+                      <a:headEnd type="none" w="med" len="med"/>
+                      <a:tailEnd type="none" w="med" len="med"/>
+                    </a:lnR>
+                    <a:lnT w="12700" cap="flat" cmpd="sng" algn="ctr">
+                      <a:solidFill>
+                        <a:schemeClr val="tx1"/>
+                      </a:solidFill>
+                      <a:prstDash val="solid"/>
+                      <a:round/>
+                      <a:headEnd type="none" w="med" len="med"/>
+                      <a:tailEnd type="none" w="med" len="med"/>
+                    </a:lnT>
+                    <a:lnB w="12700" cap="flat" cmpd="sng" algn="ctr">
+                      <a:solidFill>
+                        <a:schemeClr val="tx1"/>
+                      </a:solidFill>
+                      <a:prstDash val="solid"/>
+                      <a:round/>
+                      <a:headEnd type="none" w="med" len="med"/>
+                      <a:tailEnd type="none" w="med" len="med"/>
+                    </a:lnB>
+                  </a:tcPr>
+                </a:tc>
+                <a:extLst>
+                  <a:ext uri="{0D108BD9-81ED-4DB2-BD59-A6C34878D82A}">
+                    <a16:rowId xmlns:a16="http://schemas.microsoft.com/office/drawing/2014/main" val="166084119"/>
+                  </a:ext>
+                </a:extLst>
+              </a:tr>
+              <a:tr h="741680">
+                <a:tc>
+                  <a:txBody>
+                    <a:bodyPr/>
+                    <a:lstStyle/>
+                    <a:p>
+                      <a:pPr algn="ctr"/>
+                      <a:r>
+                        <a:rPr lang="en-US" dirty="0"/>
+                        <a:t>Dark</a:t>
+                      </a:r>
+                    </a:p>
+                  </a:txBody>
+                  <a:tcPr anchor="ctr">
+                    <a:lnL w="12700" cap="flat" cmpd="sng" algn="ctr">
+                      <a:solidFill>
+                        <a:schemeClr val="tx1"/>
+                      </a:solidFill>
+                      <a:prstDash val="solid"/>
+                      <a:round/>
+                      <a:headEnd type="none" w="med" len="med"/>
+                      <a:tailEnd type="none" w="med" len="med"/>
+                    </a:lnL>
+                    <a:lnR w="12700" cap="flat" cmpd="sng" algn="ctr">
+                      <a:solidFill>
+                        <a:schemeClr val="tx1"/>
+                      </a:solidFill>
+                      <a:prstDash val="solid"/>
+                      <a:round/>
+                      <a:headEnd type="none" w="med" len="med"/>
+                      <a:tailEnd type="none" w="med" len="med"/>
+                    </a:lnR>
+                    <a:lnT w="12700" cap="flat" cmpd="sng" algn="ctr">
+                      <a:solidFill>
+                        <a:schemeClr val="tx1"/>
+                      </a:solidFill>
+                      <a:prstDash val="solid"/>
+                      <a:round/>
+                      <a:headEnd type="none" w="med" len="med"/>
+                      <a:tailEnd type="none" w="med" len="med"/>
+                    </a:lnT>
+                    <a:lnB w="12700" cap="flat" cmpd="sng" algn="ctr">
+                      <a:solidFill>
+                        <a:schemeClr val="tx1"/>
+                      </a:solidFill>
+                      <a:prstDash val="solid"/>
+                      <a:round/>
+                      <a:headEnd type="none" w="med" len="med"/>
+                      <a:tailEnd type="none" w="med" len="med"/>
+                    </a:lnB>
+                  </a:tcPr>
+                </a:tc>
+                <a:tc>
+                  <a:txBody>
+                    <a:bodyPr/>
+                    <a:lstStyle/>
+                    <a:p>
+                      <a:pPr algn="ctr"/>
+                      <a:r>
+                        <a:rPr lang="en-US" dirty="0"/>
+                        <a:t>Cessna</a:t>
+                      </a:r>
+                    </a:p>
+                  </a:txBody>
+                  <a:tcPr anchor="ctr">
+                    <a:lnL w="12700" cap="flat" cmpd="sng" algn="ctr">
+                      <a:solidFill>
+                        <a:schemeClr val="tx1"/>
+                      </a:solidFill>
+                      <a:prstDash val="solid"/>
+                      <a:round/>
+                      <a:headEnd type="none" w="med" len="med"/>
+                      <a:tailEnd type="none" w="med" len="med"/>
+                    </a:lnL>
+                    <a:lnR w="12700" cap="flat" cmpd="sng" algn="ctr">
+                      <a:solidFill>
+                        <a:schemeClr val="tx1"/>
+                      </a:solidFill>
+                      <a:prstDash val="solid"/>
+                      <a:round/>
+                      <a:headEnd type="none" w="med" len="med"/>
+                      <a:tailEnd type="none" w="med" len="med"/>
+                    </a:lnR>
+                    <a:lnT w="12700" cap="flat" cmpd="sng" algn="ctr">
+                      <a:solidFill>
+                        <a:schemeClr val="tx1"/>
+                      </a:solidFill>
+                      <a:prstDash val="solid"/>
+                      <a:round/>
+                      <a:headEnd type="none" w="med" len="med"/>
+                      <a:tailEnd type="none" w="med" len="med"/>
+                    </a:lnT>
+                    <a:lnB w="12700" cap="flat" cmpd="sng" algn="ctr">
+                      <a:solidFill>
+                        <a:schemeClr val="tx1"/>
+                      </a:solidFill>
+                      <a:prstDash val="solid"/>
+                      <a:round/>
+                      <a:headEnd type="none" w="med" len="med"/>
+                      <a:tailEnd type="none" w="med" len="med"/>
+                    </a:lnB>
+                  </a:tcPr>
+                </a:tc>
+                <a:tc>
+                  <a:txBody>
+                    <a:bodyPr/>
+                    <a:lstStyle/>
+                    <a:p>
+                      <a:pPr algn="ctr"/>
+                      <a:r>
+                        <a:rPr lang="en-US" dirty="0"/>
+                        <a:t>2</a:t>
+                      </a:r>
+                    </a:p>
+                  </a:txBody>
+                  <a:tcPr anchor="ctr">
+                    <a:lnL w="12700" cap="flat" cmpd="sng" algn="ctr">
+                      <a:solidFill>
+                        <a:schemeClr val="tx1"/>
+                      </a:solidFill>
+                      <a:prstDash val="solid"/>
+                      <a:round/>
+                      <a:headEnd type="none" w="med" len="med"/>
+                      <a:tailEnd type="none" w="med" len="med"/>
+                    </a:lnL>
+                    <a:lnR w="12700" cap="flat" cmpd="sng" algn="ctr">
+                      <a:solidFill>
+                        <a:schemeClr val="tx1"/>
+                      </a:solidFill>
+                      <a:prstDash val="solid"/>
+                      <a:round/>
+                      <a:headEnd type="none" w="med" len="med"/>
+                      <a:tailEnd type="none" w="med" len="med"/>
+                    </a:lnR>
+                    <a:lnT w="12700" cap="flat" cmpd="sng" algn="ctr">
+                      <a:solidFill>
+                        <a:schemeClr val="tx1"/>
+                      </a:solidFill>
+                      <a:prstDash val="solid"/>
+                      <a:round/>
+                      <a:headEnd type="none" w="med" len="med"/>
+                      <a:tailEnd type="none" w="med" len="med"/>
+                    </a:lnT>
+                    <a:lnB w="12700" cap="flat" cmpd="sng" algn="ctr">
+                      <a:solidFill>
+                        <a:schemeClr val="tx1"/>
+                      </a:solidFill>
+                      <a:prstDash val="solid"/>
+                      <a:round/>
+                      <a:headEnd type="none" w="med" len="med"/>
+                      <a:tailEnd type="none" w="med" len="med"/>
+                    </a:lnB>
+                  </a:tcPr>
+                </a:tc>
+                <a:extLst>
+                  <a:ext uri="{0D108BD9-81ED-4DB2-BD59-A6C34878D82A}">
+                    <a16:rowId xmlns:a16="http://schemas.microsoft.com/office/drawing/2014/main" val="1332413251"/>
+                  </a:ext>
+                </a:extLst>
+              </a:tr>
+              <a:tr h="741680">
+                <a:tc>
+                  <a:txBody>
+                    <a:bodyPr/>
+                    <a:lstStyle/>
+                    <a:p>
+                      <a:pPr algn="ctr"/>
+                      <a:r>
+                        <a:rPr lang="en-US" dirty="0"/>
+                        <a:t>Dark</a:t>
+                      </a:r>
+                    </a:p>
+                  </a:txBody>
+                  <a:tcPr anchor="ctr">
+                    <a:lnL w="12700" cap="flat" cmpd="sng" algn="ctr">
+                      <a:solidFill>
+                        <a:schemeClr val="tx1"/>
+                      </a:solidFill>
+                      <a:prstDash val="solid"/>
+                      <a:round/>
+                      <a:headEnd type="none" w="med" len="med"/>
+                      <a:tailEnd type="none" w="med" len="med"/>
+                    </a:lnL>
+                    <a:lnR w="12700" cap="flat" cmpd="sng" algn="ctr">
+                      <a:solidFill>
+                        <a:schemeClr val="tx1"/>
+                      </a:solidFill>
+                      <a:prstDash val="solid"/>
+                      <a:round/>
+                      <a:headEnd type="none" w="med" len="med"/>
+                      <a:tailEnd type="none" w="med" len="med"/>
+                    </a:lnR>
+                    <a:lnT w="12700" cap="flat" cmpd="sng" algn="ctr">
+                      <a:solidFill>
+                        <a:schemeClr val="tx1"/>
+                      </a:solidFill>
+                      <a:prstDash val="solid"/>
+                      <a:round/>
+                      <a:headEnd type="none" w="med" len="med"/>
+                      <a:tailEnd type="none" w="med" len="med"/>
+                    </a:lnT>
+                    <a:lnB w="12700" cap="flat" cmpd="sng" algn="ctr">
+                      <a:solidFill>
+                        <a:schemeClr val="tx1"/>
+                      </a:solidFill>
+                      <a:prstDash val="solid"/>
+                      <a:round/>
+                      <a:headEnd type="none" w="med" len="med"/>
+                      <a:tailEnd type="none" w="med" len="med"/>
+                    </a:lnB>
+                  </a:tcPr>
+                </a:tc>
+                <a:tc>
+                  <a:txBody>
+                    <a:bodyPr/>
+                    <a:lstStyle/>
+                    <a:p>
+                      <a:pPr algn="ctr"/>
+                      <a:r>
+                        <a:rPr lang="en-US" dirty="0"/>
+                        <a:t>Piper</a:t>
+                      </a:r>
+                    </a:p>
+                  </a:txBody>
+                  <a:tcPr anchor="ctr">
+                    <a:lnL w="12700" cap="flat" cmpd="sng" algn="ctr">
+                      <a:solidFill>
+                        <a:schemeClr val="tx1"/>
+                      </a:solidFill>
+                      <a:prstDash val="solid"/>
+                      <a:round/>
+                      <a:headEnd type="none" w="med" len="med"/>
+                      <a:tailEnd type="none" w="med" len="med"/>
+                    </a:lnL>
+                    <a:lnR w="12700" cap="flat" cmpd="sng" algn="ctr">
+                      <a:solidFill>
+                        <a:schemeClr val="tx1"/>
+                      </a:solidFill>
+                      <a:prstDash val="solid"/>
+                      <a:round/>
+                      <a:headEnd type="none" w="med" len="med"/>
+                      <a:tailEnd type="none" w="med" len="med"/>
+                    </a:lnR>
+                    <a:lnT w="12700" cap="flat" cmpd="sng" algn="ctr">
+                      <a:solidFill>
+                        <a:schemeClr val="tx1"/>
+                      </a:solidFill>
+                      <a:prstDash val="solid"/>
+                      <a:round/>
+                      <a:headEnd type="none" w="med" len="med"/>
+                      <a:tailEnd type="none" w="med" len="med"/>
+                    </a:lnT>
+                    <a:lnB w="12700" cap="flat" cmpd="sng" algn="ctr">
+                      <a:solidFill>
+                        <a:schemeClr val="tx1"/>
+                      </a:solidFill>
+                      <a:prstDash val="solid"/>
+                      <a:round/>
+                      <a:headEnd type="none" w="med" len="med"/>
+                      <a:tailEnd type="none" w="med" len="med"/>
+                    </a:lnB>
+                  </a:tcPr>
+                </a:tc>
+                <a:tc>
+                  <a:txBody>
+                    <a:bodyPr/>
+                    <a:lstStyle/>
+                    <a:p>
+                      <a:pPr algn="ctr"/>
+                      <a:r>
+                        <a:rPr lang="en-US" dirty="0"/>
+                        <a:t>0</a:t>
+                      </a:r>
+                    </a:p>
+                  </a:txBody>
+                  <a:tcPr anchor="ctr">
+                    <a:lnL w="12700" cap="flat" cmpd="sng" algn="ctr">
+                      <a:solidFill>
+                        <a:schemeClr val="tx1"/>
+                      </a:solidFill>
+                      <a:prstDash val="solid"/>
+                      <a:round/>
+                      <a:headEnd type="none" w="med" len="med"/>
+                      <a:tailEnd type="none" w="med" len="med"/>
+                    </a:lnL>
+                    <a:lnR w="12700" cap="flat" cmpd="sng" algn="ctr">
+                      <a:solidFill>
+                        <a:schemeClr val="tx1"/>
+                      </a:solidFill>
+                      <a:prstDash val="solid"/>
+                      <a:round/>
+                      <a:headEnd type="none" w="med" len="med"/>
+                      <a:tailEnd type="none" w="med" len="med"/>
+                    </a:lnR>
+                    <a:lnT w="12700" cap="flat" cmpd="sng" algn="ctr">
+                      <a:solidFill>
+                        <a:schemeClr val="tx1"/>
+                      </a:solidFill>
+                      <a:prstDash val="solid"/>
+                      <a:round/>
+                      <a:headEnd type="none" w="med" len="med"/>
+                      <a:tailEnd type="none" w="med" len="med"/>
+                    </a:lnT>
+                    <a:lnB w="12700" cap="flat" cmpd="sng" algn="ctr">
+                      <a:solidFill>
+                        <a:schemeClr val="tx1"/>
+                      </a:solidFill>
+                      <a:prstDash val="solid"/>
+                      <a:round/>
+                      <a:headEnd type="none" w="med" len="med"/>
+                      <a:tailEnd type="none" w="med" len="med"/>
+                    </a:lnB>
+                  </a:tcPr>
+                </a:tc>
+                <a:extLst>
+                  <a:ext uri="{0D108BD9-81ED-4DB2-BD59-A6C34878D82A}">
+                    <a16:rowId xmlns:a16="http://schemas.microsoft.com/office/drawing/2014/main" val="635592282"/>
+                  </a:ext>
+                </a:extLst>
+              </a:tr>
+            </a:tbl>
+          </a:graphicData>
+        </a:graphic>
+      </p:graphicFrame>
+      <p:sp>
+        <p:nvSpPr>
+          <p:cNvPr id="6" name="Right Arrow 5">
+            <a:extLst>
+              <a:ext uri="{FF2B5EF4-FFF2-40B4-BE49-F238E27FC236}">
+                <a16:creationId xmlns:a16="http://schemas.microsoft.com/office/drawing/2014/main" id="{2E509A72-EF3F-060E-8E0F-522D14398619}"/>
+              </a:ext>
+            </a:extLst>
+          </p:cNvPr>
+          <p:cNvSpPr/>
           <p:nvPr/>
-        </p:nvPicPr>
-        <p:blipFill>
-          <a:blip r:embed="rId2"/>
-          <a:stretch>
-            <a:fillRect/>
-          </a:stretch>
-        </p:blipFill>
+        </p:nvSpPr>
         <p:spPr>
           <a:xfrm>
-            <a:off x="1842654" y="33224"/>
-            <a:ext cx="9055400" cy="6791551"/>
+            <a:off x="5659395" y="3947983"/>
+            <a:ext cx="877329" cy="435044"/>
+          </a:xfrm>
+          <a:prstGeom prst="rightArrow">
+            <a:avLst/>
+          </a:prstGeom>
+        </p:spPr>
+        <p:style>
+          <a:lnRef idx="2">
+            <a:schemeClr val="accent1">
+              <a:shade val="15000"/>
+            </a:schemeClr>
+          </a:lnRef>
+          <a:fillRef idx="1">
+            <a:schemeClr val="accent1"/>
+          </a:fillRef>
+          <a:effectRef idx="0">
+            <a:schemeClr val="accent1"/>
+          </a:effectRef>
+          <a:fontRef idx="minor">
+            <a:schemeClr val="lt1"/>
+          </a:fontRef>
+        </p:style>
+        <p:txBody>
+          <a:bodyPr rtlCol="0" anchor="ctr"/>
+          <a:lstStyle/>
+          <a:p>
+            <a:pPr algn="ctr"/>
+            <a:endParaRPr lang="en-US"/>
+          </a:p>
+        </p:txBody>
+      </p:sp>
+      <p:sp>
+        <p:nvSpPr>
+          <p:cNvPr id="7" name="TextBox 6">
+            <a:extLst>
+              <a:ext uri="{FF2B5EF4-FFF2-40B4-BE49-F238E27FC236}">
+                <a16:creationId xmlns:a16="http://schemas.microsoft.com/office/drawing/2014/main" id="{6058D596-65D8-9A29-7317-2A7A589CE918}"/>
+              </a:ext>
+            </a:extLst>
+          </p:cNvPr>
+          <p:cNvSpPr txBox="1"/>
+          <p:nvPr/>
+        </p:nvSpPr>
+        <p:spPr>
+          <a:xfrm>
+            <a:off x="3853252" y="5993026"/>
+            <a:ext cx="1657862" cy="646331"/>
           </a:xfrm>
           <a:prstGeom prst="rect">
             <a:avLst/>
           </a:prstGeom>
+          <a:noFill/>
         </p:spPr>
-      </p:pic>
+        <p:txBody>
+          <a:bodyPr wrap="square" rtlCol="0">
+            <a:spAutoFit/>
+          </a:bodyPr>
+          <a:lstStyle/>
+          <a:p>
+            <a:pPr algn="ctr"/>
+            <a:r>
+              <a:rPr lang="en-US" dirty="0"/>
+              <a:t>Aggregated by aircraft</a:t>
+            </a:r>
+          </a:p>
+        </p:txBody>
+      </p:sp>
+      <p:sp>
+        <p:nvSpPr>
+          <p:cNvPr id="8" name="TextBox 7">
+            <a:extLst>
+              <a:ext uri="{FF2B5EF4-FFF2-40B4-BE49-F238E27FC236}">
+                <a16:creationId xmlns:a16="http://schemas.microsoft.com/office/drawing/2014/main" id="{3D0E8CCB-680B-D49A-A9DA-1DCB15022335}"/>
+              </a:ext>
+            </a:extLst>
+          </p:cNvPr>
+          <p:cNvSpPr txBox="1"/>
+          <p:nvPr/>
+        </p:nvSpPr>
+        <p:spPr>
+          <a:xfrm>
+            <a:off x="553997" y="5993026"/>
+            <a:ext cx="1657862" cy="646331"/>
+          </a:xfrm>
+          <a:prstGeom prst="rect">
+            <a:avLst/>
+          </a:prstGeom>
+          <a:noFill/>
+        </p:spPr>
+        <p:txBody>
+          <a:bodyPr wrap="square" rtlCol="0">
+            <a:spAutoFit/>
+          </a:bodyPr>
+          <a:lstStyle/>
+          <a:p>
+            <a:pPr algn="ctr"/>
+            <a:r>
+              <a:rPr lang="en-US" dirty="0"/>
+              <a:t>Propagated to aircraft</a:t>
+            </a:r>
+          </a:p>
+        </p:txBody>
+      </p:sp>
+      <p:sp>
+        <p:nvSpPr>
+          <p:cNvPr id="9" name="TextBox 8">
+            <a:extLst>
+              <a:ext uri="{FF2B5EF4-FFF2-40B4-BE49-F238E27FC236}">
+                <a16:creationId xmlns:a16="http://schemas.microsoft.com/office/drawing/2014/main" id="{1F798325-610C-F668-FE14-F0B936C8BF54}"/>
+              </a:ext>
+            </a:extLst>
+          </p:cNvPr>
+          <p:cNvSpPr txBox="1"/>
+          <p:nvPr/>
+        </p:nvSpPr>
+        <p:spPr>
+          <a:xfrm>
+            <a:off x="3707028" y="1708306"/>
+            <a:ext cx="1952367" cy="369332"/>
+          </a:xfrm>
+          <a:prstGeom prst="rect">
+            <a:avLst/>
+          </a:prstGeom>
+          <a:noFill/>
+        </p:spPr>
+        <p:txBody>
+          <a:bodyPr wrap="square" rtlCol="0">
+            <a:spAutoFit/>
+          </a:bodyPr>
+          <a:lstStyle/>
+          <a:p>
+            <a:pPr algn="ctr"/>
+            <a:r>
+              <a:rPr lang="en-US" dirty="0"/>
+              <a:t>Sub-aircraft level</a:t>
+            </a:r>
+          </a:p>
+        </p:txBody>
+      </p:sp>
+      <p:sp>
+        <p:nvSpPr>
+          <p:cNvPr id="10" name="TextBox 9">
+            <a:extLst>
+              <a:ext uri="{FF2B5EF4-FFF2-40B4-BE49-F238E27FC236}">
+                <a16:creationId xmlns:a16="http://schemas.microsoft.com/office/drawing/2014/main" id="{984875FA-6659-B88B-C66A-A205482D5383}"/>
+              </a:ext>
+            </a:extLst>
+          </p:cNvPr>
+          <p:cNvSpPr txBox="1"/>
+          <p:nvPr/>
+        </p:nvSpPr>
+        <p:spPr>
+          <a:xfrm>
+            <a:off x="553997" y="1708306"/>
+            <a:ext cx="1657862" cy="369332"/>
+          </a:xfrm>
+          <a:prstGeom prst="rect">
+            <a:avLst/>
+          </a:prstGeom>
+          <a:noFill/>
+        </p:spPr>
+        <p:txBody>
+          <a:bodyPr wrap="square" rtlCol="0">
+            <a:spAutoFit/>
+          </a:bodyPr>
+          <a:lstStyle/>
+          <a:p>
+            <a:pPr algn="ctr"/>
+            <a:r>
+              <a:rPr lang="en-US" dirty="0"/>
+              <a:t>Event-level</a:t>
+            </a:r>
+          </a:p>
+        </p:txBody>
+      </p:sp>
+      <p:sp>
+        <p:nvSpPr>
+          <p:cNvPr id="11" name="TextBox 10">
+            <a:extLst>
+              <a:ext uri="{FF2B5EF4-FFF2-40B4-BE49-F238E27FC236}">
+                <a16:creationId xmlns:a16="http://schemas.microsoft.com/office/drawing/2014/main" id="{D42506CC-93DA-8F69-B4AA-4A0AC0DE4C47}"/>
+              </a:ext>
+            </a:extLst>
+          </p:cNvPr>
+          <p:cNvSpPr txBox="1"/>
+          <p:nvPr/>
+        </p:nvSpPr>
+        <p:spPr>
+          <a:xfrm>
+            <a:off x="2195390" y="1708306"/>
+            <a:ext cx="1657862" cy="369332"/>
+          </a:xfrm>
+          <a:prstGeom prst="rect">
+            <a:avLst/>
+          </a:prstGeom>
+          <a:noFill/>
+        </p:spPr>
+        <p:txBody>
+          <a:bodyPr wrap="square" rtlCol="0">
+            <a:spAutoFit/>
+          </a:bodyPr>
+          <a:lstStyle/>
+          <a:p>
+            <a:pPr algn="ctr"/>
+            <a:r>
+              <a:rPr lang="en-US" dirty="0"/>
+              <a:t>Aircraft-level</a:t>
+            </a:r>
+          </a:p>
+        </p:txBody>
+      </p:sp>
+      <p:sp>
+        <p:nvSpPr>
+          <p:cNvPr id="13" name="Up Arrow 12">
+            <a:extLst>
+              <a:ext uri="{FF2B5EF4-FFF2-40B4-BE49-F238E27FC236}">
+                <a16:creationId xmlns:a16="http://schemas.microsoft.com/office/drawing/2014/main" id="{72ED19C4-DC87-7BBF-473E-B9532D1C7B84}"/>
+              </a:ext>
+            </a:extLst>
+          </p:cNvPr>
+          <p:cNvSpPr/>
+          <p:nvPr/>
+        </p:nvSpPr>
+        <p:spPr>
+          <a:xfrm>
+            <a:off x="1283175" y="5763806"/>
+            <a:ext cx="199506" cy="266970"/>
+          </a:xfrm>
+          <a:prstGeom prst="upArrow">
+            <a:avLst/>
+          </a:prstGeom>
+        </p:spPr>
+        <p:style>
+          <a:lnRef idx="2">
+            <a:schemeClr val="accent1">
+              <a:shade val="15000"/>
+            </a:schemeClr>
+          </a:lnRef>
+          <a:fillRef idx="1">
+            <a:schemeClr val="accent1"/>
+          </a:fillRef>
+          <a:effectRef idx="0">
+            <a:schemeClr val="accent1"/>
+          </a:effectRef>
+          <a:fontRef idx="minor">
+            <a:schemeClr val="lt1"/>
+          </a:fontRef>
+        </p:style>
+        <p:txBody>
+          <a:bodyPr rtlCol="0" anchor="ctr"/>
+          <a:lstStyle/>
+          <a:p>
+            <a:pPr algn="ctr"/>
+            <a:endParaRPr lang="en-US"/>
+          </a:p>
+        </p:txBody>
+      </p:sp>
+      <p:sp>
+        <p:nvSpPr>
+          <p:cNvPr id="14" name="Up Arrow 13">
+            <a:extLst>
+              <a:ext uri="{FF2B5EF4-FFF2-40B4-BE49-F238E27FC236}">
+                <a16:creationId xmlns:a16="http://schemas.microsoft.com/office/drawing/2014/main" id="{B27711A4-6790-F5C2-8BA9-F52281E0B0B3}"/>
+              </a:ext>
+            </a:extLst>
+          </p:cNvPr>
+          <p:cNvSpPr/>
+          <p:nvPr/>
+        </p:nvSpPr>
+        <p:spPr>
+          <a:xfrm>
+            <a:off x="4582430" y="5763806"/>
+            <a:ext cx="199506" cy="266970"/>
+          </a:xfrm>
+          <a:prstGeom prst="upArrow">
+            <a:avLst/>
+          </a:prstGeom>
+        </p:spPr>
+        <p:style>
+          <a:lnRef idx="2">
+            <a:schemeClr val="accent1">
+              <a:shade val="15000"/>
+            </a:schemeClr>
+          </a:lnRef>
+          <a:fillRef idx="1">
+            <a:schemeClr val="accent1"/>
+          </a:fillRef>
+          <a:effectRef idx="0">
+            <a:schemeClr val="accent1"/>
+          </a:effectRef>
+          <a:fontRef idx="minor">
+            <a:schemeClr val="lt1"/>
+          </a:fontRef>
+        </p:style>
+        <p:txBody>
+          <a:bodyPr rtlCol="0" anchor="ctr"/>
+          <a:lstStyle/>
+          <a:p>
+            <a:pPr algn="ctr"/>
+            <a:endParaRPr lang="en-US"/>
+          </a:p>
+        </p:txBody>
+      </p:sp>
     </p:spTree>
     <p:extLst>
       <p:ext uri="{BB962C8B-B14F-4D97-AF65-F5344CB8AC3E}">
-        <p14:creationId xmlns:p14="http://schemas.microsoft.com/office/powerpoint/2010/main" val="1717326656"/>
+        <p14:creationId xmlns:p14="http://schemas.microsoft.com/office/powerpoint/2010/main" val="2557105231"/>
       </p:ext>
     </p:extLst>
   </p:cSld>
   <p:clrMapOvr>
     <a:masterClrMapping/>
   </p:clrMapOvr>
+  <p:timing>
+    <p:tnLst>
+      <p:par>
+        <p:cTn id="1" dur="indefinite" restart="never" nodeType="tmRoot">
+          <p:childTnLst>
+            <p:seq concurrent="1" nextAc="seek">
+              <p:cTn id="2" dur="indefinite" nodeType="mainSeq">
+                <p:childTnLst>
+                  <p:par>
+                    <p:cTn id="3" fill="hold">
+                      <p:stCondLst>
+                        <p:cond delay="indefinite"/>
+                      </p:stCondLst>
+                      <p:childTnLst>
+                        <p:par>
+                          <p:cTn id="4" fill="hold">
+                            <p:stCondLst>
+                              <p:cond delay="0"/>
+                            </p:stCondLst>
+                            <p:childTnLst>
+                              <p:par>
+                                <p:cTn id="5" presetID="1" presetClass="entr" presetSubtype="0" fill="hold" grpId="0" nodeType="clickEffect">
+                                  <p:stCondLst>
+                                    <p:cond delay="0"/>
+                                  </p:stCondLst>
+                                  <p:childTnLst>
+                                    <p:set>
+                                      <p:cBhvr>
+                                        <p:cTn id="6" dur="1" fill="hold">
+                                          <p:stCondLst>
+                                            <p:cond delay="0"/>
+                                          </p:stCondLst>
+                                        </p:cTn>
+                                        <p:tgtEl>
+                                          <p:spTgt spid="10"/>
+                                        </p:tgtEl>
+                                        <p:attrNameLst>
+                                          <p:attrName>style.visibility</p:attrName>
+                                        </p:attrNameLst>
+                                      </p:cBhvr>
+                                      <p:to>
+                                        <p:strVal val="visible"/>
+                                      </p:to>
+                                    </p:set>
+                                  </p:childTnLst>
+                                </p:cTn>
+                              </p:par>
+                              <p:par>
+                                <p:cTn id="7" presetID="1" presetClass="entr" presetSubtype="0" fill="hold" grpId="0" nodeType="withEffect">
+                                  <p:stCondLst>
+                                    <p:cond delay="0"/>
+                                  </p:stCondLst>
+                                  <p:childTnLst>
+                                    <p:set>
+                                      <p:cBhvr>
+                                        <p:cTn id="8" dur="1" fill="hold">
+                                          <p:stCondLst>
+                                            <p:cond delay="0"/>
+                                          </p:stCondLst>
+                                        </p:cTn>
+                                        <p:tgtEl>
+                                          <p:spTgt spid="11"/>
+                                        </p:tgtEl>
+                                        <p:attrNameLst>
+                                          <p:attrName>style.visibility</p:attrName>
+                                        </p:attrNameLst>
+                                      </p:cBhvr>
+                                      <p:to>
+                                        <p:strVal val="visible"/>
+                                      </p:to>
+                                    </p:set>
+                                  </p:childTnLst>
+                                </p:cTn>
+                              </p:par>
+                              <p:par>
+                                <p:cTn id="9" presetID="1" presetClass="entr" presetSubtype="0" fill="hold" grpId="0" nodeType="withEffect">
+                                  <p:stCondLst>
+                                    <p:cond delay="0"/>
+                                  </p:stCondLst>
+                                  <p:childTnLst>
+                                    <p:set>
+                                      <p:cBhvr>
+                                        <p:cTn id="10" dur="1" fill="hold">
+                                          <p:stCondLst>
+                                            <p:cond delay="0"/>
+                                          </p:stCondLst>
+                                        </p:cTn>
+                                        <p:tgtEl>
+                                          <p:spTgt spid="9"/>
+                                        </p:tgtEl>
+                                        <p:attrNameLst>
+                                          <p:attrName>style.visibility</p:attrName>
+                                        </p:attrNameLst>
+                                      </p:cBhvr>
+                                      <p:to>
+                                        <p:strVal val="visible"/>
+                                      </p:to>
+                                    </p:set>
+                                  </p:childTnLst>
+                                </p:cTn>
+                              </p:par>
+                              <p:par>
+                                <p:cTn id="11" presetID="1" presetClass="entr" presetSubtype="0" fill="hold" nodeType="withEffect">
+                                  <p:stCondLst>
+                                    <p:cond delay="0"/>
+                                  </p:stCondLst>
+                                  <p:childTnLst>
+                                    <p:set>
+                                      <p:cBhvr>
+                                        <p:cTn id="12" dur="1" fill="hold">
+                                          <p:stCondLst>
+                                            <p:cond delay="0"/>
+                                          </p:stCondLst>
+                                        </p:cTn>
+                                        <p:tgtEl>
+                                          <p:spTgt spid="4"/>
+                                        </p:tgtEl>
+                                        <p:attrNameLst>
+                                          <p:attrName>style.visibility</p:attrName>
+                                        </p:attrNameLst>
+                                      </p:cBhvr>
+                                      <p:to>
+                                        <p:strVal val="visible"/>
+                                      </p:to>
+                                    </p:set>
+                                  </p:childTnLst>
+                                </p:cTn>
+                              </p:par>
+                            </p:childTnLst>
+                          </p:cTn>
+                        </p:par>
+                      </p:childTnLst>
+                    </p:cTn>
+                  </p:par>
+                  <p:par>
+                    <p:cTn id="13" fill="hold">
+                      <p:stCondLst>
+                        <p:cond delay="indefinite"/>
+                      </p:stCondLst>
+                      <p:childTnLst>
+                        <p:par>
+                          <p:cTn id="14" fill="hold">
+                            <p:stCondLst>
+                              <p:cond delay="0"/>
+                            </p:stCondLst>
+                            <p:childTnLst>
+                              <p:par>
+                                <p:cTn id="15" presetID="1" presetClass="entr" presetSubtype="0" fill="hold" grpId="0" nodeType="clickEffect">
+                                  <p:stCondLst>
+                                    <p:cond delay="0"/>
+                                  </p:stCondLst>
+                                  <p:childTnLst>
+                                    <p:set>
+                                      <p:cBhvr>
+                                        <p:cTn id="16" dur="1" fill="hold">
+                                          <p:stCondLst>
+                                            <p:cond delay="0"/>
+                                          </p:stCondLst>
+                                        </p:cTn>
+                                        <p:tgtEl>
+                                          <p:spTgt spid="8"/>
+                                        </p:tgtEl>
+                                        <p:attrNameLst>
+                                          <p:attrName>style.visibility</p:attrName>
+                                        </p:attrNameLst>
+                                      </p:cBhvr>
+                                      <p:to>
+                                        <p:strVal val="visible"/>
+                                      </p:to>
+                                    </p:set>
+                                  </p:childTnLst>
+                                </p:cTn>
+                              </p:par>
+                              <p:par>
+                                <p:cTn id="17" presetID="1" presetClass="entr" presetSubtype="0" fill="hold" grpId="0" nodeType="withEffect">
+                                  <p:stCondLst>
+                                    <p:cond delay="0"/>
+                                  </p:stCondLst>
+                                  <p:childTnLst>
+                                    <p:set>
+                                      <p:cBhvr>
+                                        <p:cTn id="18" dur="1" fill="hold">
+                                          <p:stCondLst>
+                                            <p:cond delay="0"/>
+                                          </p:stCondLst>
+                                        </p:cTn>
+                                        <p:tgtEl>
+                                          <p:spTgt spid="13"/>
+                                        </p:tgtEl>
+                                        <p:attrNameLst>
+                                          <p:attrName>style.visibility</p:attrName>
+                                        </p:attrNameLst>
+                                      </p:cBhvr>
+                                      <p:to>
+                                        <p:strVal val="visible"/>
+                                      </p:to>
+                                    </p:set>
+                                  </p:childTnLst>
+                                </p:cTn>
+                              </p:par>
+                            </p:childTnLst>
+                          </p:cTn>
+                        </p:par>
+                      </p:childTnLst>
+                    </p:cTn>
+                  </p:par>
+                  <p:par>
+                    <p:cTn id="19" fill="hold">
+                      <p:stCondLst>
+                        <p:cond delay="indefinite"/>
+                      </p:stCondLst>
+                      <p:childTnLst>
+                        <p:par>
+                          <p:cTn id="20" fill="hold">
+                            <p:stCondLst>
+                              <p:cond delay="0"/>
+                            </p:stCondLst>
+                            <p:childTnLst>
+                              <p:par>
+                                <p:cTn id="21" presetID="1" presetClass="entr" presetSubtype="0" fill="hold" grpId="0" nodeType="clickEffect">
+                                  <p:stCondLst>
+                                    <p:cond delay="0"/>
+                                  </p:stCondLst>
+                                  <p:childTnLst>
+                                    <p:set>
+                                      <p:cBhvr>
+                                        <p:cTn id="22" dur="1" fill="hold">
+                                          <p:stCondLst>
+                                            <p:cond delay="0"/>
+                                          </p:stCondLst>
+                                        </p:cTn>
+                                        <p:tgtEl>
+                                          <p:spTgt spid="14"/>
+                                        </p:tgtEl>
+                                        <p:attrNameLst>
+                                          <p:attrName>style.visibility</p:attrName>
+                                        </p:attrNameLst>
+                                      </p:cBhvr>
+                                      <p:to>
+                                        <p:strVal val="visible"/>
+                                      </p:to>
+                                    </p:set>
+                                  </p:childTnLst>
+                                </p:cTn>
+                              </p:par>
+                              <p:par>
+                                <p:cTn id="23" presetID="1" presetClass="entr" presetSubtype="0" fill="hold" grpId="0" nodeType="withEffect">
+                                  <p:stCondLst>
+                                    <p:cond delay="0"/>
+                                  </p:stCondLst>
+                                  <p:childTnLst>
+                                    <p:set>
+                                      <p:cBhvr>
+                                        <p:cTn id="24" dur="1" fill="hold">
+                                          <p:stCondLst>
+                                            <p:cond delay="0"/>
+                                          </p:stCondLst>
+                                        </p:cTn>
+                                        <p:tgtEl>
+                                          <p:spTgt spid="7"/>
+                                        </p:tgtEl>
+                                        <p:attrNameLst>
+                                          <p:attrName>style.visibility</p:attrName>
+                                        </p:attrNameLst>
+                                      </p:cBhvr>
+                                      <p:to>
+                                        <p:strVal val="visible"/>
+                                      </p:to>
+                                    </p:set>
+                                  </p:childTnLst>
+                                </p:cTn>
+                              </p:par>
+                            </p:childTnLst>
+                          </p:cTn>
+                        </p:par>
+                      </p:childTnLst>
+                    </p:cTn>
+                  </p:par>
+                  <p:par>
+                    <p:cTn id="25" fill="hold">
+                      <p:stCondLst>
+                        <p:cond delay="indefinite"/>
+                      </p:stCondLst>
+                      <p:childTnLst>
+                        <p:par>
+                          <p:cTn id="26" fill="hold">
+                            <p:stCondLst>
+                              <p:cond delay="0"/>
+                            </p:stCondLst>
+                            <p:childTnLst>
+                              <p:par>
+                                <p:cTn id="27" presetID="1" presetClass="entr" presetSubtype="0" fill="hold" grpId="0" nodeType="clickEffect">
+                                  <p:stCondLst>
+                                    <p:cond delay="0"/>
+                                  </p:stCondLst>
+                                  <p:childTnLst>
+                                    <p:set>
+                                      <p:cBhvr>
+                                        <p:cTn id="28" dur="1" fill="hold">
+                                          <p:stCondLst>
+                                            <p:cond delay="0"/>
+                                          </p:stCondLst>
+                                        </p:cTn>
+                                        <p:tgtEl>
+                                          <p:spTgt spid="6"/>
+                                        </p:tgtEl>
+                                        <p:attrNameLst>
+                                          <p:attrName>style.visibility</p:attrName>
+                                        </p:attrNameLst>
+                                      </p:cBhvr>
+                                      <p:to>
+                                        <p:strVal val="visible"/>
+                                      </p:to>
+                                    </p:set>
+                                  </p:childTnLst>
+                                </p:cTn>
+                              </p:par>
+                              <p:par>
+                                <p:cTn id="29" presetID="1" presetClass="entr" presetSubtype="0" fill="hold" nodeType="withEffect">
+                                  <p:stCondLst>
+                                    <p:cond delay="0"/>
+                                  </p:stCondLst>
+                                  <p:childTnLst>
+                                    <p:set>
+                                      <p:cBhvr>
+                                        <p:cTn id="30" dur="1" fill="hold">
+                                          <p:stCondLst>
+                                            <p:cond delay="0"/>
+                                          </p:stCondLst>
+                                        </p:cTn>
+                                        <p:tgtEl>
+                                          <p:spTgt spid="5"/>
+                                        </p:tgtEl>
+                                        <p:attrNameLst>
+                                          <p:attrName>style.visibility</p:attrName>
+                                        </p:attrNameLst>
+                                      </p:cBhvr>
+                                      <p:to>
+                                        <p:strVal val="visible"/>
+                                      </p:to>
+                                    </p:set>
+                                  </p:childTnLst>
+                                </p:cTn>
+                              </p:par>
+                            </p:childTnLst>
+                          </p:cTn>
+                        </p:par>
+                      </p:childTnLst>
+                    </p:cTn>
+                  </p:par>
+                </p:childTnLst>
+              </p:cTn>
+              <p:prevCondLst>
+                <p:cond evt="onPrev" delay="0">
+                  <p:tgtEl>
+                    <p:sldTgt/>
+                  </p:tgtEl>
+                </p:cond>
+              </p:prevCondLst>
+              <p:nextCondLst>
+                <p:cond evt="onNext" delay="0">
+                  <p:tgtEl>
+                    <p:sldTgt/>
+                  </p:tgtEl>
+                </p:cond>
+              </p:nextCondLst>
+            </p:seq>
+          </p:childTnLst>
+        </p:cTn>
+      </p:par>
+    </p:tnLst>
+    <p:bldLst>
+      <p:bldP spid="6" grpId="0" animBg="1"/>
+      <p:bldP spid="7" grpId="0"/>
+      <p:bldP spid="8" grpId="0"/>
+      <p:bldP spid="9" grpId="0"/>
+      <p:bldP spid="10" grpId="0"/>
+      <p:bldP spid="11" grpId="0"/>
+      <p:bldP spid="13" grpId="0" animBg="1"/>
+      <p:bldP spid="14" grpId="0" animBg="1"/>
+    </p:bldLst>
+  </p:timing>
 </p:sld>
 </file>
 
-<file path=ppt/slides/slide5.xml><?xml version="1.0" encoding="utf-8"?>
+<file path=ppt/slides/slide7.xml><?xml version="1.0" encoding="utf-8"?>
 <p:sld xmlns:a="http://schemas.openxmlformats.org/drawingml/2006/main" xmlns:r="http://schemas.openxmlformats.org/officeDocument/2006/relationships" xmlns:p="http://schemas.openxmlformats.org/presentationml/2006/main">
   <p:cSld>
     <p:spTree>
@@ -4783,12 +7759,14 @@
         </p:nvSpPr>
         <p:spPr/>
         <p:txBody>
-          <a:bodyPr/>
+          <a:bodyPr>
+            <a:normAutofit fontScale="90000"/>
+          </a:bodyPr>
           <a:lstStyle/>
           <a:p>
             <a:r>
               <a:rPr lang="en-US" dirty="0"/>
-              <a:t>Cleaning data: imputation, category reduction </a:t>
+              <a:t>Removed rows, reduced categories, and imputed to get complete data with manageable feature set</a:t>
             </a:r>
           </a:p>
         </p:txBody>
@@ -19174,7 +22152,7 @@
 </p:sld>
 </file>
 
-<file path=ppt/slides/slide6.xml><?xml version="1.0" encoding="utf-8"?>
+<file path=ppt/slides/slide8.xml><?xml version="1.0" encoding="utf-8"?>
 <p:sld xmlns:a="http://schemas.openxmlformats.org/drawingml/2006/main" xmlns:r="http://schemas.openxmlformats.org/officeDocument/2006/relationships" xmlns:p="http://schemas.openxmlformats.org/presentationml/2006/main">
   <p:cSld>
     <p:spTree>
@@ -19196,7 +22174,7 @@
           <p:cNvPr id="2" name="Title 1">
             <a:extLst>
               <a:ext uri="{FF2B5EF4-FFF2-40B4-BE49-F238E27FC236}">
-                <a16:creationId xmlns:a16="http://schemas.microsoft.com/office/drawing/2014/main" id="{73127460-AFC2-745E-3BFD-A0F8891AB189}"/>
+                <a16:creationId xmlns:a16="http://schemas.microsoft.com/office/drawing/2014/main" id="{98EBA411-5F75-4380-82B0-C81CDD3DB4E5}"/>
               </a:ext>
             </a:extLst>
           </p:cNvPr>
@@ -19209,217 +22187,642 @@
         </p:nvSpPr>
         <p:spPr/>
         <p:txBody>
-          <a:bodyPr/>
+          <a:bodyPr>
+            <a:normAutofit/>
+          </a:bodyPr>
           <a:lstStyle/>
           <a:p>
             <a:r>
               <a:rPr lang="en-US" dirty="0"/>
-              <a:t>Feature selection</a:t>
+              <a:t>Analyzed missingness to avoid data leakage</a:t>
+            </a:r>
+          </a:p>
+        </p:txBody>
+      </p:sp>
+      <p:pic>
+        <p:nvPicPr>
+          <p:cNvPr id="17" name="Picture 16">
+            <a:extLst>
+              <a:ext uri="{FF2B5EF4-FFF2-40B4-BE49-F238E27FC236}">
+                <a16:creationId xmlns:a16="http://schemas.microsoft.com/office/drawing/2014/main" id="{4F3EAA21-E10E-0660-9C0F-649F62E7B9C7}"/>
+              </a:ext>
+            </a:extLst>
+          </p:cNvPr>
+          <p:cNvPicPr>
+            <a:picLocks noChangeAspect="1"/>
+          </p:cNvPicPr>
+          <p:nvPr/>
+        </p:nvPicPr>
+        <p:blipFill>
+          <a:blip r:embed="rId2"/>
+          <a:stretch>
+            <a:fillRect/>
+          </a:stretch>
+        </p:blipFill>
+        <p:spPr>
+          <a:xfrm>
+            <a:off x="6172202" y="1690687"/>
+            <a:ext cx="5932716" cy="2978392"/>
+          </a:xfrm>
+          <a:prstGeom prst="rect">
+            <a:avLst/>
+          </a:prstGeom>
+        </p:spPr>
+      </p:pic>
+      <p:pic>
+        <p:nvPicPr>
+          <p:cNvPr id="22" name="Picture 21">
+            <a:extLst>
+              <a:ext uri="{FF2B5EF4-FFF2-40B4-BE49-F238E27FC236}">
+                <a16:creationId xmlns:a16="http://schemas.microsoft.com/office/drawing/2014/main" id="{566AEE1E-5941-9A5F-E3DE-604A1D063A6B}"/>
+              </a:ext>
+            </a:extLst>
+          </p:cNvPr>
+          <p:cNvPicPr>
+            <a:picLocks noChangeAspect="1"/>
+          </p:cNvPicPr>
+          <p:nvPr/>
+        </p:nvPicPr>
+        <p:blipFill>
+          <a:blip r:embed="rId3"/>
+          <a:stretch>
+            <a:fillRect/>
+          </a:stretch>
+        </p:blipFill>
+        <p:spPr>
+          <a:xfrm>
+            <a:off x="239486" y="1692290"/>
+            <a:ext cx="5932716" cy="2978392"/>
+          </a:xfrm>
+          <a:prstGeom prst="rect">
+            <a:avLst/>
+          </a:prstGeom>
+        </p:spPr>
+      </p:pic>
+      <p:sp>
+        <p:nvSpPr>
+          <p:cNvPr id="23" name="TextBox 22">
+            <a:extLst>
+              <a:ext uri="{FF2B5EF4-FFF2-40B4-BE49-F238E27FC236}">
+                <a16:creationId xmlns:a16="http://schemas.microsoft.com/office/drawing/2014/main" id="{391F6251-48E9-A43F-893F-AE9B4C8341D3}"/>
+              </a:ext>
+            </a:extLst>
+          </p:cNvPr>
+          <p:cNvSpPr txBox="1"/>
+          <p:nvPr/>
+        </p:nvSpPr>
+        <p:spPr>
+          <a:xfrm>
+            <a:off x="838200" y="5165710"/>
+            <a:ext cx="3472543" cy="369332"/>
+          </a:xfrm>
+          <a:prstGeom prst="rect">
+            <a:avLst/>
+          </a:prstGeom>
+          <a:noFill/>
+        </p:spPr>
+        <p:txBody>
+          <a:bodyPr wrap="square" rtlCol="0">
+            <a:spAutoFit/>
+          </a:bodyPr>
+          <a:lstStyle/>
+          <a:p>
+            <a:r>
+              <a:rPr lang="en-US" dirty="0"/>
+              <a:t>Status strongly predictive of fatality</a:t>
             </a:r>
           </a:p>
         </p:txBody>
       </p:sp>
       <p:sp>
         <p:nvSpPr>
-          <p:cNvPr id="3" name="Content Placeholder 2">
+          <p:cNvPr id="24" name="TextBox 23">
             <a:extLst>
               <a:ext uri="{FF2B5EF4-FFF2-40B4-BE49-F238E27FC236}">
-                <a16:creationId xmlns:a16="http://schemas.microsoft.com/office/drawing/2014/main" id="{29C80073-72EC-0EDD-E281-92A282F70F29}"/>
+                <a16:creationId xmlns:a16="http://schemas.microsoft.com/office/drawing/2014/main" id="{BACFD0F8-5138-4916-C117-2521776E65B5}"/>
               </a:ext>
             </a:extLst>
           </p:cNvPr>
-          <p:cNvSpPr>
-            <a:spLocks noGrp="1"/>
-          </p:cNvSpPr>
-          <p:nvPr>
-            <p:ph idx="1"/>
-          </p:nvPr>
+          <p:cNvSpPr txBox="1"/>
+          <p:nvPr/>
         </p:nvSpPr>
-        <p:spPr/>
+        <p:spPr>
+          <a:xfrm>
+            <a:off x="4593772" y="5164217"/>
+            <a:ext cx="1393371" cy="369332"/>
+          </a:xfrm>
+          <a:prstGeom prst="rect">
+            <a:avLst/>
+          </a:prstGeom>
+          <a:noFill/>
+        </p:spPr>
         <p:txBody>
-          <a:bodyPr/>
+          <a:bodyPr wrap="square" rtlCol="0">
+            <a:spAutoFit/>
+          </a:bodyPr>
           <a:lstStyle/>
           <a:p>
             <a:r>
               <a:rPr lang="en-US" dirty="0"/>
-              <a:t>Avoided variables with signs of survivorship bias</a:t>
-            </a:r>
-          </a:p>
-          <a:p>
-            <a:r>
-              <a:rPr lang="en-US" dirty="0"/>
-              <a:t>Feature reduction</a:t>
-            </a:r>
-          </a:p>
-          <a:p>
-            <a:pPr lvl="1"/>
-            <a:r>
-              <a:rPr lang="en-US" dirty="0"/>
-              <a:t>Remove features with &gt; 20% missingness</a:t>
-            </a:r>
-          </a:p>
-          <a:p>
-            <a:pPr lvl="1"/>
-            <a:r>
-              <a:rPr lang="en-US" dirty="0"/>
-              <a:t>Remove categories with &lt; 1% population</a:t>
+              <a:t>Drop feature</a:t>
             </a:r>
           </a:p>
         </p:txBody>
       </p:sp>
+      <p:cxnSp>
+        <p:nvCxnSpPr>
+          <p:cNvPr id="26" name="Straight Arrow Connector 25">
+            <a:extLst>
+              <a:ext uri="{FF2B5EF4-FFF2-40B4-BE49-F238E27FC236}">
+                <a16:creationId xmlns:a16="http://schemas.microsoft.com/office/drawing/2014/main" id="{46A49592-96B1-C1E2-0DFF-842864718269}"/>
+              </a:ext>
+            </a:extLst>
+          </p:cNvPr>
+          <p:cNvCxnSpPr>
+            <a:cxnSpLocks/>
+            <a:stCxn id="23" idx="3"/>
+            <a:endCxn id="24" idx="1"/>
+          </p:cNvCxnSpPr>
+          <p:nvPr/>
+        </p:nvCxnSpPr>
+        <p:spPr>
+          <a:xfrm flipV="1">
+            <a:off x="4310743" y="5348883"/>
+            <a:ext cx="283029" cy="1493"/>
+          </a:xfrm>
+          <a:prstGeom prst="straightConnector1">
+            <a:avLst/>
+          </a:prstGeom>
+          <a:ln>
+            <a:tailEnd type="triangle"/>
+          </a:ln>
+        </p:spPr>
+        <p:style>
+          <a:lnRef idx="1">
+            <a:schemeClr val="accent1"/>
+          </a:lnRef>
+          <a:fillRef idx="0">
+            <a:schemeClr val="accent1"/>
+          </a:fillRef>
+          <a:effectRef idx="0">
+            <a:schemeClr val="accent1"/>
+          </a:effectRef>
+          <a:fontRef idx="minor">
+            <a:schemeClr val="tx1"/>
+          </a:fontRef>
+        </p:style>
+      </p:cxnSp>
+      <p:sp>
+        <p:nvSpPr>
+          <p:cNvPr id="28" name="TextBox 27">
+            <a:extLst>
+              <a:ext uri="{FF2B5EF4-FFF2-40B4-BE49-F238E27FC236}">
+                <a16:creationId xmlns:a16="http://schemas.microsoft.com/office/drawing/2014/main" id="{DDA58D85-733B-94BC-3778-A4D09D12AE79}"/>
+              </a:ext>
+            </a:extLst>
+          </p:cNvPr>
+          <p:cNvSpPr txBox="1"/>
+          <p:nvPr/>
+        </p:nvSpPr>
+        <p:spPr>
+          <a:xfrm>
+            <a:off x="6901543" y="5165710"/>
+            <a:ext cx="2481942" cy="369332"/>
+          </a:xfrm>
+          <a:prstGeom prst="rect">
+            <a:avLst/>
+          </a:prstGeom>
+          <a:noFill/>
+        </p:spPr>
+        <p:txBody>
+          <a:bodyPr wrap="square" rtlCol="0">
+            <a:spAutoFit/>
+          </a:bodyPr>
+          <a:lstStyle/>
+          <a:p>
+            <a:r>
+              <a:rPr lang="en-US" dirty="0"/>
+              <a:t>Status weakly predictive</a:t>
+            </a:r>
+          </a:p>
+        </p:txBody>
+      </p:sp>
+      <p:sp>
+        <p:nvSpPr>
+          <p:cNvPr id="29" name="TextBox 28">
+            <a:extLst>
+              <a:ext uri="{FF2B5EF4-FFF2-40B4-BE49-F238E27FC236}">
+                <a16:creationId xmlns:a16="http://schemas.microsoft.com/office/drawing/2014/main" id="{4AD0A3BE-07A1-FD6A-491F-0EA745F01517}"/>
+              </a:ext>
+            </a:extLst>
+          </p:cNvPr>
+          <p:cNvSpPr txBox="1"/>
+          <p:nvPr/>
+        </p:nvSpPr>
+        <p:spPr>
+          <a:xfrm>
+            <a:off x="9688286" y="5165710"/>
+            <a:ext cx="1393371" cy="369332"/>
+          </a:xfrm>
+          <a:prstGeom prst="rect">
+            <a:avLst/>
+          </a:prstGeom>
+          <a:noFill/>
+        </p:spPr>
+        <p:txBody>
+          <a:bodyPr wrap="square" rtlCol="0">
+            <a:spAutoFit/>
+          </a:bodyPr>
+          <a:lstStyle/>
+          <a:p>
+            <a:r>
+              <a:rPr lang="en-US" dirty="0"/>
+              <a:t>Keep feature</a:t>
+            </a:r>
+          </a:p>
+        </p:txBody>
+      </p:sp>
+      <p:cxnSp>
+        <p:nvCxnSpPr>
+          <p:cNvPr id="30" name="Straight Arrow Connector 29">
+            <a:extLst>
+              <a:ext uri="{FF2B5EF4-FFF2-40B4-BE49-F238E27FC236}">
+                <a16:creationId xmlns:a16="http://schemas.microsoft.com/office/drawing/2014/main" id="{69C49A60-4E16-9A20-4F16-CC0CCC7FE7E6}"/>
+              </a:ext>
+            </a:extLst>
+          </p:cNvPr>
+          <p:cNvCxnSpPr>
+            <a:cxnSpLocks/>
+            <a:stCxn id="28" idx="3"/>
+            <a:endCxn id="29" idx="1"/>
+          </p:cNvCxnSpPr>
+          <p:nvPr/>
+        </p:nvCxnSpPr>
+        <p:spPr>
+          <a:xfrm>
+            <a:off x="9383485" y="5350376"/>
+            <a:ext cx="304801" cy="0"/>
+          </a:xfrm>
+          <a:prstGeom prst="straightConnector1">
+            <a:avLst/>
+          </a:prstGeom>
+          <a:ln>
+            <a:tailEnd type="triangle"/>
+          </a:ln>
+        </p:spPr>
+        <p:style>
+          <a:lnRef idx="1">
+            <a:schemeClr val="accent1"/>
+          </a:lnRef>
+          <a:fillRef idx="0">
+            <a:schemeClr val="accent1"/>
+          </a:fillRef>
+          <a:effectRef idx="0">
+            <a:schemeClr val="accent1"/>
+          </a:effectRef>
+          <a:fontRef idx="minor">
+            <a:schemeClr val="tx1"/>
+          </a:fontRef>
+        </p:style>
+      </p:cxnSp>
     </p:spTree>
     <p:extLst>
       <p:ext uri="{BB962C8B-B14F-4D97-AF65-F5344CB8AC3E}">
-        <p14:creationId xmlns:p14="http://schemas.microsoft.com/office/powerpoint/2010/main" val="3340381882"/>
+        <p14:creationId xmlns:p14="http://schemas.microsoft.com/office/powerpoint/2010/main" val="697724990"/>
       </p:ext>
     </p:extLst>
   </p:cSld>
   <p:clrMapOvr>
     <a:masterClrMapping/>
   </p:clrMapOvr>
+  <p:timing>
+    <p:tnLst>
+      <p:par>
+        <p:cTn id="1" dur="indefinite" restart="never" nodeType="tmRoot">
+          <p:childTnLst>
+            <p:seq concurrent="1" nextAc="seek">
+              <p:cTn id="2" dur="indefinite" nodeType="mainSeq">
+                <p:childTnLst>
+                  <p:par>
+                    <p:cTn id="3" fill="hold">
+                      <p:stCondLst>
+                        <p:cond delay="indefinite"/>
+                      </p:stCondLst>
+                      <p:childTnLst>
+                        <p:par>
+                          <p:cTn id="4" fill="hold">
+                            <p:stCondLst>
+                              <p:cond delay="0"/>
+                            </p:stCondLst>
+                            <p:childTnLst>
+                              <p:par>
+                                <p:cTn id="5" presetID="1" presetClass="entr" presetSubtype="0" fill="hold" nodeType="clickEffect">
+                                  <p:stCondLst>
+                                    <p:cond delay="0"/>
+                                  </p:stCondLst>
+                                  <p:childTnLst>
+                                    <p:set>
+                                      <p:cBhvr>
+                                        <p:cTn id="6" dur="1" fill="hold">
+                                          <p:stCondLst>
+                                            <p:cond delay="0"/>
+                                          </p:stCondLst>
+                                        </p:cTn>
+                                        <p:tgtEl>
+                                          <p:spTgt spid="22"/>
+                                        </p:tgtEl>
+                                        <p:attrNameLst>
+                                          <p:attrName>style.visibility</p:attrName>
+                                        </p:attrNameLst>
+                                      </p:cBhvr>
+                                      <p:to>
+                                        <p:strVal val="visible"/>
+                                      </p:to>
+                                    </p:set>
+                                  </p:childTnLst>
+                                </p:cTn>
+                              </p:par>
+                            </p:childTnLst>
+                          </p:cTn>
+                        </p:par>
+                      </p:childTnLst>
+                    </p:cTn>
+                  </p:par>
+                  <p:par>
+                    <p:cTn id="7" fill="hold">
+                      <p:stCondLst>
+                        <p:cond delay="indefinite"/>
+                      </p:stCondLst>
+                      <p:childTnLst>
+                        <p:par>
+                          <p:cTn id="8" fill="hold">
+                            <p:stCondLst>
+                              <p:cond delay="0"/>
+                            </p:stCondLst>
+                            <p:childTnLst>
+                              <p:par>
+                                <p:cTn id="9" presetID="1" presetClass="entr" presetSubtype="0" fill="hold" nodeType="clickEffect">
+                                  <p:stCondLst>
+                                    <p:cond delay="0"/>
+                                  </p:stCondLst>
+                                  <p:childTnLst>
+                                    <p:set>
+                                      <p:cBhvr>
+                                        <p:cTn id="10" dur="1" fill="hold">
+                                          <p:stCondLst>
+                                            <p:cond delay="0"/>
+                                          </p:stCondLst>
+                                        </p:cTn>
+                                        <p:tgtEl>
+                                          <p:spTgt spid="17"/>
+                                        </p:tgtEl>
+                                        <p:attrNameLst>
+                                          <p:attrName>style.visibility</p:attrName>
+                                        </p:attrNameLst>
+                                      </p:cBhvr>
+                                      <p:to>
+                                        <p:strVal val="visible"/>
+                                      </p:to>
+                                    </p:set>
+                                  </p:childTnLst>
+                                </p:cTn>
+                              </p:par>
+                            </p:childTnLst>
+                          </p:cTn>
+                        </p:par>
+                      </p:childTnLst>
+                    </p:cTn>
+                  </p:par>
+                  <p:par>
+                    <p:cTn id="11" fill="hold">
+                      <p:stCondLst>
+                        <p:cond delay="indefinite"/>
+                      </p:stCondLst>
+                      <p:childTnLst>
+                        <p:par>
+                          <p:cTn id="12" fill="hold">
+                            <p:stCondLst>
+                              <p:cond delay="0"/>
+                            </p:stCondLst>
+                            <p:childTnLst>
+                              <p:par>
+                                <p:cTn id="13" presetID="1" presetClass="entr" presetSubtype="0" fill="hold" grpId="0" nodeType="clickEffect">
+                                  <p:stCondLst>
+                                    <p:cond delay="0"/>
+                                  </p:stCondLst>
+                                  <p:childTnLst>
+                                    <p:set>
+                                      <p:cBhvr>
+                                        <p:cTn id="14" dur="1" fill="hold">
+                                          <p:stCondLst>
+                                            <p:cond delay="0"/>
+                                          </p:stCondLst>
+                                        </p:cTn>
+                                        <p:tgtEl>
+                                          <p:spTgt spid="23"/>
+                                        </p:tgtEl>
+                                        <p:attrNameLst>
+                                          <p:attrName>style.visibility</p:attrName>
+                                        </p:attrNameLst>
+                                      </p:cBhvr>
+                                      <p:to>
+                                        <p:strVal val="visible"/>
+                                      </p:to>
+                                    </p:set>
+                                  </p:childTnLst>
+                                </p:cTn>
+                              </p:par>
+                              <p:par>
+                                <p:cTn id="15" presetID="1" presetClass="entr" presetSubtype="0" fill="hold" nodeType="withEffect">
+                                  <p:stCondLst>
+                                    <p:cond delay="0"/>
+                                  </p:stCondLst>
+                                  <p:childTnLst>
+                                    <p:set>
+                                      <p:cBhvr>
+                                        <p:cTn id="16" dur="1" fill="hold">
+                                          <p:stCondLst>
+                                            <p:cond delay="0"/>
+                                          </p:stCondLst>
+                                        </p:cTn>
+                                        <p:tgtEl>
+                                          <p:spTgt spid="26"/>
+                                        </p:tgtEl>
+                                        <p:attrNameLst>
+                                          <p:attrName>style.visibility</p:attrName>
+                                        </p:attrNameLst>
+                                      </p:cBhvr>
+                                      <p:to>
+                                        <p:strVal val="visible"/>
+                                      </p:to>
+                                    </p:set>
+                                  </p:childTnLst>
+                                </p:cTn>
+                              </p:par>
+                              <p:par>
+                                <p:cTn id="17" presetID="1" presetClass="entr" presetSubtype="0" fill="hold" grpId="0" nodeType="withEffect">
+                                  <p:stCondLst>
+                                    <p:cond delay="0"/>
+                                  </p:stCondLst>
+                                  <p:childTnLst>
+                                    <p:set>
+                                      <p:cBhvr>
+                                        <p:cTn id="18" dur="1" fill="hold">
+                                          <p:stCondLst>
+                                            <p:cond delay="0"/>
+                                          </p:stCondLst>
+                                        </p:cTn>
+                                        <p:tgtEl>
+                                          <p:spTgt spid="24"/>
+                                        </p:tgtEl>
+                                        <p:attrNameLst>
+                                          <p:attrName>style.visibility</p:attrName>
+                                        </p:attrNameLst>
+                                      </p:cBhvr>
+                                      <p:to>
+                                        <p:strVal val="visible"/>
+                                      </p:to>
+                                    </p:set>
+                                  </p:childTnLst>
+                                </p:cTn>
+                              </p:par>
+                            </p:childTnLst>
+                          </p:cTn>
+                        </p:par>
+                      </p:childTnLst>
+                    </p:cTn>
+                  </p:par>
+                  <p:par>
+                    <p:cTn id="19" fill="hold">
+                      <p:stCondLst>
+                        <p:cond delay="indefinite"/>
+                      </p:stCondLst>
+                      <p:childTnLst>
+                        <p:par>
+                          <p:cTn id="20" fill="hold">
+                            <p:stCondLst>
+                              <p:cond delay="0"/>
+                            </p:stCondLst>
+                            <p:childTnLst>
+                              <p:par>
+                                <p:cTn id="21" presetID="1" presetClass="entr" presetSubtype="0" fill="hold" grpId="0" nodeType="clickEffect">
+                                  <p:stCondLst>
+                                    <p:cond delay="0"/>
+                                  </p:stCondLst>
+                                  <p:childTnLst>
+                                    <p:set>
+                                      <p:cBhvr>
+                                        <p:cTn id="22" dur="1" fill="hold">
+                                          <p:stCondLst>
+                                            <p:cond delay="0"/>
+                                          </p:stCondLst>
+                                        </p:cTn>
+                                        <p:tgtEl>
+                                          <p:spTgt spid="28"/>
+                                        </p:tgtEl>
+                                        <p:attrNameLst>
+                                          <p:attrName>style.visibility</p:attrName>
+                                        </p:attrNameLst>
+                                      </p:cBhvr>
+                                      <p:to>
+                                        <p:strVal val="visible"/>
+                                      </p:to>
+                                    </p:set>
+                                  </p:childTnLst>
+                                </p:cTn>
+                              </p:par>
+                              <p:par>
+                                <p:cTn id="23" presetID="1" presetClass="entr" presetSubtype="0" fill="hold" nodeType="withEffect">
+                                  <p:stCondLst>
+                                    <p:cond delay="0"/>
+                                  </p:stCondLst>
+                                  <p:childTnLst>
+                                    <p:set>
+                                      <p:cBhvr>
+                                        <p:cTn id="24" dur="1" fill="hold">
+                                          <p:stCondLst>
+                                            <p:cond delay="0"/>
+                                          </p:stCondLst>
+                                        </p:cTn>
+                                        <p:tgtEl>
+                                          <p:spTgt spid="30"/>
+                                        </p:tgtEl>
+                                        <p:attrNameLst>
+                                          <p:attrName>style.visibility</p:attrName>
+                                        </p:attrNameLst>
+                                      </p:cBhvr>
+                                      <p:to>
+                                        <p:strVal val="visible"/>
+                                      </p:to>
+                                    </p:set>
+                                  </p:childTnLst>
+                                </p:cTn>
+                              </p:par>
+                              <p:par>
+                                <p:cTn id="25" presetID="1" presetClass="entr" presetSubtype="0" fill="hold" grpId="0" nodeType="withEffect">
+                                  <p:stCondLst>
+                                    <p:cond delay="0"/>
+                                  </p:stCondLst>
+                                  <p:childTnLst>
+                                    <p:set>
+                                      <p:cBhvr>
+                                        <p:cTn id="26" dur="1" fill="hold">
+                                          <p:stCondLst>
+                                            <p:cond delay="0"/>
+                                          </p:stCondLst>
+                                        </p:cTn>
+                                        <p:tgtEl>
+                                          <p:spTgt spid="29"/>
+                                        </p:tgtEl>
+                                        <p:attrNameLst>
+                                          <p:attrName>style.visibility</p:attrName>
+                                        </p:attrNameLst>
+                                      </p:cBhvr>
+                                      <p:to>
+                                        <p:strVal val="visible"/>
+                                      </p:to>
+                                    </p:set>
+                                  </p:childTnLst>
+                                </p:cTn>
+                              </p:par>
+                            </p:childTnLst>
+                          </p:cTn>
+                        </p:par>
+                      </p:childTnLst>
+                    </p:cTn>
+                  </p:par>
+                </p:childTnLst>
+              </p:cTn>
+              <p:prevCondLst>
+                <p:cond evt="onPrev" delay="0">
+                  <p:tgtEl>
+                    <p:sldTgt/>
+                  </p:tgtEl>
+                </p:cond>
+              </p:prevCondLst>
+              <p:nextCondLst>
+                <p:cond evt="onNext" delay="0">
+                  <p:tgtEl>
+                    <p:sldTgt/>
+                  </p:tgtEl>
+                </p:cond>
+              </p:nextCondLst>
+            </p:seq>
+          </p:childTnLst>
+        </p:cTn>
+      </p:par>
+    </p:tnLst>
+    <p:bldLst>
+      <p:bldP spid="23" grpId="0"/>
+      <p:bldP spid="24" grpId="0"/>
+      <p:bldP spid="28" grpId="0"/>
+      <p:bldP spid="29" grpId="0"/>
+    </p:bldLst>
+  </p:timing>
 </p:sld>
 </file>
 
-<file path=ppt/slides/slide7.xml><?xml version="1.0" encoding="utf-8"?>
-<p:sld xmlns:a="http://schemas.openxmlformats.org/drawingml/2006/main" xmlns:r="http://schemas.openxmlformats.org/officeDocument/2006/relationships" xmlns:p="http://schemas.openxmlformats.org/presentationml/2006/main">
-  <p:cSld>
-    <p:spTree>
-      <p:nvGrpSpPr>
-        <p:cNvPr id="1" name=""/>
-        <p:cNvGrpSpPr/>
-        <p:nvPr/>
-      </p:nvGrpSpPr>
-      <p:grpSpPr>
-        <a:xfrm>
-          <a:off x="0" y="0"/>
-          <a:ext cx="0" cy="0"/>
-          <a:chOff x="0" y="0"/>
-          <a:chExt cx="0" cy="0"/>
-        </a:xfrm>
-      </p:grpSpPr>
-      <p:sp>
-        <p:nvSpPr>
-          <p:cNvPr id="2" name="Title 1">
-            <a:extLst>
-              <a:ext uri="{FF2B5EF4-FFF2-40B4-BE49-F238E27FC236}">
-                <a16:creationId xmlns:a16="http://schemas.microsoft.com/office/drawing/2014/main" id="{25407095-D418-1F16-6D1B-F1B1EFC746A0}"/>
-              </a:ext>
-            </a:extLst>
-          </p:cNvPr>
-          <p:cNvSpPr>
-            <a:spLocks noGrp="1"/>
-          </p:cNvSpPr>
-          <p:nvPr>
-            <p:ph type="title"/>
-          </p:nvPr>
-        </p:nvSpPr>
-        <p:spPr/>
-        <p:txBody>
-          <a:bodyPr/>
-          <a:lstStyle/>
-          <a:p>
-            <a:r>
-              <a:rPr lang="en-US" dirty="0"/>
-              <a:t>KPIs &amp; Target Variables</a:t>
-            </a:r>
-          </a:p>
-        </p:txBody>
-      </p:sp>
-      <p:sp>
-        <p:nvSpPr>
-          <p:cNvPr id="3" name="Content Placeholder 2">
-            <a:extLst>
-              <a:ext uri="{FF2B5EF4-FFF2-40B4-BE49-F238E27FC236}">
-                <a16:creationId xmlns:a16="http://schemas.microsoft.com/office/drawing/2014/main" id="{E9562A2E-F841-79EF-E681-C3A7C25E258E}"/>
-              </a:ext>
-            </a:extLst>
-          </p:cNvPr>
-          <p:cNvSpPr>
-            <a:spLocks noGrp="1"/>
-          </p:cNvSpPr>
-          <p:nvPr>
-            <p:ph idx="1"/>
-          </p:nvPr>
-        </p:nvSpPr>
-        <p:spPr/>
-        <p:txBody>
-          <a:bodyPr/>
-          <a:lstStyle/>
-          <a:p>
-            <a:pPr marL="0" indent="0">
-              <a:buNone/>
-            </a:pPr>
-            <a:r>
-              <a:rPr lang="en-US" dirty="0"/>
-              <a:t>KPI: Level of accident severity</a:t>
-            </a:r>
-          </a:p>
-          <a:p>
-            <a:pPr marL="0" indent="0">
-              <a:buNone/>
-            </a:pPr>
-            <a:endParaRPr lang="en-US" dirty="0"/>
-          </a:p>
-          <a:p>
-            <a:pPr marL="514350" indent="-514350">
-              <a:buFont typeface="+mj-lt"/>
-              <a:buAutoNum type="arabicPeriod"/>
-            </a:pPr>
-            <a:r>
-              <a:rPr lang="en-US" dirty="0"/>
-              <a:t>Level of Aircraft Damage	</a:t>
-            </a:r>
-          </a:p>
-          <a:p>
-            <a:pPr lvl="1"/>
-            <a:r>
-              <a:rPr lang="en-US" dirty="0"/>
-              <a:t>Destroyed, substantial, minor, none</a:t>
-            </a:r>
-          </a:p>
-          <a:p>
-            <a:pPr marL="514350" indent="-514350">
-              <a:buFont typeface="+mj-lt"/>
-              <a:buAutoNum type="arabicPeriod"/>
-            </a:pPr>
-            <a:r>
-              <a:rPr lang="en-US" dirty="0"/>
-              <a:t>Proportion of injuries </a:t>
-            </a:r>
-          </a:p>
-          <a:p>
-            <a:pPr lvl="1"/>
-            <a:r>
-              <a:rPr lang="en-US" dirty="0"/>
-              <a:t>Fatal, serious, minor, none</a:t>
-            </a:r>
-          </a:p>
-          <a:p>
-            <a:pPr marL="514350" indent="-514350">
-              <a:buFont typeface="+mj-lt"/>
-              <a:buAutoNum type="arabicPeriod"/>
-            </a:pPr>
-            <a:r>
-              <a:rPr lang="en-US" dirty="0"/>
-              <a:t>(Number of accidents in given month)</a:t>
-            </a:r>
-          </a:p>
-        </p:txBody>
-      </p:sp>
-    </p:spTree>
-    <p:extLst>
-      <p:ext uri="{BB962C8B-B14F-4D97-AF65-F5344CB8AC3E}">
-        <p14:creationId xmlns:p14="http://schemas.microsoft.com/office/powerpoint/2010/main" val="3544964793"/>
-      </p:ext>
-    </p:extLst>
-  </p:cSld>
-  <p:clrMapOvr>
-    <a:masterClrMapping/>
-  </p:clrMapOvr>
-</p:sld>
-</file>
-
-<file path=ppt/slides/slide8.xml><?xml version="1.0" encoding="utf-8"?>
+<file path=ppt/slides/slide9.xml><?xml version="1.0" encoding="utf-8"?>
 <p:sld xmlns:a="http://schemas.openxmlformats.org/drawingml/2006/main" xmlns:r="http://schemas.openxmlformats.org/officeDocument/2006/relationships" xmlns:p="http://schemas.openxmlformats.org/presentationml/2006/main">
   <p:cSld>
     <p:spTree>
@@ -19542,98 +22945,6 @@
     <p:extLst>
       <p:ext uri="{BB962C8B-B14F-4D97-AF65-F5344CB8AC3E}">
         <p14:creationId xmlns:p14="http://schemas.microsoft.com/office/powerpoint/2010/main" val="2298201993"/>
-      </p:ext>
-    </p:extLst>
-  </p:cSld>
-  <p:clrMapOvr>
-    <a:masterClrMapping/>
-  </p:clrMapOvr>
-</p:sld>
-</file>
-
-<file path=ppt/slides/slide9.xml><?xml version="1.0" encoding="utf-8"?>
-<p:sld xmlns:a="http://schemas.openxmlformats.org/drawingml/2006/main" xmlns:r="http://schemas.openxmlformats.org/officeDocument/2006/relationships" xmlns:p="http://schemas.openxmlformats.org/presentationml/2006/main">
-  <p:cSld>
-    <p:spTree>
-      <p:nvGrpSpPr>
-        <p:cNvPr id="1" name=""/>
-        <p:cNvGrpSpPr/>
-        <p:nvPr/>
-      </p:nvGrpSpPr>
-      <p:grpSpPr>
-        <a:xfrm>
-          <a:off x="0" y="0"/>
-          <a:ext cx="0" cy="0"/>
-          <a:chOff x="0" y="0"/>
-          <a:chExt cx="0" cy="0"/>
-        </a:xfrm>
-      </p:grpSpPr>
-      <p:sp>
-        <p:nvSpPr>
-          <p:cNvPr id="2" name="Title 1">
-            <a:extLst>
-              <a:ext uri="{FF2B5EF4-FFF2-40B4-BE49-F238E27FC236}">
-                <a16:creationId xmlns:a16="http://schemas.microsoft.com/office/drawing/2014/main" id="{F3BD8116-D657-9D01-07B7-E4E7DC22CD03}"/>
-              </a:ext>
-            </a:extLst>
-          </p:cNvPr>
-          <p:cNvSpPr>
-            <a:spLocks noGrp="1"/>
-          </p:cNvSpPr>
-          <p:nvPr>
-            <p:ph type="title"/>
-          </p:nvPr>
-        </p:nvSpPr>
-        <p:spPr/>
-        <p:txBody>
-          <a:bodyPr/>
-          <a:lstStyle/>
-          <a:p>
-            <a:r>
-              <a:rPr lang="en-US" dirty="0"/>
-              <a:t>Results</a:t>
-            </a:r>
-          </a:p>
-        </p:txBody>
-      </p:sp>
-      <p:sp>
-        <p:nvSpPr>
-          <p:cNvPr id="3" name="Content Placeholder 2">
-            <a:extLst>
-              <a:ext uri="{FF2B5EF4-FFF2-40B4-BE49-F238E27FC236}">
-                <a16:creationId xmlns:a16="http://schemas.microsoft.com/office/drawing/2014/main" id="{2BB86529-0ED0-A257-972F-F939AE2F796E}"/>
-              </a:ext>
-            </a:extLst>
-          </p:cNvPr>
-          <p:cNvSpPr>
-            <a:spLocks noGrp="1"/>
-          </p:cNvSpPr>
-          <p:nvPr>
-            <p:ph idx="1"/>
-          </p:nvPr>
-        </p:nvSpPr>
-        <p:spPr/>
-        <p:txBody>
-          <a:bodyPr/>
-          <a:lstStyle/>
-          <a:p>
-            <a:r>
-              <a:rPr lang="en-US" dirty="0"/>
-              <a:t>Predicting damage: no substantial improvement over baseline</a:t>
-            </a:r>
-          </a:p>
-          <a:p>
-            <a:r>
-              <a:rPr lang="en-US" dirty="0"/>
-              <a:t>Proportion of injuries:</a:t>
-            </a:r>
-          </a:p>
-        </p:txBody>
-      </p:sp>
-    </p:spTree>
-    <p:extLst>
-      <p:ext uri="{BB962C8B-B14F-4D97-AF65-F5344CB8AC3E}">
-        <p14:creationId xmlns:p14="http://schemas.microsoft.com/office/powerpoint/2010/main" val="433622941"/>
       </p:ext>
     </p:extLst>
   </p:cSld>

</xml_diff>